<commit_message>
Added Nebraska Code Camp closing slide.
</commit_message>
<xml_diff>
--- a/slides/RefreshWithNuGet.pptx
+++ b/slides/RefreshWithNuGet.pptx
@@ -6,10 +6,10 @@
     <p:sldMasterId id="2147483656" r:id="rId2"/>
   </p:sldMasterIdLst>
   <p:notesMasterIdLst>
-    <p:notesMasterId r:id="rId10"/>
+    <p:notesMasterId r:id="rId11"/>
   </p:notesMasterIdLst>
   <p:handoutMasterIdLst>
-    <p:handoutMasterId r:id="rId11"/>
+    <p:handoutMasterId r:id="rId12"/>
   </p:handoutMasterIdLst>
   <p:sldIdLst>
     <p:sldId id="676" r:id="rId3"/>
@@ -18,12 +18,13 @@
     <p:sldId id="699" r:id="rId6"/>
     <p:sldId id="700" r:id="rId7"/>
     <p:sldId id="701" r:id="rId8"/>
-    <p:sldId id="696" r:id="rId9"/>
+    <p:sldId id="702" r:id="rId9"/>
+    <p:sldId id="696" r:id="rId10"/>
   </p:sldIdLst>
   <p:sldSz cx="9144000" cy="6858000" type="screen4x3"/>
   <p:notesSz cx="9601200" cy="7315200"/>
   <p:custDataLst>
-    <p:tags r:id="rId12"/>
+    <p:tags r:id="rId13"/>
   </p:custDataLst>
   <p:defaultTextStyle>
     <a:defPPr>
@@ -248,7 +249,7 @@
               <a:pPr>
                 <a:defRPr/>
               </a:pPr>
-              <a:t>3/9/2012 12:16 PM</a:t>
+              <a:t>3/9/2012 11:50 PM</a:t>
             </a:fld>
             <a:endParaRPr lang="en-US"/>
           </a:p>
@@ -463,7 +464,7 @@
               <a:pPr>
                 <a:defRPr/>
               </a:pPr>
-              <a:t>3/9/2012 12:16 PM</a:t>
+              <a:t>3/9/2012 11:50 PM</a:t>
             </a:fld>
             <a:endParaRPr lang="en-US"/>
           </a:p>
@@ -868,7 +869,7 @@
             <a:fld id="{645EDAD1-88E4-4536-AD95-0BFD82EC77E6}" type="datetime8">
               <a:rPr lang="en-US" smtClean="0"/>
               <a:pPr/>
-              <a:t>3/9/2012 12:16 PM</a:t>
+              <a:t>3/9/2012 11:50 PM</a:t>
             </a:fld>
             <a:endParaRPr lang="en-US" smtClean="0"/>
           </a:p>
@@ -916,6 +917,115 @@
             <a:ext cx="3657600" cy="2743200"/>
           </a:xfrm>
           <a:ln/>
+        </p:spPr>
+      </p:sp>
+    </p:spTree>
+  </p:cSld>
+  <p:clrMapOvr>
+    <a:masterClrMapping/>
+  </p:clrMapOvr>
+</p:notes>
+</file>
+
+<file path=ppt/notesSlides/notesSlide2.xml><?xml version="1.0" encoding="utf-8"?>
+<p:notes xmlns:a="http://schemas.openxmlformats.org/drawingml/2006/main" xmlns:r="http://schemas.openxmlformats.org/officeDocument/2006/relationships" xmlns:p="http://schemas.openxmlformats.org/presentationml/2006/main" showMasterSp="0" showMasterPhAnim="0">
+  <p:cSld>
+    <p:spTree>
+      <p:nvGrpSpPr>
+        <p:cNvPr id="1" name="Shape 93"/>
+        <p:cNvGrpSpPr/>
+        <p:nvPr/>
+      </p:nvGrpSpPr>
+      <p:grpSpPr>
+        <a:xfrm>
+          <a:off x="0" y="0"/>
+          <a:ext cx="0" cy="0"/>
+          <a:chOff x="0" y="0"/>
+          <a:chExt cx="0" cy="0"/>
+        </a:xfrm>
+      </p:grpSpPr>
+      <p:sp>
+        <p:nvSpPr>
+          <p:cNvPr id="94" name="Shape 94"/>
+          <p:cNvSpPr>
+            <a:spLocks noGrp="1"/>
+          </p:cNvSpPr>
+          <p:nvPr>
+            <p:ph type="body" idx="1"/>
+          </p:nvPr>
+        </p:nvSpPr>
+        <p:spPr>
+          <a:xfrm>
+            <a:off x="960121" y="4935989"/>
+            <a:ext cx="7680959" cy="369302"/>
+          </a:xfrm>
+          <a:prstGeom prst="rect">
+            <a:avLst/>
+          </a:prstGeom>
+          <a:noFill/>
+          <a:ln>
+            <a:noFill/>
+          </a:ln>
+        </p:spPr>
+        <p:txBody>
+          <a:bodyPr lIns="91425" tIns="91425" rIns="91425" bIns="91425" anchor="ctr" anchorCtr="0">
+            <a:spAutoFit/>
+          </a:bodyPr>
+          <a:lstStyle/>
+          <a:p>
+            <a:endParaRPr/>
+          </a:p>
+        </p:txBody>
+      </p:sp>
+      <p:sp>
+        <p:nvSpPr>
+          <p:cNvPr id="95" name="Shape 95"/>
+          <p:cNvSpPr>
+            <a:spLocks noGrp="1" noRot="1" noChangeAspect="1"/>
+          </p:cNvSpPr>
+          <p:nvPr>
+            <p:ph type="sldImg" idx="2"/>
+          </p:nvPr>
+        </p:nvSpPr>
+        <p:spPr>
+          <a:xfrm>
+            <a:off x="2971800" y="549275"/>
+            <a:ext cx="3657600" cy="2743200"/>
+          </a:xfrm>
+          <a:custGeom>
+            <a:avLst/>
+            <a:gdLst/>
+            <a:ahLst/>
+            <a:cxnLst/>
+            <a:rect l="0" t="0" r="0" b="0"/>
+            <a:pathLst>
+              <a:path w="120000" h="120000" extrusionOk="0">
+                <a:moveTo>
+                  <a:pt x="0" y="0"/>
+                </a:moveTo>
+                <a:lnTo>
+                  <a:pt x="120000" y="0"/>
+                </a:lnTo>
+                <a:lnTo>
+                  <a:pt x="120000" y="120000"/>
+                </a:lnTo>
+                <a:lnTo>
+                  <a:pt x="0" y="120000"/>
+                </a:lnTo>
+                <a:close/>
+              </a:path>
+            </a:pathLst>
+          </a:custGeom>
+          <a:noFill/>
+          <a:ln w="9525" cap="flat">
+            <a:solidFill>
+              <a:srgbClr val="000000"/>
+            </a:solidFill>
+            <a:prstDash val="solid"/>
+            <a:round/>
+            <a:headEnd type="none" w="sm" len="sm"/>
+            <a:tailEnd type="none" w="sm" len="sm"/>
+          </a:ln>
         </p:spPr>
       </p:sp>
     </p:spTree>
@@ -7187,14 +7297,12 @@
               <a:rPr lang="en-US" dirty="0" smtClean="0"/>
               <a:t>What?</a:t>
             </a:r>
-            <a:endParaRPr lang="en-US" dirty="0" smtClean="0"/>
           </a:p>
           <a:p>
             <a:r>
               <a:rPr lang="en-US" dirty="0" smtClean="0"/>
               <a:t>How?</a:t>
             </a:r>
-            <a:endParaRPr lang="en-US" dirty="0" smtClean="0"/>
           </a:p>
         </p:txBody>
       </p:sp>
@@ -7298,7 +7406,7 @@
         <p:spPr>
           <a:xfrm>
             <a:off x="381002" y="1417638"/>
-            <a:ext cx="8410575" cy="2899255"/>
+            <a:ext cx="8410575" cy="2825389"/>
           </a:xfrm>
         </p:spPr>
         <p:txBody>
@@ -7313,13 +7421,8 @@
           <a:p>
             <a:r>
               <a:rPr lang="en-US" dirty="0" smtClean="0"/>
-              <a:t>@</a:t>
-            </a:r>
-            <a:r>
-              <a:rPr lang="en-US" dirty="0" err="1" smtClean="0"/>
-              <a:t>jglozano</a:t>
-            </a:r>
-            <a:endParaRPr lang="en-US" dirty="0" smtClean="0"/>
+              <a:t>@jglozano</a:t>
+            </a:r>
           </a:p>
           <a:p>
             <a:r>
@@ -7332,9 +7435,14 @@
           </a:p>
           <a:p>
             <a:r>
-              <a:rPr lang="en-US" dirty="0" smtClean="0"/>
-              <a:t>http://github.com/lozanotek/advancedmvc</a:t>
-            </a:r>
+              <a:rPr lang="en-US" sz="2800" dirty="0" smtClean="0"/>
+              <a:t>http://</a:t>
+            </a:r>
+            <a:r>
+              <a:rPr lang="en-US" sz="2800" dirty="0"/>
+              <a:t>github.com/lozanotek/RefreshWithNuGet</a:t>
+            </a:r>
+            <a:endParaRPr lang="en-US" sz="2800" dirty="0" smtClean="0"/>
           </a:p>
         </p:txBody>
       </p:sp>
@@ -7436,9 +7544,18 @@
   <p:clrMapOvr>
     <a:masterClrMapping/>
   </p:clrMapOvr>
-  <p:transition>
-    <p:fade/>
-  </p:transition>
+  <mc:AlternateContent xmlns:mc="http://schemas.openxmlformats.org/markup-compatibility/2006" xmlns:p14="http://schemas.microsoft.com/office/powerpoint/2010/main">
+    <mc:Choice Requires="p14">
+      <p:transition p14:dur="100">
+        <p:cut/>
+      </p:transition>
+    </mc:Choice>
+    <mc:Fallback xmlns="">
+      <p:transition>
+        <p:cut/>
+      </p:transition>
+    </mc:Fallback>
+  </mc:AlternateContent>
   <p:timing>
     <p:tnLst>
       <p:par>
@@ -7577,6 +7694,13 @@
   <p:transition>
     <p:fade/>
   </p:transition>
+  <p:timing>
+    <p:tnLst>
+      <p:par>
+        <p:cTn id="1" dur="indefinite" restart="never" nodeType="tmRoot"/>
+      </p:par>
+    </p:tnLst>
+  </p:timing>
 </p:sld>
 </file>
 
@@ -7722,6 +7846,13 @@
   <p:transition>
     <p:fade/>
   </p:transition>
+  <p:timing>
+    <p:tnLst>
+      <p:par>
+        <p:cTn id="1" dur="indefinite" restart="never" nodeType="tmRoot"/>
+      </p:par>
+    </p:tnLst>
+  </p:timing>
 </p:sld>
 </file>
 
@@ -7853,6 +7984,382 @@
   <p:cSld>
     <p:spTree>
       <p:nvGrpSpPr>
+        <p:cNvPr id="1" name="Shape 81"/>
+        <p:cNvGrpSpPr/>
+        <p:nvPr/>
+      </p:nvGrpSpPr>
+      <p:grpSpPr>
+        <a:xfrm>
+          <a:off x="0" y="0"/>
+          <a:ext cx="0" cy="0"/>
+          <a:chOff x="0" y="0"/>
+          <a:chExt cx="0" cy="0"/>
+        </a:xfrm>
+      </p:grpSpPr>
+      <p:sp>
+        <p:nvSpPr>
+          <p:cNvPr id="82" name="Shape 82"/>
+          <p:cNvSpPr/>
+          <p:nvPr/>
+        </p:nvSpPr>
+        <p:spPr>
+          <a:xfrm>
+            <a:off x="164830" y="1143000"/>
+            <a:ext cx="8293370" cy="3614571"/>
+          </a:xfrm>
+          <a:prstGeom prst="rect">
+            <a:avLst/>
+          </a:prstGeom>
+          <a:blipFill dpi="0" rotWithShape="1">
+            <a:blip r:embed="rId3">
+              <a:alphaModFix amt="21000"/>
+              <a:extLst>
+                <a:ext uri="{BEBA8EAE-BF5A-486C-A8C5-ECC9F3942E4B}">
+                  <a14:imgProps xmlns:a14="http://schemas.microsoft.com/office/drawing/2010/main">
+                    <a14:imgLayer r:embed="rId4">
+                      <a14:imgEffect>
+                        <a14:sharpenSoften amount="-100000"/>
+                      </a14:imgEffect>
+                    </a14:imgLayer>
+                  </a14:imgProps>
+                </a:ext>
+              </a:extLst>
+            </a:blip>
+            <a:srcRect/>
+            <a:stretch>
+              <a:fillRect/>
+            </a:stretch>
+          </a:blipFill>
+          <a:ln>
+            <a:noFill/>
+          </a:ln>
+        </p:spPr>
+      </p:sp>
+      <p:sp>
+        <p:nvSpPr>
+          <p:cNvPr id="89" name="Shape 89"/>
+          <p:cNvSpPr/>
+          <p:nvPr/>
+        </p:nvSpPr>
+        <p:spPr>
+          <a:xfrm>
+            <a:off x="474127" y="3397617"/>
+            <a:ext cx="8458200" cy="1157199"/>
+          </a:xfrm>
+          <a:prstGeom prst="rect">
+            <a:avLst/>
+          </a:prstGeom>
+          <a:noFill/>
+          <a:ln>
+            <a:noFill/>
+          </a:ln>
+        </p:spPr>
+        <p:txBody>
+          <a:bodyPr lIns="91425" tIns="45700" rIns="91425" bIns="45700" anchor="ctr" anchorCtr="0">
+            <a:spAutoFit/>
+          </a:bodyPr>
+          <a:lstStyle/>
+          <a:p>
+            <a:pPr algn="ctr"/>
+            <a:r>
+              <a:rPr lang="en-US" sz="3200" b="1" dirty="0" smtClean="0"/>
+              <a:t>www.NebraskaCodeCamp.com/Evals</a:t>
+            </a:r>
+            <a:endParaRPr lang="en-US" sz="1600" dirty="0" smtClean="0">
+              <a:solidFill>
+                <a:schemeClr val="dk1"/>
+              </a:solidFill>
+            </a:endParaRPr>
+          </a:p>
+          <a:p>
+            <a:pPr marL="0" marR="0" lvl="0" indent="0" algn="ctr" rtl="0"/>
+            <a:r>
+              <a:rPr lang="en-US" sz="2000" dirty="0" smtClean="0"/>
+              <a:t>Submit yo</a:t>
+            </a:r>
+            <a:r>
+              <a:rPr sz="2000" b="0" i="0" u="none" strike="noStrike" cap="none" baseline="0" dirty="0" smtClean="0">
+                <a:sym typeface="Arial" panose="00000000000000000000"/>
+              </a:rPr>
+              <a:t>ur </a:t>
+            </a:r>
+            <a:r>
+              <a:rPr sz="2000" b="0" i="0" u="none" strike="noStrike" cap="none" baseline="0" dirty="0">
+                <a:sym typeface="Arial" panose="00000000000000000000"/>
+              </a:rPr>
+              <a:t>evaluations to be entered into a drawing for a great prize</a:t>
+            </a:r>
+          </a:p>
+          <a:p>
+            <a:pPr marL="0" marR="0" lvl="0" indent="0" algn="ctr" rtl="0"/>
+            <a:r>
+              <a:rPr sz="2000" b="0" i="0" u="none" strike="noStrike" cap="none" baseline="0" dirty="0">
+                <a:solidFill>
+                  <a:schemeClr val="dk1"/>
+                </a:solidFill>
+                <a:sym typeface="Arial" panose="00000000000000000000"/>
+              </a:rPr>
+              <a:t> </a:t>
+            </a:r>
+          </a:p>
+        </p:txBody>
+      </p:sp>
+      <p:pic>
+        <p:nvPicPr>
+          <p:cNvPr id="1026" name="Picture 2" descr="C:\dev\Projects\LDNUG\NebraskaCodeCamp\nebraskacodecamp.com\nebraskacodecamp.com\Content\sponsors\twilio-small.png"/>
+          <p:cNvPicPr>
+            <a:picLocks noChangeAspect="1" noChangeArrowheads="1"/>
+          </p:cNvPicPr>
+          <p:nvPr/>
+        </p:nvPicPr>
+        <p:blipFill>
+          <a:blip r:embed="rId5">
+            <a:extLst>
+              <a:ext uri="{28A0092B-C50C-407E-A947-70E740481C1C}">
+                <a14:useLocalDpi xmlns:a14="http://schemas.microsoft.com/office/drawing/2010/main" val="0"/>
+              </a:ext>
+            </a:extLst>
+          </a:blip>
+          <a:srcRect/>
+          <a:stretch>
+            <a:fillRect/>
+          </a:stretch>
+        </p:blipFill>
+        <p:spPr bwMode="auto">
+          <a:xfrm>
+            <a:off x="5639707" y="6013738"/>
+            <a:ext cx="1298864" cy="441614"/>
+          </a:xfrm>
+          <a:prstGeom prst="rect">
+            <a:avLst/>
+          </a:prstGeom>
+          <a:noFill/>
+          <a:extLst>
+            <a:ext uri="{909E8E84-426E-40DD-AFC4-6F175D3DCCD1}">
+              <a14:hiddenFill xmlns:a14="http://schemas.microsoft.com/office/drawing/2010/main">
+                <a:solidFill>
+                  <a:srgbClr val="FFFFFF"/>
+                </a:solidFill>
+              </a14:hiddenFill>
+            </a:ext>
+          </a:extLst>
+        </p:spPr>
+      </p:pic>
+      <p:pic>
+        <p:nvPicPr>
+          <p:cNvPr id="1027" name="Picture 3" descr="C:\dev\Projects\LDNUG\NebraskaCodeCamp\nebraskacodecamp.com\nebraskacodecamp.com\Content\sponsors\componentone-small.png"/>
+          <p:cNvPicPr>
+            <a:picLocks noChangeAspect="1" noChangeArrowheads="1"/>
+          </p:cNvPicPr>
+          <p:nvPr/>
+        </p:nvPicPr>
+        <p:blipFill>
+          <a:blip r:embed="rId6">
+            <a:extLst>
+              <a:ext uri="{28A0092B-C50C-407E-A947-70E740481C1C}">
+                <a14:useLocalDpi xmlns:a14="http://schemas.microsoft.com/office/drawing/2010/main" val="0"/>
+              </a:ext>
+            </a:extLst>
+          </a:blip>
+          <a:srcRect/>
+          <a:stretch>
+            <a:fillRect/>
+          </a:stretch>
+        </p:blipFill>
+        <p:spPr bwMode="auto">
+          <a:xfrm>
+            <a:off x="4053795" y="5853545"/>
+            <a:ext cx="1298864" cy="762000"/>
+          </a:xfrm>
+          <a:prstGeom prst="rect">
+            <a:avLst/>
+          </a:prstGeom>
+          <a:noFill/>
+          <a:extLst>
+            <a:ext uri="{909E8E84-426E-40DD-AFC4-6F175D3DCCD1}">
+              <a14:hiddenFill xmlns:a14="http://schemas.microsoft.com/office/drawing/2010/main">
+                <a:solidFill>
+                  <a:srgbClr val="FFFFFF"/>
+                </a:solidFill>
+              </a14:hiddenFill>
+            </a:ext>
+          </a:extLst>
+        </p:spPr>
+      </p:pic>
+      <p:pic>
+        <p:nvPicPr>
+          <p:cNvPr id="1028" name="Picture 4" descr="C:\dev\Projects\LDNUG\NebraskaCodeCamp\nebraskacodecamp.com\nebraskacodecamp.com\Content\sponsors\discountaspnet-small.png"/>
+          <p:cNvPicPr>
+            <a:picLocks noChangeAspect="1" noChangeArrowheads="1"/>
+          </p:cNvPicPr>
+          <p:nvPr/>
+        </p:nvPicPr>
+        <p:blipFill>
+          <a:blip r:embed="rId7">
+            <a:extLst>
+              <a:ext uri="{28A0092B-C50C-407E-A947-70E740481C1C}">
+                <a14:useLocalDpi xmlns:a14="http://schemas.microsoft.com/office/drawing/2010/main" val="0"/>
+              </a:ext>
+            </a:extLst>
+          </a:blip>
+          <a:srcRect/>
+          <a:stretch>
+            <a:fillRect/>
+          </a:stretch>
+        </p:blipFill>
+        <p:spPr bwMode="auto">
+          <a:xfrm>
+            <a:off x="2558804" y="5911273"/>
+            <a:ext cx="1212273" cy="646545"/>
+          </a:xfrm>
+          <a:prstGeom prst="rect">
+            <a:avLst/>
+          </a:prstGeom>
+          <a:noFill/>
+          <a:extLst>
+            <a:ext uri="{909E8E84-426E-40DD-AFC4-6F175D3DCCD1}">
+              <a14:hiddenFill xmlns:a14="http://schemas.microsoft.com/office/drawing/2010/main">
+                <a:solidFill>
+                  <a:srgbClr val="FFFFFF"/>
+                </a:solidFill>
+              </a14:hiddenFill>
+            </a:ext>
+          </a:extLst>
+        </p:spPr>
+      </p:pic>
+      <p:pic>
+        <p:nvPicPr>
+          <p:cNvPr id="1029" name="Picture 5" descr="C:\dev\Projects\LDNUG\NebraskaCodeCamp\nebraskacodecamp.com\nebraskacodecamp.com\Content\sponsors\dpl-small.png"/>
+          <p:cNvPicPr>
+            <a:picLocks noChangeAspect="1" noChangeArrowheads="1"/>
+          </p:cNvPicPr>
+          <p:nvPr/>
+        </p:nvPicPr>
+        <p:blipFill>
+          <a:blip r:embed="rId8">
+            <a:extLst>
+              <a:ext uri="{28A0092B-C50C-407E-A947-70E740481C1C}">
+                <a14:useLocalDpi xmlns:a14="http://schemas.microsoft.com/office/drawing/2010/main" val="0"/>
+              </a:ext>
+            </a:extLst>
+          </a:blip>
+          <a:srcRect/>
+          <a:stretch>
+            <a:fillRect/>
+          </a:stretch>
+        </p:blipFill>
+        <p:spPr bwMode="auto">
+          <a:xfrm>
+            <a:off x="264037" y="5715000"/>
+            <a:ext cx="1998251" cy="1039091"/>
+          </a:xfrm>
+          <a:prstGeom prst="rect">
+            <a:avLst/>
+          </a:prstGeom>
+          <a:noFill/>
+          <a:extLst>
+            <a:ext uri="{909E8E84-426E-40DD-AFC4-6F175D3DCCD1}">
+              <a14:hiddenFill xmlns:a14="http://schemas.microsoft.com/office/drawing/2010/main">
+                <a:solidFill>
+                  <a:srgbClr val="FFFFFF"/>
+                </a:solidFill>
+              </a14:hiddenFill>
+            </a:ext>
+          </a:extLst>
+        </p:spPr>
+      </p:pic>
+      <p:pic>
+        <p:nvPicPr>
+          <p:cNvPr id="1030" name="Picture 6" descr="C:\dev\Projects\LDNUG\NebraskaCodeCamp\nebraskacodecamp.com\nebraskacodecamp.com\Content\sponsors\infragistics-small.png"/>
+          <p:cNvPicPr>
+            <a:picLocks noChangeAspect="1" noChangeArrowheads="1"/>
+          </p:cNvPicPr>
+          <p:nvPr/>
+        </p:nvPicPr>
+        <p:blipFill>
+          <a:blip r:embed="rId9">
+            <a:extLst>
+              <a:ext uri="{28A0092B-C50C-407E-A947-70E740481C1C}">
+                <a14:useLocalDpi xmlns:a14="http://schemas.microsoft.com/office/drawing/2010/main" val="0"/>
+              </a:ext>
+            </a:extLst>
+          </a:blip>
+          <a:srcRect/>
+          <a:stretch>
+            <a:fillRect/>
+          </a:stretch>
+        </p:blipFill>
+        <p:spPr bwMode="auto">
+          <a:xfrm>
+            <a:off x="7219655" y="5919994"/>
+            <a:ext cx="1179566" cy="629102"/>
+          </a:xfrm>
+          <a:prstGeom prst="rect">
+            <a:avLst/>
+          </a:prstGeom>
+          <a:noFill/>
+          <a:extLst>
+            <a:ext uri="{909E8E84-426E-40DD-AFC4-6F175D3DCCD1}">
+              <a14:hiddenFill xmlns:a14="http://schemas.microsoft.com/office/drawing/2010/main">
+                <a:solidFill>
+                  <a:srgbClr val="FFFFFF"/>
+                </a:solidFill>
+              </a14:hiddenFill>
+            </a:ext>
+          </a:extLst>
+        </p:spPr>
+      </p:pic>
+      <p:sp>
+        <p:nvSpPr>
+          <p:cNvPr id="2" name="Title 1"/>
+          <p:cNvSpPr>
+            <a:spLocks noGrp="1"/>
+          </p:cNvSpPr>
+          <p:nvPr>
+            <p:ph type="title"/>
+          </p:nvPr>
+        </p:nvSpPr>
+        <p:spPr/>
+        <p:txBody>
+          <a:bodyPr/>
+          <a:lstStyle/>
+          <a:p>
+            <a:r>
+              <a:rPr lang="en-US" dirty="0" smtClean="0"/>
+              <a:t>Thanks for coming!</a:t>
+            </a:r>
+            <a:endParaRPr lang="en-US" dirty="0"/>
+          </a:p>
+        </p:txBody>
+      </p:sp>
+    </p:spTree>
+    <p:extLst>
+      <p:ext uri="{BB962C8B-B14F-4D97-AF65-F5344CB8AC3E}">
+        <p14:creationId xmlns:p14="http://schemas.microsoft.com/office/powerpoint/2010/main" val="2030386888"/>
+      </p:ext>
+    </p:extLst>
+  </p:cSld>
+  <p:clrMapOvr>
+    <a:masterClrMapping/>
+  </p:clrMapOvr>
+  <p:transition spd="slow">
+    <p:cut/>
+  </p:transition>
+  <p:timing>
+    <p:tnLst>
+      <p:par>
+        <p:cTn id="1" dur="indefinite" restart="never" nodeType="tmRoot"/>
+      </p:par>
+    </p:tnLst>
+  </p:timing>
+</p:sld>
+</file>
+
+<file path=ppt/slides/slide8.xml><?xml version="1.0" encoding="utf-8"?>
+<p:sld xmlns:a="http://schemas.openxmlformats.org/drawingml/2006/main" xmlns:r="http://schemas.openxmlformats.org/officeDocument/2006/relationships" xmlns:p="http://schemas.openxmlformats.org/presentationml/2006/main" show="0">
+  <p:cSld>
+    <p:spTree>
+      <p:nvGrpSpPr>
         <p:cNvPr id="1" name=""/>
         <p:cNvGrpSpPr/>
         <p:nvPr/>
@@ -7942,7 +8449,7 @@
               <a:pPr>
                 <a:defRPr/>
               </a:pPr>
-              <a:t>7</a:t>
+              <a:t>8</a:t>
             </a:fld>
             <a:endParaRPr lang="en-US"/>
           </a:p>

</xml_diff>

<commit_message>
Updated the slides with minor info.
</commit_message>
<xml_diff>
--- a/slides/RefreshWithNuGet.pptx
+++ b/slides/RefreshWithNuGet.pptx
@@ -254,7 +254,7 @@
               <a:pPr>
                 <a:defRPr/>
               </a:pPr>
-              <a:t>7/25/12 07:35</a:t>
+              <a:t>7/25/12 17:20</a:t>
             </a:fld>
             <a:endParaRPr lang="en-US"/>
           </a:p>
@@ -469,7 +469,7 @@
               <a:pPr>
                 <a:defRPr/>
               </a:pPr>
-              <a:t>7/25/12 07:35</a:t>
+              <a:t>7/25/12 17:20</a:t>
             </a:fld>
             <a:endParaRPr lang="en-US"/>
           </a:p>
@@ -874,7 +874,7 @@
             <a:fld id="{645EDAD1-88E4-4536-AD95-0BFD82EC77E6}" type="datetime8">
               <a:rPr lang="en-US" smtClean="0"/>
               <a:pPr/>
-              <a:t>7/25/12 07:35</a:t>
+              <a:t>7/25/12 17:20</a:t>
             </a:fld>
             <a:endParaRPr lang="en-US" smtClean="0"/>
           </a:p>
@@ -7100,15 +7100,7 @@
                   <a:schemeClr val="tx2"/>
                 </a:solidFill>
               </a:rPr>
-              <a:t>Javier G. </a:t>
-            </a:r>
-            <a:r>
-              <a:rPr lang="en-US" b="1" dirty="0" smtClean="0">
-                <a:solidFill>
-                  <a:schemeClr val="tx2"/>
-                </a:solidFill>
-              </a:rPr>
-              <a:t>Lozano</a:t>
+              <a:t>Javier G. Lozano</a:t>
             </a:r>
           </a:p>
           <a:p>
@@ -7210,16 +7202,21 @@
             <p:ph type="title"/>
           </p:nvPr>
         </p:nvSpPr>
-        <p:spPr/>
+        <p:spPr>
+          <a:xfrm>
+            <a:off x="381000" y="228600"/>
+            <a:ext cx="8382000" cy="769441"/>
+          </a:xfrm>
+        </p:spPr>
         <p:txBody>
           <a:bodyPr/>
           <a:lstStyle/>
           <a:p>
             <a:r>
-              <a:rPr lang="en-US" dirty="0" smtClean="0"/>
+              <a:rPr lang="en-US" b="1" dirty="0" smtClean="0"/>
               <a:t>Why?</a:t>
             </a:r>
-            <a:endParaRPr lang="en-US" dirty="0"/>
+            <a:endParaRPr lang="en-US" b="1" dirty="0"/>
           </a:p>
         </p:txBody>
       </p:sp>
@@ -7382,7 +7379,12 @@
             <p:ph type="title"/>
           </p:nvPr>
         </p:nvSpPr>
-        <p:spPr/>
+        <p:spPr>
+          <a:xfrm>
+            <a:off x="381000" y="228600"/>
+            <a:ext cx="8382000" cy="769441"/>
+          </a:xfrm>
+        </p:spPr>
         <p:txBody>
           <a:bodyPr/>
           <a:lstStyle/>
@@ -7407,8 +7409,8 @@
         </p:nvSpPr>
         <p:spPr>
           <a:xfrm>
-            <a:off x="381002" y="3161235"/>
-            <a:ext cx="8410575" cy="757130"/>
+            <a:off x="366713" y="3044280"/>
+            <a:ext cx="8410575" cy="769441"/>
           </a:xfrm>
         </p:spPr>
         <p:txBody>
@@ -7420,7 +7422,7 @@
             </a:pPr>
             <a:r>
               <a:rPr lang="en-US" sz="4800" b="1" dirty="0" smtClean="0"/>
-              <a:t>DEMO</a:t>
+              <a:t>Enough slides, let’s code.</a:t>
             </a:r>
             <a:endParaRPr lang="en-US" sz="2800" b="1" dirty="0" smtClean="0"/>
           </a:p>
@@ -7505,7 +7507,12 @@
             <p:ph type="title"/>
           </p:nvPr>
         </p:nvSpPr>
-        <p:spPr/>
+        <p:spPr>
+          <a:xfrm>
+            <a:off x="381000" y="228600"/>
+            <a:ext cx="8382000" cy="769441"/>
+          </a:xfrm>
+        </p:spPr>
         <p:txBody>
           <a:bodyPr/>
           <a:lstStyle/>
@@ -7530,7 +7537,7 @@
         </p:nvSpPr>
         <p:spPr>
           <a:xfrm>
-            <a:off x="381002" y="3161235"/>
+            <a:off x="366713" y="3050435"/>
             <a:ext cx="8410575" cy="757130"/>
           </a:xfrm>
         </p:spPr>
@@ -12251,13 +12258,8 @@
           <a:p>
             <a:r>
               <a:rPr lang="en-US" dirty="0" smtClean="0"/>
-              <a:t>Why</a:t>
-            </a:r>
-            <a:r>
-              <a:rPr lang="en-US" dirty="0" smtClean="0"/>
-              <a:t>?</a:t>
-            </a:r>
-            <a:endParaRPr lang="en-US" dirty="0" smtClean="0"/>
+              <a:t>Why?</a:t>
+            </a:r>
           </a:p>
           <a:p>
             <a:r>
@@ -12404,13 +12406,7 @@
               <a:rPr lang="en-US" b="1" dirty="0" smtClean="0">
                 <a:hlinkClick r:id="rId2"/>
               </a:rPr>
-              <a:t>http://lozanotek.com/</a:t>
-            </a:r>
-            <a:r>
-              <a:rPr lang="en-US" b="1" dirty="0" smtClean="0">
-                <a:hlinkClick r:id="rId2"/>
-              </a:rPr>
-              <a:t>blog</a:t>
+              <a:t>http://lozanotek.com/blog</a:t>
             </a:r>
             <a:endParaRPr lang="en-US" b="1" dirty="0" smtClean="0"/>
           </a:p>
@@ -12462,7 +12458,7 @@
         </p:blipFill>
         <p:spPr bwMode="auto">
           <a:xfrm>
-            <a:off x="6019800" y="2540000"/>
+            <a:off x="6121400" y="2540000"/>
             <a:ext cx="2133600" cy="863600"/>
           </a:xfrm>
           <a:prstGeom prst="rect">
@@ -12494,7 +12490,7 @@
         </p:blipFill>
         <p:spPr bwMode="auto">
           <a:xfrm>
-            <a:off x="6248400" y="1447800"/>
+            <a:off x="6350000" y="1447800"/>
             <a:ext cx="1905000" cy="685800"/>
           </a:xfrm>
           <a:prstGeom prst="rect">
@@ -12517,7 +12513,7 @@
         </p:nvSpPr>
         <p:spPr>
           <a:xfrm>
-            <a:off x="293324" y="4572000"/>
+            <a:off x="304800" y="5181600"/>
             <a:ext cx="8557351" cy="523220"/>
           </a:xfrm>
           <a:prstGeom prst="rect">
@@ -12567,6 +12563,30 @@
           </a:p>
         </p:txBody>
       </p:sp>
+      <p:pic>
+        <p:nvPicPr>
+          <p:cNvPr id="8" name="Picture 7"/>
+          <p:cNvPicPr>
+            <a:picLocks noChangeAspect="1"/>
+          </p:cNvPicPr>
+          <p:nvPr/>
+        </p:nvPicPr>
+        <p:blipFill>
+          <a:blip r:embed="rId5"/>
+          <a:stretch>
+            <a:fillRect/>
+          </a:stretch>
+        </p:blipFill>
+        <p:spPr>
+          <a:xfrm>
+            <a:off x="5715000" y="3657600"/>
+            <a:ext cx="2540000" cy="914400"/>
+          </a:xfrm>
+          <a:prstGeom prst="rect">
+            <a:avLst/>
+          </a:prstGeom>
+        </p:spPr>
+      </p:pic>
     </p:spTree>
   </p:cSld>
   <p:clrMapOvr>
@@ -12621,16 +12641,21 @@
             <p:ph type="title"/>
           </p:nvPr>
         </p:nvSpPr>
-        <p:spPr/>
+        <p:spPr>
+          <a:xfrm>
+            <a:off x="381000" y="228600"/>
+            <a:ext cx="8382000" cy="769441"/>
+          </a:xfrm>
+        </p:spPr>
         <p:txBody>
           <a:bodyPr/>
           <a:lstStyle/>
           <a:p>
             <a:r>
-              <a:rPr lang="en-US" dirty="0" smtClean="0"/>
+              <a:rPr lang="en-US" b="1" dirty="0" smtClean="0"/>
               <a:t>Why?</a:t>
             </a:r>
-            <a:endParaRPr lang="en-US" dirty="0"/>
+            <a:endParaRPr lang="en-US" b="1" dirty="0"/>
           </a:p>
         </p:txBody>
       </p:sp>
@@ -12671,11 +12696,7 @@
           <a:p>
             <a:r>
               <a:rPr lang="en-US" dirty="0" smtClean="0"/>
-              <a:t>Component </a:t>
-            </a:r>
-            <a:r>
-              <a:rPr lang="en-US" dirty="0" smtClean="0"/>
-              <a:t>Reuse</a:t>
+              <a:t>Component Reuse</a:t>
             </a:r>
           </a:p>
           <a:p>
@@ -12778,16 +12799,21 @@
             <p:ph type="title"/>
           </p:nvPr>
         </p:nvSpPr>
-        <p:spPr/>
+        <p:spPr>
+          <a:xfrm>
+            <a:off x="381000" y="228600"/>
+            <a:ext cx="8382000" cy="769441"/>
+          </a:xfrm>
+        </p:spPr>
         <p:txBody>
           <a:bodyPr/>
           <a:lstStyle/>
           <a:p>
             <a:r>
-              <a:rPr lang="en-US" dirty="0" smtClean="0"/>
+              <a:rPr lang="en-US" b="1" dirty="0" smtClean="0"/>
               <a:t>Why?</a:t>
             </a:r>
-            <a:endParaRPr lang="en-US" dirty="0"/>
+            <a:endParaRPr lang="en-US" b="1" dirty="0"/>
           </a:p>
         </p:txBody>
       </p:sp>
@@ -12924,16 +12950,21 @@
             <p:ph type="title"/>
           </p:nvPr>
         </p:nvSpPr>
-        <p:spPr/>
+        <p:spPr>
+          <a:xfrm>
+            <a:off x="381000" y="228600"/>
+            <a:ext cx="8382000" cy="769441"/>
+          </a:xfrm>
+        </p:spPr>
         <p:txBody>
           <a:bodyPr/>
           <a:lstStyle/>
           <a:p>
             <a:r>
-              <a:rPr lang="en-US" dirty="0" smtClean="0"/>
+              <a:rPr lang="en-US" b="1" dirty="0" smtClean="0"/>
               <a:t>Why?</a:t>
             </a:r>
-            <a:endParaRPr lang="en-US" dirty="0"/>
+            <a:endParaRPr lang="en-US" b="1" dirty="0"/>
           </a:p>
         </p:txBody>
       </p:sp>
@@ -13193,16 +13224,21 @@
             <p:ph type="title"/>
           </p:nvPr>
         </p:nvSpPr>
-        <p:spPr/>
+        <p:spPr>
+          <a:xfrm>
+            <a:off x="381000" y="228600"/>
+            <a:ext cx="8382000" cy="769441"/>
+          </a:xfrm>
+        </p:spPr>
         <p:txBody>
           <a:bodyPr/>
           <a:lstStyle/>
           <a:p>
             <a:r>
-              <a:rPr lang="en-US" dirty="0" smtClean="0"/>
+              <a:rPr lang="en-US" b="1" dirty="0" smtClean="0"/>
               <a:t>Why?</a:t>
             </a:r>
-            <a:endParaRPr lang="en-US" dirty="0"/>
+            <a:endParaRPr lang="en-US" b="1" dirty="0"/>
           </a:p>
         </p:txBody>
       </p:sp>
@@ -13597,7 +13633,11 @@
           <a:p>
             <a:r>
               <a:rPr lang="en-US" dirty="0" smtClean="0"/>
-              <a:t>Benefit the </a:t>
+              <a:t>Benefit </a:t>
+            </a:r>
+            <a:r>
+              <a:rPr lang="en-US" dirty="0" smtClean="0"/>
+              <a:t>our </a:t>
             </a:r>
             <a:r>
               <a:rPr lang="en-US" b="1" i="1" dirty="0" smtClean="0"/>

</xml_diff>

<commit_message>
Fixed layout and added turbine logo.
</commit_message>
<xml_diff>
--- a/slides/RefreshWithNuGet.pptx
+++ b/slides/RefreshWithNuGet.pptx
@@ -6,10 +6,10 @@
     <p:sldMasterId id="2147483656" r:id="rId2"/>
   </p:sldMasterIdLst>
   <p:notesMasterIdLst>
-    <p:notesMasterId r:id="rId16"/>
+    <p:notesMasterId r:id="rId11"/>
   </p:notesMasterIdLst>
   <p:handoutMasterIdLst>
-    <p:handoutMasterId r:id="rId17"/>
+    <p:handoutMasterId r:id="rId12"/>
   </p:handoutMasterIdLst>
   <p:sldIdLst>
     <p:sldId id="676" r:id="rId3"/>
@@ -17,19 +17,14 @@
     <p:sldId id="677" r:id="rId5"/>
     <p:sldId id="703" r:id="rId6"/>
     <p:sldId id="698" r:id="rId7"/>
-    <p:sldId id="699" r:id="rId8"/>
-    <p:sldId id="704" r:id="rId9"/>
-    <p:sldId id="705" r:id="rId10"/>
-    <p:sldId id="706" r:id="rId11"/>
-    <p:sldId id="707" r:id="rId12"/>
-    <p:sldId id="701" r:id="rId13"/>
-    <p:sldId id="696" r:id="rId14"/>
-    <p:sldId id="708" r:id="rId15"/>
+    <p:sldId id="701" r:id="rId8"/>
+    <p:sldId id="696" r:id="rId9"/>
+    <p:sldId id="708" r:id="rId10"/>
   </p:sldIdLst>
   <p:sldSz cx="9144000" cy="6858000" type="screen4x3"/>
   <p:notesSz cx="9601200" cy="7315200"/>
   <p:custDataLst>
-    <p:tags r:id="rId19"/>
+    <p:tags r:id="rId13"/>
   </p:custDataLst>
   <p:defaultTextStyle>
     <a:defPPr>
@@ -254,7 +249,7 @@
               <a:pPr>
                 <a:defRPr/>
               </a:pPr>
-              <a:t>7/25/12 17:20</a:t>
+              <a:t>8/3/2012 8:58 AM</a:t>
             </a:fld>
             <a:endParaRPr lang="en-US"/>
           </a:p>
@@ -469,7 +464,7 @@
               <a:pPr>
                 <a:defRPr/>
               </a:pPr>
-              <a:t>7/25/12 17:20</a:t>
+              <a:t>8/3/2012 8:58 AM</a:t>
             </a:fld>
             <a:endParaRPr lang="en-US"/>
           </a:p>
@@ -874,7 +869,7 @@
             <a:fld id="{645EDAD1-88E4-4536-AD95-0BFD82EC77E6}" type="datetime8">
               <a:rPr lang="en-US" smtClean="0"/>
               <a:pPr/>
-              <a:t>7/25/12 17:20</a:t>
+              <a:t>8/3/2012 8:58 AM</a:t>
             </a:fld>
             <a:endParaRPr lang="en-US" smtClean="0"/>
           </a:p>
@@ -1044,7 +1039,7 @@
   <p:clrMapOvr>
     <a:masterClrMapping/>
   </p:clrMapOvr>
-  <p:transition xmlns:p14="http://schemas.microsoft.com/office/powerpoint/2010/main">
+  <p:transition>
     <p:fade/>
   </p:transition>
 </p:sldLayout>
@@ -1192,7 +1187,7 @@
   <p:clrMapOvr>
     <a:masterClrMapping/>
   </p:clrMapOvr>
-  <p:transition xmlns:p14="http://schemas.microsoft.com/office/powerpoint/2010/main">
+  <p:transition>
     <p:fade/>
   </p:transition>
 </p:sldLayout>
@@ -1340,7 +1335,7 @@
   <p:clrMapOvr>
     <a:masterClrMapping/>
   </p:clrMapOvr>
-  <p:transition xmlns:p14="http://schemas.microsoft.com/office/powerpoint/2010/main">
+  <p:transition>
     <p:fade/>
   </p:transition>
 </p:sldLayout>
@@ -3401,7 +3396,7 @@
   <p:clrMapOvr>
     <a:masterClrMapping/>
   </p:clrMapOvr>
-  <p:transition xmlns:p14="http://schemas.microsoft.com/office/powerpoint/2010/main">
+  <p:transition>
     <p:fade/>
   </p:transition>
 </p:sldLayout>
@@ -4228,7 +4223,7 @@
   <p:clrMapOvr>
     <a:masterClrMapping/>
   </p:clrMapOvr>
-  <p:transition xmlns:p14="http://schemas.microsoft.com/office/powerpoint/2010/main">
+  <p:transition>
     <p:fade/>
   </p:transition>
 </p:sldLayout>
@@ -4489,7 +4484,7 @@
   <p:clrMapOvr>
     <a:masterClrMapping/>
   </p:clrMapOvr>
-  <p:transition xmlns:p14="http://schemas.microsoft.com/office/powerpoint/2010/main">
+  <p:transition>
     <p:fade/>
   </p:transition>
 </p:sldLayout>
@@ -4884,7 +4879,7 @@
   <p:clrMapOvr>
     <a:masterClrMapping/>
   </p:clrMapOvr>
-  <p:transition xmlns:p14="http://schemas.microsoft.com/office/powerpoint/2010/main">
+  <p:transition>
     <p:fade/>
   </p:transition>
 </p:sldLayout>
@@ -4975,7 +4970,7 @@
   <p:clrMapOvr>
     <a:masterClrMapping/>
   </p:clrMapOvr>
-  <p:transition xmlns:p14="http://schemas.microsoft.com/office/powerpoint/2010/main">
+  <p:transition>
     <p:fade/>
   </p:transition>
 </p:sldLayout>
@@ -5038,7 +5033,7 @@
   <p:clrMapOvr>
     <a:masterClrMapping/>
   </p:clrMapOvr>
-  <p:transition xmlns:p14="http://schemas.microsoft.com/office/powerpoint/2010/main">
+  <p:transition>
     <p:fade/>
   </p:transition>
 </p:sldLayout>
@@ -5283,7 +5278,7 @@
   <p:clrMapOvr>
     <a:masterClrMapping/>
   </p:clrMapOvr>
-  <p:transition xmlns:p14="http://schemas.microsoft.com/office/powerpoint/2010/main">
+  <p:transition>
     <p:fade/>
   </p:transition>
 </p:sldLayout>
@@ -5508,7 +5503,7 @@
   <p:clrMapOvr>
     <a:masterClrMapping/>
   </p:clrMapOvr>
-  <p:transition xmlns:p14="http://schemas.microsoft.com/office/powerpoint/2010/main">
+  <p:transition>
     <p:fade/>
   </p:transition>
 </p:sldLayout>
@@ -5736,13 +5731,13 @@
     <p:sldLayoutId id="2147483779" r:id="rId10"/>
     <p:sldLayoutId id="2147483780" r:id="rId11"/>
   </p:sldLayoutIdLst>
-  <p:transition xmlns:p14="http://schemas.microsoft.com/office/powerpoint/2010/main">
+  <p:transition>
     <p:fade/>
   </p:transition>
   <p:timing>
     <p:tnLst>
       <p:par>
-        <p:cTn xmlns:p14="http://schemas.microsoft.com/office/powerpoint/2010/main" id="1" dur="indefinite" restart="never" nodeType="tmRoot"/>
+        <p:cTn id="1" dur="indefinite" restart="never" nodeType="tmRoot"/>
       </p:par>
     </p:tnLst>
   </p:timing>
@@ -7162,448 +7157,20 @@
   <p:clrMapOvr>
     <a:masterClrMapping/>
   </p:clrMapOvr>
-  <p:transition xmlns:p14="http://schemas.microsoft.com/office/powerpoint/2010/main">
+  <p:transition>
     <p:fade/>
   </p:transition>
   <p:timing>
     <p:tnLst>
       <p:par>
-        <p:cTn xmlns:p14="http://schemas.microsoft.com/office/powerpoint/2010/main" id="1" dur="indefinite" restart="never" nodeType="tmRoot"/>
+        <p:cTn id="1" dur="indefinite" restart="never" nodeType="tmRoot"/>
       </p:par>
     </p:tnLst>
   </p:timing>
 </p:sld>
 </file>
 
-<file path=ppt/slides/slide10.xml><?xml version="1.0" encoding="utf-8"?>
-<p:sld xmlns:a="http://schemas.openxmlformats.org/drawingml/2006/main" xmlns:r="http://schemas.openxmlformats.org/officeDocument/2006/relationships" xmlns:p="http://schemas.openxmlformats.org/presentationml/2006/main">
-  <p:cSld>
-    <p:spTree>
-      <p:nvGrpSpPr>
-        <p:cNvPr id="1" name=""/>
-        <p:cNvGrpSpPr/>
-        <p:nvPr/>
-      </p:nvGrpSpPr>
-      <p:grpSpPr>
-        <a:xfrm>
-          <a:off x="0" y="0"/>
-          <a:ext cx="0" cy="0"/>
-          <a:chOff x="0" y="0"/>
-          <a:chExt cx="0" cy="0"/>
-        </a:xfrm>
-      </p:grpSpPr>
-      <p:sp>
-        <p:nvSpPr>
-          <p:cNvPr id="2" name="Title 1"/>
-          <p:cNvSpPr>
-            <a:spLocks noGrp="1"/>
-          </p:cNvSpPr>
-          <p:nvPr>
-            <p:ph type="title"/>
-          </p:nvPr>
-        </p:nvSpPr>
-        <p:spPr>
-          <a:xfrm>
-            <a:off x="381000" y="228600"/>
-            <a:ext cx="8382000" cy="769441"/>
-          </a:xfrm>
-        </p:spPr>
-        <p:txBody>
-          <a:bodyPr/>
-          <a:lstStyle/>
-          <a:p>
-            <a:r>
-              <a:rPr lang="en-US" b="1" dirty="0" smtClean="0"/>
-              <a:t>Why?</a:t>
-            </a:r>
-            <a:endParaRPr lang="en-US" b="1" dirty="0"/>
-          </a:p>
-        </p:txBody>
-      </p:sp>
-      <p:sp>
-        <p:nvSpPr>
-          <p:cNvPr id="3" name="Content Placeholder 2"/>
-          <p:cNvSpPr>
-            <a:spLocks noGrp="1"/>
-          </p:cNvSpPr>
-          <p:nvPr>
-            <p:ph idx="1"/>
-          </p:nvPr>
-        </p:nvSpPr>
-        <p:spPr>
-          <a:xfrm>
-            <a:off x="381002" y="1417639"/>
-            <a:ext cx="8410575" cy="543739"/>
-          </a:xfrm>
-        </p:spPr>
-        <p:txBody>
-          <a:bodyPr/>
-          <a:lstStyle/>
-          <a:p>
-            <a:pPr marL="0" indent="0">
-              <a:buNone/>
-            </a:pPr>
-            <a:r>
-              <a:rPr lang="en-US" dirty="0" smtClean="0"/>
-              <a:t>In this context, the </a:t>
-            </a:r>
-            <a:r>
-              <a:rPr lang="en-US" b="1" i="1" dirty="0" smtClean="0"/>
-              <a:t>client</a:t>
-            </a:r>
-            <a:r>
-              <a:rPr lang="en-US" dirty="0" smtClean="0"/>
-              <a:t> is…</a:t>
-            </a:r>
-          </a:p>
-        </p:txBody>
-      </p:sp>
-      <p:sp>
-        <p:nvSpPr>
-          <p:cNvPr id="4" name="Slide Number Placeholder 3"/>
-          <p:cNvSpPr>
-            <a:spLocks noGrp="1"/>
-          </p:cNvSpPr>
-          <p:nvPr>
-            <p:ph type="sldNum" sz="quarter" idx="10"/>
-          </p:nvPr>
-        </p:nvSpPr>
-        <p:spPr/>
-        <p:txBody>
-          <a:bodyPr/>
-          <a:lstStyle/>
-          <a:p>
-            <a:pPr>
-              <a:defRPr/>
-            </a:pPr>
-            <a:fld id="{B63753EC-566D-40B0-951D-58F31B9256E5}" type="slidenum">
-              <a:rPr lang="en-US" smtClean="0"/>
-              <a:pPr>
-                <a:defRPr/>
-              </a:pPr>
-              <a:t>10</a:t>
-            </a:fld>
-            <a:endParaRPr lang="en-US"/>
-          </a:p>
-        </p:txBody>
-      </p:sp>
-      <p:sp>
-        <p:nvSpPr>
-          <p:cNvPr id="5" name="TextBox 4"/>
-          <p:cNvSpPr txBox="1"/>
-          <p:nvPr/>
-        </p:nvSpPr>
-        <p:spPr>
-          <a:xfrm>
-            <a:off x="802278" y="2494129"/>
-            <a:ext cx="7539444" cy="1869743"/>
-          </a:xfrm>
-          <a:prstGeom prst="rect">
-            <a:avLst/>
-          </a:prstGeom>
-          <a:noFill/>
-        </p:spPr>
-        <p:txBody>
-          <a:bodyPr wrap="none" rtlCol="0">
-            <a:spAutoFit/>
-          </a:bodyPr>
-          <a:lstStyle/>
-          <a:p>
-            <a:r>
-              <a:rPr lang="en-US" sz="6000" b="1" dirty="0" smtClean="0">
-                <a:latin typeface="+mn-lt"/>
-              </a:rPr>
-              <a:t>Us</a:t>
-            </a:r>
-          </a:p>
-          <a:p>
-            <a:r>
-              <a:rPr lang="en-US" sz="6000" b="1" dirty="0" smtClean="0">
-                <a:latin typeface="+mn-lt"/>
-              </a:rPr>
-              <a:t>(software developers)</a:t>
-            </a:r>
-            <a:endParaRPr lang="en-US" sz="6000" b="1" dirty="0">
-              <a:latin typeface="+mn-lt"/>
-            </a:endParaRPr>
-          </a:p>
-        </p:txBody>
-      </p:sp>
-    </p:spTree>
-    <p:extLst>
-      <p:ext uri="{BB962C8B-B14F-4D97-AF65-F5344CB8AC3E}">
-        <p14:creationId xmlns:p14="http://schemas.microsoft.com/office/powerpoint/2010/main" val="3577876014"/>
-      </p:ext>
-    </p:extLst>
-  </p:cSld>
-  <p:clrMapOvr>
-    <a:masterClrMapping/>
-  </p:clrMapOvr>
-  <p:transition xmlns:p14="http://schemas.microsoft.com/office/powerpoint/2010/main">
-    <p:fade/>
-  </p:transition>
-  <p:timing>
-    <p:tnLst>
-      <p:par>
-        <p:cTn xmlns:p14="http://schemas.microsoft.com/office/powerpoint/2010/main" id="1" dur="indefinite" restart="never" nodeType="tmRoot"/>
-      </p:par>
-    </p:tnLst>
-  </p:timing>
-</p:sld>
-</file>
-
-<file path=ppt/slides/slide11.xml><?xml version="1.0" encoding="utf-8"?>
-<p:sld xmlns:a="http://schemas.openxmlformats.org/drawingml/2006/main" xmlns:r="http://schemas.openxmlformats.org/officeDocument/2006/relationships" xmlns:p="http://schemas.openxmlformats.org/presentationml/2006/main">
-  <p:cSld>
-    <p:spTree>
-      <p:nvGrpSpPr>
-        <p:cNvPr id="1" name=""/>
-        <p:cNvGrpSpPr/>
-        <p:nvPr/>
-      </p:nvGrpSpPr>
-      <p:grpSpPr>
-        <a:xfrm>
-          <a:off x="0" y="0"/>
-          <a:ext cx="0" cy="0"/>
-          <a:chOff x="0" y="0"/>
-          <a:chExt cx="0" cy="0"/>
-        </a:xfrm>
-      </p:grpSpPr>
-      <p:sp>
-        <p:nvSpPr>
-          <p:cNvPr id="2" name="Title 1"/>
-          <p:cNvSpPr>
-            <a:spLocks noGrp="1"/>
-          </p:cNvSpPr>
-          <p:nvPr>
-            <p:ph type="title"/>
-          </p:nvPr>
-        </p:nvSpPr>
-        <p:spPr>
-          <a:xfrm>
-            <a:off x="381000" y="228600"/>
-            <a:ext cx="8382000" cy="769441"/>
-          </a:xfrm>
-        </p:spPr>
-        <p:txBody>
-          <a:bodyPr/>
-          <a:lstStyle/>
-          <a:p>
-            <a:r>
-              <a:rPr lang="en-US" b="1" dirty="0" smtClean="0"/>
-              <a:t>How?</a:t>
-            </a:r>
-            <a:endParaRPr lang="en-US" b="1" dirty="0"/>
-          </a:p>
-        </p:txBody>
-      </p:sp>
-      <p:sp>
-        <p:nvSpPr>
-          <p:cNvPr id="3" name="Content Placeholder 2"/>
-          <p:cNvSpPr>
-            <a:spLocks noGrp="1"/>
-          </p:cNvSpPr>
-          <p:nvPr>
-            <p:ph idx="1"/>
-          </p:nvPr>
-        </p:nvSpPr>
-        <p:spPr>
-          <a:xfrm>
-            <a:off x="366713" y="3044280"/>
-            <a:ext cx="8410575" cy="769441"/>
-          </a:xfrm>
-        </p:spPr>
-        <p:txBody>
-          <a:bodyPr/>
-          <a:lstStyle/>
-          <a:p>
-            <a:pPr algn="ctr">
-              <a:buNone/>
-            </a:pPr>
-            <a:r>
-              <a:rPr lang="en-US" sz="4800" b="1" dirty="0" smtClean="0"/>
-              <a:t>Enough slides, let’s code.</a:t>
-            </a:r>
-            <a:endParaRPr lang="en-US" sz="2800" b="1" dirty="0" smtClean="0"/>
-          </a:p>
-        </p:txBody>
-      </p:sp>
-      <p:sp>
-        <p:nvSpPr>
-          <p:cNvPr id="4" name="Slide Number Placeholder 3"/>
-          <p:cNvSpPr>
-            <a:spLocks noGrp="1"/>
-          </p:cNvSpPr>
-          <p:nvPr>
-            <p:ph type="sldNum" sz="quarter" idx="10"/>
-          </p:nvPr>
-        </p:nvSpPr>
-        <p:spPr/>
-        <p:txBody>
-          <a:bodyPr/>
-          <a:lstStyle/>
-          <a:p>
-            <a:pPr>
-              <a:defRPr/>
-            </a:pPr>
-            <a:fld id="{B63753EC-566D-40B0-951D-58F31B9256E5}" type="slidenum">
-              <a:rPr lang="en-US" smtClean="0"/>
-              <a:pPr>
-                <a:defRPr/>
-              </a:pPr>
-              <a:t>11</a:t>
-            </a:fld>
-            <a:endParaRPr lang="en-US"/>
-          </a:p>
-        </p:txBody>
-      </p:sp>
-    </p:spTree>
-    <p:extLst>
-      <p:ext uri="{BB962C8B-B14F-4D97-AF65-F5344CB8AC3E}">
-        <p14:creationId xmlns:p14="http://schemas.microsoft.com/office/powerpoint/2010/main" val="2133607569"/>
-      </p:ext>
-    </p:extLst>
-  </p:cSld>
-  <p:clrMapOvr>
-    <a:masterClrMapping/>
-  </p:clrMapOvr>
-  <p:transition xmlns:p14="http://schemas.microsoft.com/office/powerpoint/2010/main">
-    <p:fade/>
-  </p:transition>
-  <p:timing>
-    <p:tnLst>
-      <p:par>
-        <p:cTn xmlns:p14="http://schemas.microsoft.com/office/powerpoint/2010/main" id="1" dur="indefinite" restart="never" nodeType="tmRoot"/>
-      </p:par>
-    </p:tnLst>
-  </p:timing>
-</p:sld>
-</file>
-
-<file path=ppt/slides/slide12.xml><?xml version="1.0" encoding="utf-8"?>
-<p:sld xmlns:a="http://schemas.openxmlformats.org/drawingml/2006/main" xmlns:r="http://schemas.openxmlformats.org/officeDocument/2006/relationships" xmlns:p="http://schemas.openxmlformats.org/presentationml/2006/main">
-  <p:cSld>
-    <p:spTree>
-      <p:nvGrpSpPr>
-        <p:cNvPr id="1" name=""/>
-        <p:cNvGrpSpPr/>
-        <p:nvPr/>
-      </p:nvGrpSpPr>
-      <p:grpSpPr>
-        <a:xfrm>
-          <a:off x="0" y="0"/>
-          <a:ext cx="0" cy="0"/>
-          <a:chOff x="0" y="0"/>
-          <a:chExt cx="0" cy="0"/>
-        </a:xfrm>
-      </p:grpSpPr>
-      <p:sp>
-        <p:nvSpPr>
-          <p:cNvPr id="2" name="Title 1"/>
-          <p:cNvSpPr>
-            <a:spLocks noGrp="1"/>
-          </p:cNvSpPr>
-          <p:nvPr>
-            <p:ph type="title"/>
-          </p:nvPr>
-        </p:nvSpPr>
-        <p:spPr>
-          <a:xfrm>
-            <a:off x="381000" y="228600"/>
-            <a:ext cx="8382000" cy="769441"/>
-          </a:xfrm>
-        </p:spPr>
-        <p:txBody>
-          <a:bodyPr/>
-          <a:lstStyle/>
-          <a:p>
-            <a:r>
-              <a:rPr lang="en-US" b="1" dirty="0" smtClean="0"/>
-              <a:t>Thanks!</a:t>
-            </a:r>
-            <a:endParaRPr lang="en-US" b="1" dirty="0"/>
-          </a:p>
-        </p:txBody>
-      </p:sp>
-      <p:sp>
-        <p:nvSpPr>
-          <p:cNvPr id="3" name="Content Placeholder 2"/>
-          <p:cNvSpPr>
-            <a:spLocks noGrp="1"/>
-          </p:cNvSpPr>
-          <p:nvPr>
-            <p:ph idx="1"/>
-          </p:nvPr>
-        </p:nvSpPr>
-        <p:spPr>
-          <a:xfrm>
-            <a:off x="366713" y="3050435"/>
-            <a:ext cx="8410575" cy="757130"/>
-          </a:xfrm>
-        </p:spPr>
-        <p:txBody>
-          <a:bodyPr/>
-          <a:lstStyle/>
-          <a:p>
-            <a:pPr algn="ctr">
-              <a:buNone/>
-            </a:pPr>
-            <a:r>
-              <a:rPr lang="en-US" sz="4800" b="1" dirty="0" smtClean="0"/>
-              <a:t>Questions?</a:t>
-            </a:r>
-            <a:endParaRPr lang="en-US" sz="2800" b="1" dirty="0" smtClean="0"/>
-          </a:p>
-        </p:txBody>
-      </p:sp>
-      <p:sp>
-        <p:nvSpPr>
-          <p:cNvPr id="4" name="Slide Number Placeholder 3"/>
-          <p:cNvSpPr>
-            <a:spLocks noGrp="1"/>
-          </p:cNvSpPr>
-          <p:nvPr>
-            <p:ph type="sldNum" sz="quarter" idx="10"/>
-          </p:nvPr>
-        </p:nvSpPr>
-        <p:spPr/>
-        <p:txBody>
-          <a:bodyPr/>
-          <a:lstStyle/>
-          <a:p>
-            <a:pPr>
-              <a:defRPr/>
-            </a:pPr>
-            <a:fld id="{B63753EC-566D-40B0-951D-58F31B9256E5}" type="slidenum">
-              <a:rPr lang="en-US" smtClean="0"/>
-              <a:pPr>
-                <a:defRPr/>
-              </a:pPr>
-              <a:t>12</a:t>
-            </a:fld>
-            <a:endParaRPr lang="en-US"/>
-          </a:p>
-        </p:txBody>
-      </p:sp>
-    </p:spTree>
-  </p:cSld>
-  <p:clrMapOvr>
-    <a:masterClrMapping/>
-  </p:clrMapOvr>
-  <p:transition xmlns:p14="http://schemas.microsoft.com/office/powerpoint/2010/main">
-    <p:fade/>
-  </p:transition>
-  <p:timing>
-    <p:tnLst>
-      <p:par>
-        <p:cTn xmlns:p14="http://schemas.microsoft.com/office/powerpoint/2010/main" id="1" dur="indefinite" restart="never" nodeType="tmRoot"/>
-      </p:par>
-    </p:tnLst>
-  </p:timing>
-</p:sld>
-</file>
-
-<file path=ppt/slides/slide13.xml><?xml version="1.0" encoding="utf-8"?>
+<file path=ppt/slides/slide2.xml><?xml version="1.0" encoding="utf-8"?>
 <p:sld xmlns:a="http://schemas.openxmlformats.org/drawingml/2006/main" xmlns:r="http://schemas.openxmlformats.org/officeDocument/2006/relationships" xmlns:p="http://schemas.openxmlformats.org/presentationml/2006/main">
   <p:cSld>
     <p:spTree>
@@ -7738,14 +7305,14 @@
               </a:ln>
               <a:effectLst/>
               <a:extLst>
-                <a:ext uri="{909E8E84-426E-40dd-AFC4-6F175D3DCCD1}">
+                <a:ext uri="{909E8E84-426E-40DD-AFC4-6F175D3DCCD1}">
                   <a14:hiddenFill xmlns:a14="http://schemas.microsoft.com/office/drawing/2010/main">
                     <a:solidFill>
                       <a:schemeClr val="accent1"/>
                     </a:solidFill>
                   </a14:hiddenFill>
                 </a:ext>
-                <a:ext uri="{91240B29-F687-4f45-9708-019B960494DF}">
+                <a:ext uri="{91240B29-F687-4F45-9708-019B960494DF}">
                   <a14:hiddenLine xmlns:a14="http://schemas.microsoft.com/office/drawing/2010/main" w="9525">
                     <a:solidFill>
                       <a:schemeClr val="tx1"/>
@@ -7755,7 +7322,7 @@
                     <a:tailEnd/>
                   </a14:hiddenLine>
                 </a:ext>
-                <a:ext uri="{AF507438-7753-43e0-B8FC-AC1667EBCBE1}">
+                <a:ext uri="{AF507438-7753-43E0-B8FC-AC1667EBCBE1}">
                   <a14:hiddenEffects xmlns:a14="http://schemas.microsoft.com/office/drawing/2010/main">
                     <a:effectLst>
                       <a:outerShdw dist="35921" dir="2700000" algn="ctr" rotWithShape="0">
@@ -7802,14 +7369,14 @@
               </a:ln>
               <a:effectLst/>
               <a:extLst>
-                <a:ext uri="{909E8E84-426E-40dd-AFC4-6F175D3DCCD1}">
+                <a:ext uri="{909E8E84-426E-40DD-AFC4-6F175D3DCCD1}">
                   <a14:hiddenFill xmlns:a14="http://schemas.microsoft.com/office/drawing/2010/main">
                     <a:solidFill>
                       <a:schemeClr val="accent1"/>
                     </a:solidFill>
                   </a14:hiddenFill>
                 </a:ext>
-                <a:ext uri="{91240B29-F687-4f45-9708-019B960494DF}">
+                <a:ext uri="{91240B29-F687-4F45-9708-019B960494DF}">
                   <a14:hiddenLine xmlns:a14="http://schemas.microsoft.com/office/drawing/2010/main" w="9525">
                     <a:solidFill>
                       <a:schemeClr val="tx1"/>
@@ -7819,7 +7386,7 @@
                     <a:tailEnd/>
                   </a14:hiddenLine>
                 </a:ext>
-                <a:ext uri="{AF507438-7753-43e0-B8FC-AC1667EBCBE1}">
+                <a:ext uri="{AF507438-7753-43E0-B8FC-AC1667EBCBE1}">
                   <a14:hiddenEffects xmlns:a14="http://schemas.microsoft.com/office/drawing/2010/main">
                     <a:effectLst>
                       <a:outerShdw dist="35921" dir="2700000" algn="ctr" rotWithShape="0">
@@ -7866,14 +7433,14 @@
               </a:ln>
               <a:effectLst/>
               <a:extLst>
-                <a:ext uri="{909E8E84-426E-40dd-AFC4-6F175D3DCCD1}">
+                <a:ext uri="{909E8E84-426E-40DD-AFC4-6F175D3DCCD1}">
                   <a14:hiddenFill xmlns:a14="http://schemas.microsoft.com/office/drawing/2010/main">
                     <a:solidFill>
                       <a:schemeClr val="accent1"/>
                     </a:solidFill>
                   </a14:hiddenFill>
                 </a:ext>
-                <a:ext uri="{91240B29-F687-4f45-9708-019B960494DF}">
+                <a:ext uri="{91240B29-F687-4F45-9708-019B960494DF}">
                   <a14:hiddenLine xmlns:a14="http://schemas.microsoft.com/office/drawing/2010/main" w="9525">
                     <a:solidFill>
                       <a:schemeClr val="tx1"/>
@@ -7883,7 +7450,7 @@
                     <a:tailEnd/>
                   </a14:hiddenLine>
                 </a:ext>
-                <a:ext uri="{AF507438-7753-43e0-B8FC-AC1667EBCBE1}">
+                <a:ext uri="{AF507438-7753-43E0-B8FC-AC1667EBCBE1}">
                   <a14:hiddenEffects xmlns:a14="http://schemas.microsoft.com/office/drawing/2010/main">
                     <a:effectLst>
                       <a:outerShdw dist="35921" dir="2700000" algn="ctr" rotWithShape="0">
@@ -7930,14 +7497,14 @@
               </a:ln>
               <a:effectLst/>
               <a:extLst>
-                <a:ext uri="{909E8E84-426E-40dd-AFC4-6F175D3DCCD1}">
+                <a:ext uri="{909E8E84-426E-40DD-AFC4-6F175D3DCCD1}">
                   <a14:hiddenFill xmlns:a14="http://schemas.microsoft.com/office/drawing/2010/main">
                     <a:solidFill>
                       <a:schemeClr val="accent1"/>
                     </a:solidFill>
                   </a14:hiddenFill>
                 </a:ext>
-                <a:ext uri="{91240B29-F687-4f45-9708-019B960494DF}">
+                <a:ext uri="{91240B29-F687-4F45-9708-019B960494DF}">
                   <a14:hiddenLine xmlns:a14="http://schemas.microsoft.com/office/drawing/2010/main" w="9525">
                     <a:solidFill>
                       <a:schemeClr val="tx1"/>
@@ -7947,7 +7514,7 @@
                     <a:tailEnd/>
                   </a14:hiddenLine>
                 </a:ext>
-                <a:ext uri="{AF507438-7753-43e0-B8FC-AC1667EBCBE1}">
+                <a:ext uri="{AF507438-7753-43E0-B8FC-AC1667EBCBE1}">
                   <a14:hiddenEffects xmlns:a14="http://schemas.microsoft.com/office/drawing/2010/main">
                     <a:effectLst>
                       <a:outerShdw dist="35921" dir="2700000" algn="ctr" rotWithShape="0">
@@ -7990,7 +7557,7 @@
               </a:prstGeom>
               <a:noFill/>
               <a:extLst>
-                <a:ext uri="{909E8E84-426E-40dd-AFC4-6F175D3DCCD1}">
+                <a:ext uri="{909E8E84-426E-40DD-AFC4-6F175D3DCCD1}">
                   <a14:hiddenFill xmlns:a14="http://schemas.microsoft.com/office/drawing/2010/main">
                     <a:solidFill>
                       <a:srgbClr val="FFFFFF"/>
@@ -8031,7 +7598,7 @@
               </a:prstGeom>
               <a:noFill/>
               <a:extLst>
-                <a:ext uri="{909E8E84-426E-40dd-AFC4-6F175D3DCCD1}">
+                <a:ext uri="{909E8E84-426E-40DD-AFC4-6F175D3DCCD1}">
                   <a14:hiddenFill xmlns:a14="http://schemas.microsoft.com/office/drawing/2010/main">
                     <a:solidFill>
                       <a:srgbClr val="FFFFFF"/>
@@ -8231,7 +7798,7 @@
               </a:prstGeom>
               <a:noFill/>
               <a:extLst>
-                <a:ext uri="{909E8E84-426E-40dd-AFC4-6F175D3DCCD1}">
+                <a:ext uri="{909E8E84-426E-40DD-AFC4-6F175D3DCCD1}">
                   <a14:hiddenFill xmlns:a14="http://schemas.microsoft.com/office/drawing/2010/main">
                     <a:solidFill>
                       <a:srgbClr val="FFFFFF"/>
@@ -8272,7 +7839,7 @@
               </a:prstGeom>
               <a:noFill/>
               <a:extLst>
-                <a:ext uri="{909E8E84-426E-40dd-AFC4-6F175D3DCCD1}">
+                <a:ext uri="{909E8E84-426E-40DD-AFC4-6F175D3DCCD1}">
                   <a14:hiddenFill xmlns:a14="http://schemas.microsoft.com/office/drawing/2010/main">
                     <a:solidFill>
                       <a:srgbClr val="FFFFFF"/>
@@ -8313,7 +7880,7 @@
               </a:prstGeom>
               <a:noFill/>
               <a:extLst>
-                <a:ext uri="{909E8E84-426E-40dd-AFC4-6F175D3DCCD1}">
+                <a:ext uri="{909E8E84-426E-40DD-AFC4-6F175D3DCCD1}">
                   <a14:hiddenFill xmlns:a14="http://schemas.microsoft.com/office/drawing/2010/main">
                     <a:solidFill>
                       <a:srgbClr val="FFFFFF"/>
@@ -8354,7 +7921,7 @@
               </a:prstGeom>
               <a:noFill/>
               <a:extLst>
-                <a:ext uri="{909E8E84-426E-40dd-AFC4-6F175D3DCCD1}">
+                <a:ext uri="{909E8E84-426E-40DD-AFC4-6F175D3DCCD1}">
                   <a14:hiddenFill xmlns:a14="http://schemas.microsoft.com/office/drawing/2010/main">
                     <a:solidFill>
                       <a:srgbClr val="FFFFFF"/>
@@ -8395,7 +7962,7 @@
               </a:prstGeom>
               <a:noFill/>
               <a:extLst>
-                <a:ext uri="{909E8E84-426E-40dd-AFC4-6F175D3DCCD1}">
+                <a:ext uri="{909E8E84-426E-40DD-AFC4-6F175D3DCCD1}">
                   <a14:hiddenFill xmlns:a14="http://schemas.microsoft.com/office/drawing/2010/main">
                     <a:solidFill>
                       <a:srgbClr val="FFFFFF"/>
@@ -8595,7 +8162,7 @@
               </a:prstGeom>
               <a:noFill/>
               <a:extLst>
-                <a:ext uri="{909E8E84-426E-40dd-AFC4-6F175D3DCCD1}">
+                <a:ext uri="{909E8E84-426E-40DD-AFC4-6F175D3DCCD1}">
                   <a14:hiddenFill xmlns:a14="http://schemas.microsoft.com/office/drawing/2010/main">
                     <a:solidFill>
                       <a:srgbClr val="FFFFFF"/>
@@ -8636,7 +8203,7 @@
               </a:prstGeom>
               <a:noFill/>
               <a:extLst>
-                <a:ext uri="{909E8E84-426E-40dd-AFC4-6F175D3DCCD1}">
+                <a:ext uri="{909E8E84-426E-40DD-AFC4-6F175D3DCCD1}">
                   <a14:hiddenFill xmlns:a14="http://schemas.microsoft.com/office/drawing/2010/main">
                     <a:solidFill>
                       <a:srgbClr val="FFFFFF"/>
@@ -8677,7 +8244,7 @@
               </a:prstGeom>
               <a:noFill/>
               <a:extLst>
-                <a:ext uri="{909E8E84-426E-40dd-AFC4-6F175D3DCCD1}">
+                <a:ext uri="{909E8E84-426E-40DD-AFC4-6F175D3DCCD1}">
                   <a14:hiddenFill xmlns:a14="http://schemas.microsoft.com/office/drawing/2010/main">
                     <a:solidFill>
                       <a:srgbClr val="FFFFFF"/>
@@ -8718,7 +8285,7 @@
               </a:prstGeom>
               <a:noFill/>
               <a:extLst>
-                <a:ext uri="{909E8E84-426E-40dd-AFC4-6F175D3DCCD1}">
+                <a:ext uri="{909E8E84-426E-40DD-AFC4-6F175D3DCCD1}">
                   <a14:hiddenFill xmlns:a14="http://schemas.microsoft.com/office/drawing/2010/main">
                     <a:solidFill>
                       <a:srgbClr val="FFFFFF"/>
@@ -8759,7 +8326,7 @@
               </a:prstGeom>
               <a:noFill/>
               <a:extLst>
-                <a:ext uri="{909E8E84-426E-40dd-AFC4-6F175D3DCCD1}">
+                <a:ext uri="{909E8E84-426E-40DD-AFC4-6F175D3DCCD1}">
                   <a14:hiddenFill xmlns:a14="http://schemas.microsoft.com/office/drawing/2010/main">
                     <a:solidFill>
                       <a:srgbClr val="FFFFFF"/>
@@ -8800,7 +8367,7 @@
               </a:prstGeom>
               <a:noFill/>
               <a:extLst>
-                <a:ext uri="{909E8E84-426E-40dd-AFC4-6F175D3DCCD1}">
+                <a:ext uri="{909E8E84-426E-40DD-AFC4-6F175D3DCCD1}">
                   <a14:hiddenFill xmlns:a14="http://schemas.microsoft.com/office/drawing/2010/main">
                     <a:solidFill>
                       <a:srgbClr val="FFFFFF"/>
@@ -8841,7 +8408,7 @@
               </a:prstGeom>
               <a:noFill/>
               <a:extLst>
-                <a:ext uri="{909E8E84-426E-40dd-AFC4-6F175D3DCCD1}">
+                <a:ext uri="{909E8E84-426E-40DD-AFC4-6F175D3DCCD1}">
                   <a14:hiddenFill xmlns:a14="http://schemas.microsoft.com/office/drawing/2010/main">
                     <a:solidFill>
                       <a:srgbClr val="FFFFFF"/>
@@ -8882,7 +8449,7 @@
               </a:prstGeom>
               <a:noFill/>
               <a:extLst>
-                <a:ext uri="{909E8E84-426E-40dd-AFC4-6F175D3DCCD1}">
+                <a:ext uri="{909E8E84-426E-40DD-AFC4-6F175D3DCCD1}">
                   <a14:hiddenFill xmlns:a14="http://schemas.microsoft.com/office/drawing/2010/main">
                     <a:solidFill>
                       <a:srgbClr val="FFFFFF"/>
@@ -8923,7 +8490,7 @@
               </a:prstGeom>
               <a:noFill/>
               <a:extLst>
-                <a:ext uri="{909E8E84-426E-40dd-AFC4-6F175D3DCCD1}">
+                <a:ext uri="{909E8E84-426E-40DD-AFC4-6F175D3DCCD1}">
                   <a14:hiddenFill xmlns:a14="http://schemas.microsoft.com/office/drawing/2010/main">
                     <a:solidFill>
                       <a:srgbClr val="FFFFFF"/>
@@ -8964,7 +8531,7 @@
               </a:prstGeom>
               <a:noFill/>
               <a:extLst>
-                <a:ext uri="{909E8E84-426E-40dd-AFC4-6F175D3DCCD1}">
+                <a:ext uri="{909E8E84-426E-40DD-AFC4-6F175D3DCCD1}">
                   <a14:hiddenFill xmlns:a14="http://schemas.microsoft.com/office/drawing/2010/main">
                     <a:solidFill>
                       <a:srgbClr val="FFFFFF"/>
@@ -9005,7 +8572,7 @@
               </a:prstGeom>
               <a:noFill/>
               <a:extLst>
-                <a:ext uri="{909E8E84-426E-40dd-AFC4-6F175D3DCCD1}">
+                <a:ext uri="{909E8E84-426E-40DD-AFC4-6F175D3DCCD1}">
                   <a14:hiddenFill xmlns:a14="http://schemas.microsoft.com/office/drawing/2010/main">
                     <a:solidFill>
                       <a:srgbClr val="FFFFFF"/>
@@ -9046,7 +8613,7 @@
               </a:prstGeom>
               <a:noFill/>
               <a:extLst>
-                <a:ext uri="{909E8E84-426E-40dd-AFC4-6F175D3DCCD1}">
+                <a:ext uri="{909E8E84-426E-40DD-AFC4-6F175D3DCCD1}">
                   <a14:hiddenFill xmlns:a14="http://schemas.microsoft.com/office/drawing/2010/main">
                     <a:solidFill>
                       <a:srgbClr val="FFFFFF"/>
@@ -9087,7 +8654,7 @@
               </a:prstGeom>
               <a:noFill/>
               <a:extLst>
-                <a:ext uri="{909E8E84-426E-40dd-AFC4-6F175D3DCCD1}">
+                <a:ext uri="{909E8E84-426E-40DD-AFC4-6F175D3DCCD1}">
                   <a14:hiddenFill xmlns:a14="http://schemas.microsoft.com/office/drawing/2010/main">
                     <a:solidFill>
                       <a:srgbClr val="FFFFFF"/>
@@ -9128,7 +8695,7 @@
               </a:prstGeom>
               <a:noFill/>
               <a:extLst>
-                <a:ext uri="{909E8E84-426E-40dd-AFC4-6F175D3DCCD1}">
+                <a:ext uri="{909E8E84-426E-40DD-AFC4-6F175D3DCCD1}">
                   <a14:hiddenFill xmlns:a14="http://schemas.microsoft.com/office/drawing/2010/main">
                     <a:solidFill>
                       <a:srgbClr val="FFFFFF"/>
@@ -9169,7 +8736,7 @@
               </a:prstGeom>
               <a:noFill/>
               <a:extLst>
-                <a:ext uri="{909E8E84-426E-40dd-AFC4-6F175D3DCCD1}">
+                <a:ext uri="{909E8E84-426E-40DD-AFC4-6F175D3DCCD1}">
                   <a14:hiddenFill xmlns:a14="http://schemas.microsoft.com/office/drawing/2010/main">
                     <a:solidFill>
                       <a:srgbClr val="FFFFFF"/>
@@ -9210,7 +8777,7 @@
               </a:prstGeom>
               <a:noFill/>
               <a:extLst>
-                <a:ext uri="{909E8E84-426E-40dd-AFC4-6F175D3DCCD1}">
+                <a:ext uri="{909E8E84-426E-40DD-AFC4-6F175D3DCCD1}">
                   <a14:hiddenFill xmlns:a14="http://schemas.microsoft.com/office/drawing/2010/main">
                     <a:solidFill>
                       <a:srgbClr val="FFFFFF"/>
@@ -9251,7 +8818,7 @@
               </a:prstGeom>
               <a:noFill/>
               <a:extLst>
-                <a:ext uri="{909E8E84-426E-40dd-AFC4-6F175D3DCCD1}">
+                <a:ext uri="{909E8E84-426E-40DD-AFC4-6F175D3DCCD1}">
                   <a14:hiddenFill xmlns:a14="http://schemas.microsoft.com/office/drawing/2010/main">
                     <a:solidFill>
                       <a:srgbClr val="FFFFFF"/>
@@ -9292,7 +8859,7 @@
               </a:prstGeom>
               <a:noFill/>
               <a:extLst>
-                <a:ext uri="{909E8E84-426E-40dd-AFC4-6F175D3DCCD1}">
+                <a:ext uri="{909E8E84-426E-40DD-AFC4-6F175D3DCCD1}">
                   <a14:hiddenFill xmlns:a14="http://schemas.microsoft.com/office/drawing/2010/main">
                     <a:solidFill>
                       <a:srgbClr val="FFFFFF"/>
@@ -9422,7 +8989,7 @@
               </a:prstGeom>
               <a:noFill/>
               <a:extLst>
-                <a:ext uri="{909E8E84-426E-40dd-AFC4-6F175D3DCCD1}">
+                <a:ext uri="{909E8E84-426E-40DD-AFC4-6F175D3DCCD1}">
                   <a14:hiddenFill xmlns:a14="http://schemas.microsoft.com/office/drawing/2010/main">
                     <a:solidFill>
                       <a:srgbClr val="FFFFFF"/>
@@ -9463,7 +9030,7 @@
               </a:prstGeom>
               <a:noFill/>
               <a:extLst>
-                <a:ext uri="{909E8E84-426E-40dd-AFC4-6F175D3DCCD1}">
+                <a:ext uri="{909E8E84-426E-40DD-AFC4-6F175D3DCCD1}">
                   <a14:hiddenFill xmlns:a14="http://schemas.microsoft.com/office/drawing/2010/main">
                     <a:solidFill>
                       <a:srgbClr val="FFFFFF"/>
@@ -9504,7 +9071,7 @@
               </a:prstGeom>
               <a:noFill/>
               <a:extLst>
-                <a:ext uri="{909E8E84-426E-40dd-AFC4-6F175D3DCCD1}">
+                <a:ext uri="{909E8E84-426E-40DD-AFC4-6F175D3DCCD1}">
                   <a14:hiddenFill xmlns:a14="http://schemas.microsoft.com/office/drawing/2010/main">
                     <a:solidFill>
                       <a:srgbClr val="FFFFFF"/>
@@ -9545,7 +9112,7 @@
               </a:prstGeom>
               <a:noFill/>
               <a:extLst>
-                <a:ext uri="{909E8E84-426E-40dd-AFC4-6F175D3DCCD1}">
+                <a:ext uri="{909E8E84-426E-40DD-AFC4-6F175D3DCCD1}">
                   <a14:hiddenFill xmlns:a14="http://schemas.microsoft.com/office/drawing/2010/main">
                     <a:solidFill>
                       <a:srgbClr val="FFFFFF"/>
@@ -9586,7 +9153,7 @@
               </a:prstGeom>
               <a:noFill/>
               <a:extLst>
-                <a:ext uri="{909E8E84-426E-40dd-AFC4-6F175D3DCCD1}">
+                <a:ext uri="{909E8E84-426E-40DD-AFC4-6F175D3DCCD1}">
                   <a14:hiddenFill xmlns:a14="http://schemas.microsoft.com/office/drawing/2010/main">
                     <a:solidFill>
                       <a:srgbClr val="FFFFFF"/>
@@ -9627,7 +9194,7 @@
               </a:prstGeom>
               <a:noFill/>
               <a:extLst>
-                <a:ext uri="{909E8E84-426E-40dd-AFC4-6F175D3DCCD1}">
+                <a:ext uri="{909E8E84-426E-40DD-AFC4-6F175D3DCCD1}">
                   <a14:hiddenFill xmlns:a14="http://schemas.microsoft.com/office/drawing/2010/main">
                     <a:solidFill>
                       <a:srgbClr val="FFFFFF"/>
@@ -9668,7 +9235,7 @@
               </a:prstGeom>
               <a:noFill/>
               <a:extLst>
-                <a:ext uri="{909E8E84-426E-40dd-AFC4-6F175D3DCCD1}">
+                <a:ext uri="{909E8E84-426E-40DD-AFC4-6F175D3DCCD1}">
                   <a14:hiddenFill xmlns:a14="http://schemas.microsoft.com/office/drawing/2010/main">
                     <a:solidFill>
                       <a:srgbClr val="FFFFFF"/>
@@ -9709,7 +9276,7 @@
               </a:prstGeom>
               <a:noFill/>
               <a:extLst>
-                <a:ext uri="{909E8E84-426E-40dd-AFC4-6F175D3DCCD1}">
+                <a:ext uri="{909E8E84-426E-40DD-AFC4-6F175D3DCCD1}">
                   <a14:hiddenFill xmlns:a14="http://schemas.microsoft.com/office/drawing/2010/main">
                     <a:solidFill>
                       <a:srgbClr val="FFFFFF"/>
@@ -9750,7 +9317,7 @@
               </a:prstGeom>
               <a:noFill/>
               <a:extLst>
-                <a:ext uri="{909E8E84-426E-40dd-AFC4-6F175D3DCCD1}">
+                <a:ext uri="{909E8E84-426E-40DD-AFC4-6F175D3DCCD1}">
                   <a14:hiddenFill xmlns:a14="http://schemas.microsoft.com/office/drawing/2010/main">
                     <a:solidFill>
                       <a:srgbClr val="FFFFFF"/>
@@ -9791,7 +9358,7 @@
               </a:prstGeom>
               <a:noFill/>
               <a:extLst>
-                <a:ext uri="{909E8E84-426E-40dd-AFC4-6F175D3DCCD1}">
+                <a:ext uri="{909E8E84-426E-40DD-AFC4-6F175D3DCCD1}">
                   <a14:hiddenFill xmlns:a14="http://schemas.microsoft.com/office/drawing/2010/main">
                     <a:solidFill>
                       <a:srgbClr val="FFFFFF"/>
@@ -9806,27 +9373,919 @@
     </p:spTree>
     <p:extLst>
       <p:ext uri="{BB962C8B-B14F-4D97-AF65-F5344CB8AC3E}">
-        <p14:creationId xmlns:p14="http://schemas.microsoft.com/office/powerpoint/2010/main" val="2645147776"/>
+        <p14:creationId xmlns:p14="http://schemas.microsoft.com/office/powerpoint/2010/main" val="618298298"/>
       </p:ext>
     </p:extLst>
   </p:cSld>
   <p:clrMapOvr>
     <a:masterClrMapping/>
   </p:clrMapOvr>
-  <p:transition xmlns:p14="http://schemas.microsoft.com/office/powerpoint/2010/main">
+  <p:transition>
     <p:fade/>
   </p:transition>
   <p:timing>
     <p:tnLst>
       <p:par>
-        <p:cTn xmlns:p14="http://schemas.microsoft.com/office/powerpoint/2010/main" id="1" dur="indefinite" restart="never" nodeType="tmRoot"/>
+        <p:cTn id="1" dur="indefinite" restart="never" nodeType="tmRoot"/>
       </p:par>
     </p:tnLst>
   </p:timing>
 </p:sld>
 </file>
 
-<file path=ppt/slides/slide2.xml><?xml version="1.0" encoding="utf-8"?>
+<file path=ppt/slides/slide3.xml><?xml version="1.0" encoding="utf-8"?>
+<p:sld xmlns:a="http://schemas.openxmlformats.org/drawingml/2006/main" xmlns:r="http://schemas.openxmlformats.org/officeDocument/2006/relationships" xmlns:p="http://schemas.openxmlformats.org/presentationml/2006/main">
+  <p:cSld>
+    <p:spTree>
+      <p:nvGrpSpPr>
+        <p:cNvPr id="1" name=""/>
+        <p:cNvGrpSpPr/>
+        <p:nvPr/>
+      </p:nvGrpSpPr>
+      <p:grpSpPr>
+        <a:xfrm>
+          <a:off x="0" y="0"/>
+          <a:ext cx="0" cy="0"/>
+          <a:chOff x="0" y="0"/>
+          <a:chExt cx="0" cy="0"/>
+        </a:xfrm>
+      </p:grpSpPr>
+      <p:sp>
+        <p:nvSpPr>
+          <p:cNvPr id="2" name="Title 1"/>
+          <p:cNvSpPr>
+            <a:spLocks noGrp="1"/>
+          </p:cNvSpPr>
+          <p:nvPr>
+            <p:ph type="title"/>
+          </p:nvPr>
+        </p:nvSpPr>
+        <p:spPr>
+          <a:xfrm>
+            <a:off x="381000" y="228600"/>
+            <a:ext cx="8382000" cy="769441"/>
+          </a:xfrm>
+        </p:spPr>
+        <p:txBody>
+          <a:bodyPr/>
+          <a:lstStyle/>
+          <a:p>
+            <a:r>
+              <a:rPr lang="en-US" b="1" dirty="0" smtClean="0"/>
+              <a:t>Goal</a:t>
+            </a:r>
+            <a:endParaRPr lang="en-US" b="1" dirty="0"/>
+          </a:p>
+        </p:txBody>
+      </p:sp>
+      <p:sp>
+        <p:nvSpPr>
+          <p:cNvPr id="3" name="Content Placeholder 2"/>
+          <p:cNvSpPr>
+            <a:spLocks noGrp="1"/>
+          </p:cNvSpPr>
+          <p:nvPr>
+            <p:ph idx="1"/>
+          </p:nvPr>
+        </p:nvSpPr>
+        <p:spPr>
+          <a:xfrm>
+            <a:off x="366713" y="2196868"/>
+            <a:ext cx="8410575" cy="2464264"/>
+          </a:xfrm>
+        </p:spPr>
+        <p:txBody>
+          <a:bodyPr/>
+          <a:lstStyle/>
+          <a:p>
+            <a:pPr marL="0" indent="0">
+              <a:buNone/>
+            </a:pPr>
+            <a:r>
+              <a:rPr lang="en-US" b="1" i="1" dirty="0" smtClean="0"/>
+              <a:t>For you to gain a different understanding on how you can use </a:t>
+            </a:r>
+            <a:r>
+              <a:rPr lang="en-US" b="1" i="1" dirty="0" err="1" smtClean="0"/>
+              <a:t>NuGet</a:t>
+            </a:r>
+            <a:r>
+              <a:rPr lang="en-US" b="1" i="1" dirty="0" smtClean="0"/>
+              <a:t> to your development efforts easier.</a:t>
+            </a:r>
+          </a:p>
+          <a:p>
+            <a:pPr marL="0" indent="0">
+              <a:buNone/>
+            </a:pPr>
+            <a:r>
+              <a:rPr lang="en-US" b="1" i="1" dirty="0" smtClean="0"/>
+              <a:t>Start thinking of </a:t>
+            </a:r>
+            <a:r>
+              <a:rPr lang="en-US" b="1" i="1" dirty="0" err="1" smtClean="0"/>
+              <a:t>NuGet</a:t>
+            </a:r>
+            <a:r>
+              <a:rPr lang="en-US" b="1" i="1" dirty="0" smtClean="0"/>
+              <a:t> as a protocol rather than a tool…</a:t>
+            </a:r>
+          </a:p>
+        </p:txBody>
+      </p:sp>
+      <p:sp>
+        <p:nvSpPr>
+          <p:cNvPr id="4" name="Slide Number Placeholder 3"/>
+          <p:cNvSpPr>
+            <a:spLocks noGrp="1"/>
+          </p:cNvSpPr>
+          <p:nvPr>
+            <p:ph type="sldNum" sz="quarter" idx="10"/>
+          </p:nvPr>
+        </p:nvSpPr>
+        <p:spPr/>
+        <p:txBody>
+          <a:bodyPr/>
+          <a:lstStyle/>
+          <a:p>
+            <a:pPr>
+              <a:defRPr/>
+            </a:pPr>
+            <a:fld id="{B63753EC-566D-40B0-951D-58F31B9256E5}" type="slidenum">
+              <a:rPr lang="en-US" smtClean="0"/>
+              <a:pPr>
+                <a:defRPr/>
+              </a:pPr>
+              <a:t>3</a:t>
+            </a:fld>
+            <a:endParaRPr lang="en-US"/>
+          </a:p>
+        </p:txBody>
+      </p:sp>
+    </p:spTree>
+  </p:cSld>
+  <p:clrMapOvr>
+    <a:masterClrMapping/>
+  </p:clrMapOvr>
+  <p:transition>
+    <p:fade/>
+  </p:transition>
+  <p:timing>
+    <p:tnLst>
+      <p:par>
+        <p:cTn id="1" dur="indefinite" restart="never" nodeType="tmRoot"/>
+      </p:par>
+    </p:tnLst>
+  </p:timing>
+</p:sld>
+</file>
+
+<file path=ppt/slides/slide4.xml><?xml version="1.0" encoding="utf-8"?>
+<p:sld xmlns:a="http://schemas.openxmlformats.org/drawingml/2006/main" xmlns:r="http://schemas.openxmlformats.org/officeDocument/2006/relationships" xmlns:p="http://schemas.openxmlformats.org/presentationml/2006/main">
+  <p:cSld>
+    <p:spTree>
+      <p:nvGrpSpPr>
+        <p:cNvPr id="1" name=""/>
+        <p:cNvGrpSpPr/>
+        <p:nvPr/>
+      </p:nvGrpSpPr>
+      <p:grpSpPr>
+        <a:xfrm>
+          <a:off x="0" y="0"/>
+          <a:ext cx="0" cy="0"/>
+          <a:chOff x="0" y="0"/>
+          <a:chExt cx="0" cy="0"/>
+        </a:xfrm>
+      </p:grpSpPr>
+      <p:sp>
+        <p:nvSpPr>
+          <p:cNvPr id="2" name="Title 1"/>
+          <p:cNvSpPr>
+            <a:spLocks noGrp="1"/>
+          </p:cNvSpPr>
+          <p:nvPr>
+            <p:ph type="title"/>
+          </p:nvPr>
+        </p:nvSpPr>
+        <p:spPr/>
+        <p:txBody>
+          <a:bodyPr/>
+          <a:lstStyle/>
+          <a:p>
+            <a:r>
+              <a:rPr lang="en-US" b="1" dirty="0" smtClean="0"/>
+              <a:t>Agenda</a:t>
+            </a:r>
+            <a:endParaRPr lang="en-US" b="1" dirty="0"/>
+          </a:p>
+        </p:txBody>
+      </p:sp>
+      <p:sp>
+        <p:nvSpPr>
+          <p:cNvPr id="3" name="Content Placeholder 2"/>
+          <p:cNvSpPr>
+            <a:spLocks noGrp="1"/>
+          </p:cNvSpPr>
+          <p:nvPr>
+            <p:ph idx="1"/>
+          </p:nvPr>
+        </p:nvSpPr>
+        <p:spPr>
+          <a:xfrm>
+            <a:off x="381002" y="1417638"/>
+            <a:ext cx="8410575" cy="1134670"/>
+          </a:xfrm>
+        </p:spPr>
+        <p:txBody>
+          <a:bodyPr/>
+          <a:lstStyle/>
+          <a:p>
+            <a:r>
+              <a:rPr lang="en-US" dirty="0" smtClean="0"/>
+              <a:t>Why?</a:t>
+            </a:r>
+          </a:p>
+          <a:p>
+            <a:r>
+              <a:rPr lang="en-US" dirty="0" smtClean="0"/>
+              <a:t>How?</a:t>
+            </a:r>
+          </a:p>
+        </p:txBody>
+      </p:sp>
+      <p:sp>
+        <p:nvSpPr>
+          <p:cNvPr id="4" name="Slide Number Placeholder 3"/>
+          <p:cNvSpPr>
+            <a:spLocks noGrp="1"/>
+          </p:cNvSpPr>
+          <p:nvPr>
+            <p:ph type="sldNum" sz="quarter" idx="10"/>
+          </p:nvPr>
+        </p:nvSpPr>
+        <p:spPr/>
+        <p:txBody>
+          <a:bodyPr/>
+          <a:lstStyle/>
+          <a:p>
+            <a:pPr>
+              <a:defRPr/>
+            </a:pPr>
+            <a:fld id="{B63753EC-566D-40B0-951D-58F31B9256E5}" type="slidenum">
+              <a:rPr lang="en-US" smtClean="0"/>
+              <a:pPr>
+                <a:defRPr/>
+              </a:pPr>
+              <a:t>4</a:t>
+            </a:fld>
+            <a:endParaRPr lang="en-US"/>
+          </a:p>
+        </p:txBody>
+      </p:sp>
+    </p:spTree>
+    <p:extLst>
+      <p:ext uri="{BB962C8B-B14F-4D97-AF65-F5344CB8AC3E}">
+        <p14:creationId xmlns:p14="http://schemas.microsoft.com/office/powerpoint/2010/main" val="694831055"/>
+      </p:ext>
+    </p:extLst>
+  </p:cSld>
+  <p:clrMapOvr>
+    <a:masterClrMapping/>
+  </p:clrMapOvr>
+  <p:transition>
+    <p:fade/>
+  </p:transition>
+  <p:timing>
+    <p:tnLst>
+      <p:par>
+        <p:cTn id="1" dur="indefinite" restart="never" nodeType="tmRoot"/>
+      </p:par>
+    </p:tnLst>
+  </p:timing>
+</p:sld>
+</file>
+
+<file path=ppt/slides/slide5.xml><?xml version="1.0" encoding="utf-8"?>
+<p:sld xmlns:a="http://schemas.openxmlformats.org/drawingml/2006/main" xmlns:r="http://schemas.openxmlformats.org/officeDocument/2006/relationships" xmlns:p="http://schemas.openxmlformats.org/presentationml/2006/main">
+  <p:cSld>
+    <p:spTree>
+      <p:nvGrpSpPr>
+        <p:cNvPr id="1" name=""/>
+        <p:cNvGrpSpPr/>
+        <p:nvPr/>
+      </p:nvGrpSpPr>
+      <p:grpSpPr>
+        <a:xfrm>
+          <a:off x="0" y="0"/>
+          <a:ext cx="0" cy="0"/>
+          <a:chOff x="0" y="0"/>
+          <a:chExt cx="0" cy="0"/>
+        </a:xfrm>
+      </p:grpSpPr>
+      <p:sp>
+        <p:nvSpPr>
+          <p:cNvPr id="2" name="Title 1"/>
+          <p:cNvSpPr>
+            <a:spLocks noGrp="1"/>
+          </p:cNvSpPr>
+          <p:nvPr>
+            <p:ph type="title"/>
+          </p:nvPr>
+        </p:nvSpPr>
+        <p:spPr/>
+        <p:txBody>
+          <a:bodyPr/>
+          <a:lstStyle/>
+          <a:p>
+            <a:r>
+              <a:rPr lang="en-US" b="1" dirty="0" smtClean="0"/>
+              <a:t>Info</a:t>
+            </a:r>
+            <a:endParaRPr lang="en-US" b="1" dirty="0"/>
+          </a:p>
+        </p:txBody>
+      </p:sp>
+      <p:sp>
+        <p:nvSpPr>
+          <p:cNvPr id="3" name="Content Placeholder 2"/>
+          <p:cNvSpPr>
+            <a:spLocks noGrp="1"/>
+          </p:cNvSpPr>
+          <p:nvPr>
+            <p:ph idx="1"/>
+          </p:nvPr>
+        </p:nvSpPr>
+        <p:spPr>
+          <a:xfrm>
+            <a:off x="381002" y="1417638"/>
+            <a:ext cx="8410575" cy="1725601"/>
+          </a:xfrm>
+        </p:spPr>
+        <p:txBody>
+          <a:bodyPr/>
+          <a:lstStyle/>
+          <a:p>
+            <a:pPr marL="0" indent="0">
+              <a:buNone/>
+            </a:pPr>
+            <a:r>
+              <a:rPr lang="en-US" b="1" dirty="0" smtClean="0"/>
+              <a:t>javier@lozanotek.com</a:t>
+            </a:r>
+          </a:p>
+          <a:p>
+            <a:pPr marL="0" indent="0">
+              <a:buNone/>
+            </a:pPr>
+            <a:r>
+              <a:rPr lang="en-US" b="1" dirty="0" smtClean="0"/>
+              <a:t>@jglozano</a:t>
+            </a:r>
+          </a:p>
+          <a:p>
+            <a:pPr marL="0" indent="0">
+              <a:buNone/>
+            </a:pPr>
+            <a:r>
+              <a:rPr lang="en-US" b="1" dirty="0" smtClean="0">
+                <a:hlinkClick r:id="rId2"/>
+              </a:rPr>
+              <a:t>http://lozanotek.com/blog</a:t>
+            </a:r>
+            <a:endParaRPr lang="en-US" b="1" dirty="0" smtClean="0"/>
+          </a:p>
+        </p:txBody>
+      </p:sp>
+      <p:sp>
+        <p:nvSpPr>
+          <p:cNvPr id="4" name="Slide Number Placeholder 3"/>
+          <p:cNvSpPr>
+            <a:spLocks noGrp="1"/>
+          </p:cNvSpPr>
+          <p:nvPr>
+            <p:ph type="sldNum" sz="quarter" idx="10"/>
+          </p:nvPr>
+        </p:nvSpPr>
+        <p:spPr/>
+        <p:txBody>
+          <a:bodyPr/>
+          <a:lstStyle/>
+          <a:p>
+            <a:pPr>
+              <a:defRPr/>
+            </a:pPr>
+            <a:fld id="{B63753EC-566D-40B0-951D-58F31B9256E5}" type="slidenum">
+              <a:rPr lang="en-US" smtClean="0"/>
+              <a:pPr>
+                <a:defRPr/>
+              </a:pPr>
+              <a:t>5</a:t>
+            </a:fld>
+            <a:endParaRPr lang="en-US"/>
+          </a:p>
+        </p:txBody>
+      </p:sp>
+      <p:pic>
+        <p:nvPicPr>
+          <p:cNvPr id="5" name="Picture 2" descr="C:\Users\javier\Pictures\mvp_logo.jpg"/>
+          <p:cNvPicPr>
+            <a:picLocks noChangeAspect="1" noChangeArrowheads="1"/>
+          </p:cNvPicPr>
+          <p:nvPr/>
+        </p:nvPicPr>
+        <p:blipFill>
+          <a:blip r:embed="rId3" cstate="print"/>
+          <a:srcRect/>
+          <a:stretch>
+            <a:fillRect/>
+          </a:stretch>
+        </p:blipFill>
+        <p:spPr bwMode="auto">
+          <a:xfrm>
+            <a:off x="6108700" y="1617683"/>
+            <a:ext cx="2133600" cy="863600"/>
+          </a:xfrm>
+          <a:prstGeom prst="rect">
+            <a:avLst/>
+          </a:prstGeom>
+          <a:noFill/>
+          <a:ln w="9525">
+            <a:noFill/>
+            <a:miter lim="800000"/>
+            <a:headEnd/>
+            <a:tailEnd/>
+          </a:ln>
+        </p:spPr>
+      </p:pic>
+      <p:pic>
+        <p:nvPicPr>
+          <p:cNvPr id="6" name="Picture 3" descr="C:\Users\javier\Pictures\aspinsiders_logo.gif"/>
+          <p:cNvPicPr>
+            <a:picLocks noChangeAspect="1" noChangeArrowheads="1"/>
+          </p:cNvPicPr>
+          <p:nvPr/>
+        </p:nvPicPr>
+        <p:blipFill>
+          <a:blip r:embed="rId4" cstate="print"/>
+          <a:srcRect/>
+          <a:stretch>
+            <a:fillRect/>
+          </a:stretch>
+        </p:blipFill>
+        <p:spPr bwMode="auto">
+          <a:xfrm>
+            <a:off x="6337300" y="525483"/>
+            <a:ext cx="1905000" cy="685800"/>
+          </a:xfrm>
+          <a:prstGeom prst="rect">
+            <a:avLst/>
+          </a:prstGeom>
+          <a:noFill/>
+          <a:ln w="9525">
+            <a:noFill/>
+            <a:miter lim="800000"/>
+            <a:headEnd/>
+            <a:tailEnd/>
+          </a:ln>
+        </p:spPr>
+      </p:pic>
+      <p:sp>
+        <p:nvSpPr>
+          <p:cNvPr id="7" name="TextBox 6"/>
+          <p:cNvSpPr txBox="1"/>
+          <p:nvPr/>
+        </p:nvSpPr>
+        <p:spPr>
+          <a:xfrm>
+            <a:off x="304800" y="4919990"/>
+            <a:ext cx="8557351" cy="523220"/>
+          </a:xfrm>
+          <a:prstGeom prst="rect">
+            <a:avLst/>
+          </a:prstGeom>
+          <a:noFill/>
+        </p:spPr>
+        <p:txBody>
+          <a:bodyPr wrap="none" rtlCol="0">
+            <a:spAutoFit/>
+          </a:bodyPr>
+          <a:lstStyle/>
+          <a:p>
+            <a:r>
+              <a:rPr lang="en-US" sz="3200" dirty="0" smtClean="0">
+                <a:latin typeface="+mn-lt"/>
+              </a:rPr>
+              <a:t>https:</a:t>
+            </a:r>
+            <a:r>
+              <a:rPr lang="en-US" sz="3200" dirty="0">
+                <a:latin typeface="+mn-lt"/>
+              </a:rPr>
+              <a:t>//</a:t>
+            </a:r>
+            <a:r>
+              <a:rPr lang="en-US" sz="3200" dirty="0" err="1">
+                <a:latin typeface="+mn-lt"/>
+              </a:rPr>
+              <a:t>github.com</a:t>
+            </a:r>
+            <a:r>
+              <a:rPr lang="en-US" sz="3200" dirty="0">
+                <a:latin typeface="+mn-lt"/>
+              </a:rPr>
+              <a:t>/lozanotek/</a:t>
+            </a:r>
+            <a:r>
+              <a:rPr lang="en-US" sz="3200" dirty="0" err="1">
+                <a:latin typeface="+mn-lt"/>
+              </a:rPr>
+              <a:t>RefreshWithNuGet</a:t>
+            </a:r>
+            <a:endParaRPr lang="en-US" sz="3200" dirty="0">
+              <a:latin typeface="+mn-lt"/>
+            </a:endParaRPr>
+          </a:p>
+        </p:txBody>
+      </p:sp>
+      <p:pic>
+        <p:nvPicPr>
+          <p:cNvPr id="8" name="Picture 7"/>
+          <p:cNvPicPr>
+            <a:picLocks noChangeAspect="1"/>
+          </p:cNvPicPr>
+          <p:nvPr/>
+        </p:nvPicPr>
+        <p:blipFill>
+          <a:blip r:embed="rId5"/>
+          <a:stretch>
+            <a:fillRect/>
+          </a:stretch>
+        </p:blipFill>
+        <p:spPr>
+          <a:xfrm>
+            <a:off x="5702300" y="2735283"/>
+            <a:ext cx="2540000" cy="914400"/>
+          </a:xfrm>
+          <a:prstGeom prst="rect">
+            <a:avLst/>
+          </a:prstGeom>
+        </p:spPr>
+      </p:pic>
+      <p:sp>
+        <p:nvSpPr>
+          <p:cNvPr id="9" name="TextBox 8"/>
+          <p:cNvSpPr txBox="1"/>
+          <p:nvPr/>
+        </p:nvSpPr>
+        <p:spPr>
+          <a:xfrm>
+            <a:off x="304800" y="5595610"/>
+            <a:ext cx="7577716" cy="510909"/>
+          </a:xfrm>
+          <a:prstGeom prst="rect">
+            <a:avLst/>
+          </a:prstGeom>
+          <a:noFill/>
+        </p:spPr>
+        <p:txBody>
+          <a:bodyPr wrap="none" rtlCol="0">
+            <a:spAutoFit/>
+          </a:bodyPr>
+          <a:lstStyle/>
+          <a:p>
+            <a:r>
+              <a:rPr lang="en-US" sz="3200" dirty="0" smtClean="0">
+                <a:latin typeface="+mn-lt"/>
+              </a:rPr>
+              <a:t>https:</a:t>
+            </a:r>
+            <a:r>
+              <a:rPr lang="en-US" sz="3200" dirty="0">
+                <a:latin typeface="+mn-lt"/>
+              </a:rPr>
+              <a:t>//</a:t>
+            </a:r>
+            <a:r>
+              <a:rPr lang="en-US" sz="3200" dirty="0" smtClean="0">
+                <a:latin typeface="+mn-lt"/>
+              </a:rPr>
+              <a:t>github.com/lozanotek/NuGetServer</a:t>
+            </a:r>
+            <a:endParaRPr lang="en-US" sz="3200" dirty="0">
+              <a:latin typeface="+mn-lt"/>
+            </a:endParaRPr>
+          </a:p>
+        </p:txBody>
+      </p:sp>
+      <p:pic>
+        <p:nvPicPr>
+          <p:cNvPr id="10" name="Picture 9"/>
+          <p:cNvPicPr>
+            <a:picLocks noChangeAspect="1"/>
+          </p:cNvPicPr>
+          <p:nvPr/>
+        </p:nvPicPr>
+        <p:blipFill>
+          <a:blip r:embed="rId6">
+            <a:extLst>
+              <a:ext uri="{28A0092B-C50C-407E-A947-70E740481C1C}">
+                <a14:useLocalDpi xmlns:a14="http://schemas.microsoft.com/office/drawing/2010/main" val="0"/>
+              </a:ext>
+            </a:extLst>
+          </a:blip>
+          <a:stretch>
+            <a:fillRect/>
+          </a:stretch>
+        </p:blipFill>
+        <p:spPr>
+          <a:xfrm>
+            <a:off x="5832337" y="3849502"/>
+            <a:ext cx="2540000" cy="841003"/>
+          </a:xfrm>
+          <a:prstGeom prst="rect">
+            <a:avLst/>
+          </a:prstGeom>
+        </p:spPr>
+      </p:pic>
+    </p:spTree>
+  </p:cSld>
+  <p:clrMapOvr>
+    <a:masterClrMapping/>
+  </p:clrMapOvr>
+  <mc:AlternateContent xmlns:mc="http://schemas.openxmlformats.org/markup-compatibility/2006" xmlns:p14="http://schemas.microsoft.com/office/powerpoint/2010/main">
+    <mc:Choice Requires="p14">
+      <p:transition spd="med" p14:dur="700">
+        <p:fade/>
+      </p:transition>
+    </mc:Choice>
+    <mc:Fallback xmlns="">
+      <p:transition spd="med">
+        <p:fade/>
+      </p:transition>
+    </mc:Fallback>
+  </mc:AlternateContent>
+  <p:timing>
+    <p:tnLst>
+      <p:par>
+        <p:cTn id="1" dur="indefinite" restart="never" nodeType="tmRoot"/>
+      </p:par>
+    </p:tnLst>
+  </p:timing>
+</p:sld>
+</file>
+
+<file path=ppt/slides/slide6.xml><?xml version="1.0" encoding="utf-8"?>
+<p:sld xmlns:a="http://schemas.openxmlformats.org/drawingml/2006/main" xmlns:r="http://schemas.openxmlformats.org/officeDocument/2006/relationships" xmlns:p="http://schemas.openxmlformats.org/presentationml/2006/main">
+  <p:cSld>
+    <p:spTree>
+      <p:nvGrpSpPr>
+        <p:cNvPr id="1" name=""/>
+        <p:cNvGrpSpPr/>
+        <p:nvPr/>
+      </p:nvGrpSpPr>
+      <p:grpSpPr>
+        <a:xfrm>
+          <a:off x="0" y="0"/>
+          <a:ext cx="0" cy="0"/>
+          <a:chOff x="0" y="0"/>
+          <a:chExt cx="0" cy="0"/>
+        </a:xfrm>
+      </p:grpSpPr>
+      <p:sp>
+        <p:nvSpPr>
+          <p:cNvPr id="2" name="Title 1"/>
+          <p:cNvSpPr>
+            <a:spLocks noGrp="1"/>
+          </p:cNvSpPr>
+          <p:nvPr>
+            <p:ph type="title"/>
+          </p:nvPr>
+        </p:nvSpPr>
+        <p:spPr>
+          <a:xfrm>
+            <a:off x="381000" y="228600"/>
+            <a:ext cx="8382000" cy="769441"/>
+          </a:xfrm>
+        </p:spPr>
+        <p:txBody>
+          <a:bodyPr/>
+          <a:lstStyle/>
+          <a:p>
+            <a:r>
+              <a:rPr lang="en-US" b="1" dirty="0" smtClean="0"/>
+              <a:t>How?</a:t>
+            </a:r>
+            <a:endParaRPr lang="en-US" b="1" dirty="0"/>
+          </a:p>
+        </p:txBody>
+      </p:sp>
+      <p:sp>
+        <p:nvSpPr>
+          <p:cNvPr id="3" name="Content Placeholder 2"/>
+          <p:cNvSpPr>
+            <a:spLocks noGrp="1"/>
+          </p:cNvSpPr>
+          <p:nvPr>
+            <p:ph idx="1"/>
+          </p:nvPr>
+        </p:nvSpPr>
+        <p:spPr>
+          <a:xfrm>
+            <a:off x="366713" y="3044280"/>
+            <a:ext cx="8410575" cy="769441"/>
+          </a:xfrm>
+        </p:spPr>
+        <p:txBody>
+          <a:bodyPr/>
+          <a:lstStyle/>
+          <a:p>
+            <a:pPr algn="ctr">
+              <a:buNone/>
+            </a:pPr>
+            <a:r>
+              <a:rPr lang="en-US" sz="4800" b="1" dirty="0" smtClean="0"/>
+              <a:t>Enough slides, let’s code.</a:t>
+            </a:r>
+            <a:endParaRPr lang="en-US" sz="2800" b="1" dirty="0" smtClean="0"/>
+          </a:p>
+        </p:txBody>
+      </p:sp>
+      <p:sp>
+        <p:nvSpPr>
+          <p:cNvPr id="4" name="Slide Number Placeholder 3"/>
+          <p:cNvSpPr>
+            <a:spLocks noGrp="1"/>
+          </p:cNvSpPr>
+          <p:nvPr>
+            <p:ph type="sldNum" sz="quarter" idx="10"/>
+          </p:nvPr>
+        </p:nvSpPr>
+        <p:spPr/>
+        <p:txBody>
+          <a:bodyPr/>
+          <a:lstStyle/>
+          <a:p>
+            <a:pPr>
+              <a:defRPr/>
+            </a:pPr>
+            <a:fld id="{B63753EC-566D-40B0-951D-58F31B9256E5}" type="slidenum">
+              <a:rPr lang="en-US" smtClean="0"/>
+              <a:pPr>
+                <a:defRPr/>
+              </a:pPr>
+              <a:t>6</a:t>
+            </a:fld>
+            <a:endParaRPr lang="en-US"/>
+          </a:p>
+        </p:txBody>
+      </p:sp>
+    </p:spTree>
+    <p:extLst>
+      <p:ext uri="{BB962C8B-B14F-4D97-AF65-F5344CB8AC3E}">
+        <p14:creationId xmlns:p14="http://schemas.microsoft.com/office/powerpoint/2010/main" val="2133607569"/>
+      </p:ext>
+    </p:extLst>
+  </p:cSld>
+  <p:clrMapOvr>
+    <a:masterClrMapping/>
+  </p:clrMapOvr>
+  <p:transition>
+    <p:fade/>
+  </p:transition>
+  <p:timing>
+    <p:tnLst>
+      <p:par>
+        <p:cTn id="1" dur="indefinite" restart="never" nodeType="tmRoot"/>
+      </p:par>
+    </p:tnLst>
+  </p:timing>
+</p:sld>
+</file>
+
+<file path=ppt/slides/slide7.xml><?xml version="1.0" encoding="utf-8"?>
+<p:sld xmlns:a="http://schemas.openxmlformats.org/drawingml/2006/main" xmlns:r="http://schemas.openxmlformats.org/officeDocument/2006/relationships" xmlns:p="http://schemas.openxmlformats.org/presentationml/2006/main">
+  <p:cSld>
+    <p:spTree>
+      <p:nvGrpSpPr>
+        <p:cNvPr id="1" name=""/>
+        <p:cNvGrpSpPr/>
+        <p:nvPr/>
+      </p:nvGrpSpPr>
+      <p:grpSpPr>
+        <a:xfrm>
+          <a:off x="0" y="0"/>
+          <a:ext cx="0" cy="0"/>
+          <a:chOff x="0" y="0"/>
+          <a:chExt cx="0" cy="0"/>
+        </a:xfrm>
+      </p:grpSpPr>
+      <p:sp>
+        <p:nvSpPr>
+          <p:cNvPr id="2" name="Title 1"/>
+          <p:cNvSpPr>
+            <a:spLocks noGrp="1"/>
+          </p:cNvSpPr>
+          <p:nvPr>
+            <p:ph type="title"/>
+          </p:nvPr>
+        </p:nvSpPr>
+        <p:spPr>
+          <a:xfrm>
+            <a:off x="381000" y="228600"/>
+            <a:ext cx="8382000" cy="769441"/>
+          </a:xfrm>
+        </p:spPr>
+        <p:txBody>
+          <a:bodyPr/>
+          <a:lstStyle/>
+          <a:p>
+            <a:r>
+              <a:rPr lang="en-US" b="1" dirty="0" smtClean="0"/>
+              <a:t>Thanks!</a:t>
+            </a:r>
+            <a:endParaRPr lang="en-US" b="1" dirty="0"/>
+          </a:p>
+        </p:txBody>
+      </p:sp>
+      <p:sp>
+        <p:nvSpPr>
+          <p:cNvPr id="3" name="Content Placeholder 2"/>
+          <p:cNvSpPr>
+            <a:spLocks noGrp="1"/>
+          </p:cNvSpPr>
+          <p:nvPr>
+            <p:ph idx="1"/>
+          </p:nvPr>
+        </p:nvSpPr>
+        <p:spPr>
+          <a:xfrm>
+            <a:off x="366713" y="3050435"/>
+            <a:ext cx="8410575" cy="757130"/>
+          </a:xfrm>
+        </p:spPr>
+        <p:txBody>
+          <a:bodyPr/>
+          <a:lstStyle/>
+          <a:p>
+            <a:pPr algn="ctr">
+              <a:buNone/>
+            </a:pPr>
+            <a:r>
+              <a:rPr lang="en-US" sz="4800" b="1" dirty="0" smtClean="0"/>
+              <a:t>Questions?</a:t>
+            </a:r>
+            <a:endParaRPr lang="en-US" sz="2800" b="1" dirty="0" smtClean="0"/>
+          </a:p>
+        </p:txBody>
+      </p:sp>
+      <p:sp>
+        <p:nvSpPr>
+          <p:cNvPr id="4" name="Slide Number Placeholder 3"/>
+          <p:cNvSpPr>
+            <a:spLocks noGrp="1"/>
+          </p:cNvSpPr>
+          <p:nvPr>
+            <p:ph type="sldNum" sz="quarter" idx="10"/>
+          </p:nvPr>
+        </p:nvSpPr>
+        <p:spPr/>
+        <p:txBody>
+          <a:bodyPr/>
+          <a:lstStyle/>
+          <a:p>
+            <a:pPr>
+              <a:defRPr/>
+            </a:pPr>
+            <a:fld id="{B63753EC-566D-40B0-951D-58F31B9256E5}" type="slidenum">
+              <a:rPr lang="en-US" smtClean="0"/>
+              <a:pPr>
+                <a:defRPr/>
+              </a:pPr>
+              <a:t>7</a:t>
+            </a:fld>
+            <a:endParaRPr lang="en-US"/>
+          </a:p>
+        </p:txBody>
+      </p:sp>
+    </p:spTree>
+  </p:cSld>
+  <p:clrMapOvr>
+    <a:masterClrMapping/>
+  </p:clrMapOvr>
+  <p:transition>
+    <p:fade/>
+  </p:transition>
+  <p:timing>
+    <p:tnLst>
+      <p:par>
+        <p:cTn id="1" dur="indefinite" restart="never" nodeType="tmRoot"/>
+      </p:par>
+    </p:tnLst>
+  </p:timing>
+</p:sld>
+</file>
+
+<file path=ppt/slides/slide8.xml><?xml version="1.0" encoding="utf-8"?>
 <p:sld xmlns:a="http://schemas.openxmlformats.org/drawingml/2006/main" xmlns:r="http://schemas.openxmlformats.org/officeDocument/2006/relationships" xmlns:p="http://schemas.openxmlformats.org/presentationml/2006/main">
   <p:cSld>
     <p:spTree>
@@ -9961,14 +10420,14 @@
               </a:ln>
               <a:effectLst/>
               <a:extLst>
-                <a:ext uri="{909E8E84-426E-40dd-AFC4-6F175D3DCCD1}">
+                <a:ext uri="{909E8E84-426E-40DD-AFC4-6F175D3DCCD1}">
                   <a14:hiddenFill xmlns:a14="http://schemas.microsoft.com/office/drawing/2010/main">
                     <a:solidFill>
                       <a:schemeClr val="accent1"/>
                     </a:solidFill>
                   </a14:hiddenFill>
                 </a:ext>
-                <a:ext uri="{91240B29-F687-4f45-9708-019B960494DF}">
+                <a:ext uri="{91240B29-F687-4F45-9708-019B960494DF}">
                   <a14:hiddenLine xmlns:a14="http://schemas.microsoft.com/office/drawing/2010/main" w="9525">
                     <a:solidFill>
                       <a:schemeClr val="tx1"/>
@@ -9978,7 +10437,7 @@
                     <a:tailEnd/>
                   </a14:hiddenLine>
                 </a:ext>
-                <a:ext uri="{AF507438-7753-43e0-B8FC-AC1667EBCBE1}">
+                <a:ext uri="{AF507438-7753-43E0-B8FC-AC1667EBCBE1}">
                   <a14:hiddenEffects xmlns:a14="http://schemas.microsoft.com/office/drawing/2010/main">
                     <a:effectLst>
                       <a:outerShdw dist="35921" dir="2700000" algn="ctr" rotWithShape="0">
@@ -10025,14 +10484,14 @@
               </a:ln>
               <a:effectLst/>
               <a:extLst>
-                <a:ext uri="{909E8E84-426E-40dd-AFC4-6F175D3DCCD1}">
+                <a:ext uri="{909E8E84-426E-40DD-AFC4-6F175D3DCCD1}">
                   <a14:hiddenFill xmlns:a14="http://schemas.microsoft.com/office/drawing/2010/main">
                     <a:solidFill>
                       <a:schemeClr val="accent1"/>
                     </a:solidFill>
                   </a14:hiddenFill>
                 </a:ext>
-                <a:ext uri="{91240B29-F687-4f45-9708-019B960494DF}">
+                <a:ext uri="{91240B29-F687-4F45-9708-019B960494DF}">
                   <a14:hiddenLine xmlns:a14="http://schemas.microsoft.com/office/drawing/2010/main" w="9525">
                     <a:solidFill>
                       <a:schemeClr val="tx1"/>
@@ -10042,7 +10501,7 @@
                     <a:tailEnd/>
                   </a14:hiddenLine>
                 </a:ext>
-                <a:ext uri="{AF507438-7753-43e0-B8FC-AC1667EBCBE1}">
+                <a:ext uri="{AF507438-7753-43E0-B8FC-AC1667EBCBE1}">
                   <a14:hiddenEffects xmlns:a14="http://schemas.microsoft.com/office/drawing/2010/main">
                     <a:effectLst>
                       <a:outerShdw dist="35921" dir="2700000" algn="ctr" rotWithShape="0">
@@ -10089,14 +10548,14 @@
               </a:ln>
               <a:effectLst/>
               <a:extLst>
-                <a:ext uri="{909E8E84-426E-40dd-AFC4-6F175D3DCCD1}">
+                <a:ext uri="{909E8E84-426E-40DD-AFC4-6F175D3DCCD1}">
                   <a14:hiddenFill xmlns:a14="http://schemas.microsoft.com/office/drawing/2010/main">
                     <a:solidFill>
                       <a:schemeClr val="accent1"/>
                     </a:solidFill>
                   </a14:hiddenFill>
                 </a:ext>
-                <a:ext uri="{91240B29-F687-4f45-9708-019B960494DF}">
+                <a:ext uri="{91240B29-F687-4F45-9708-019B960494DF}">
                   <a14:hiddenLine xmlns:a14="http://schemas.microsoft.com/office/drawing/2010/main" w="9525">
                     <a:solidFill>
                       <a:schemeClr val="tx1"/>
@@ -10106,7 +10565,7 @@
                     <a:tailEnd/>
                   </a14:hiddenLine>
                 </a:ext>
-                <a:ext uri="{AF507438-7753-43e0-B8FC-AC1667EBCBE1}">
+                <a:ext uri="{AF507438-7753-43E0-B8FC-AC1667EBCBE1}">
                   <a14:hiddenEffects xmlns:a14="http://schemas.microsoft.com/office/drawing/2010/main">
                     <a:effectLst>
                       <a:outerShdw dist="35921" dir="2700000" algn="ctr" rotWithShape="0">
@@ -10153,14 +10612,14 @@
               </a:ln>
               <a:effectLst/>
               <a:extLst>
-                <a:ext uri="{909E8E84-426E-40dd-AFC4-6F175D3DCCD1}">
+                <a:ext uri="{909E8E84-426E-40DD-AFC4-6F175D3DCCD1}">
                   <a14:hiddenFill xmlns:a14="http://schemas.microsoft.com/office/drawing/2010/main">
                     <a:solidFill>
                       <a:schemeClr val="accent1"/>
                     </a:solidFill>
                   </a14:hiddenFill>
                 </a:ext>
-                <a:ext uri="{91240B29-F687-4f45-9708-019B960494DF}">
+                <a:ext uri="{91240B29-F687-4F45-9708-019B960494DF}">
                   <a14:hiddenLine xmlns:a14="http://schemas.microsoft.com/office/drawing/2010/main" w="9525">
                     <a:solidFill>
                       <a:schemeClr val="tx1"/>
@@ -10170,7 +10629,7 @@
                     <a:tailEnd/>
                   </a14:hiddenLine>
                 </a:ext>
-                <a:ext uri="{AF507438-7753-43e0-B8FC-AC1667EBCBE1}">
+                <a:ext uri="{AF507438-7753-43E0-B8FC-AC1667EBCBE1}">
                   <a14:hiddenEffects xmlns:a14="http://schemas.microsoft.com/office/drawing/2010/main">
                     <a:effectLst>
                       <a:outerShdw dist="35921" dir="2700000" algn="ctr" rotWithShape="0">
@@ -10213,7 +10672,7 @@
               </a:prstGeom>
               <a:noFill/>
               <a:extLst>
-                <a:ext uri="{909E8E84-426E-40dd-AFC4-6F175D3DCCD1}">
+                <a:ext uri="{909E8E84-426E-40DD-AFC4-6F175D3DCCD1}">
                   <a14:hiddenFill xmlns:a14="http://schemas.microsoft.com/office/drawing/2010/main">
                     <a:solidFill>
                       <a:srgbClr val="FFFFFF"/>
@@ -10254,7 +10713,7 @@
               </a:prstGeom>
               <a:noFill/>
               <a:extLst>
-                <a:ext uri="{909E8E84-426E-40dd-AFC4-6F175D3DCCD1}">
+                <a:ext uri="{909E8E84-426E-40DD-AFC4-6F175D3DCCD1}">
                   <a14:hiddenFill xmlns:a14="http://schemas.microsoft.com/office/drawing/2010/main">
                     <a:solidFill>
                       <a:srgbClr val="FFFFFF"/>
@@ -10454,7 +10913,7 @@
               </a:prstGeom>
               <a:noFill/>
               <a:extLst>
-                <a:ext uri="{909E8E84-426E-40dd-AFC4-6F175D3DCCD1}">
+                <a:ext uri="{909E8E84-426E-40DD-AFC4-6F175D3DCCD1}">
                   <a14:hiddenFill xmlns:a14="http://schemas.microsoft.com/office/drawing/2010/main">
                     <a:solidFill>
                       <a:srgbClr val="FFFFFF"/>
@@ -10495,7 +10954,7 @@
               </a:prstGeom>
               <a:noFill/>
               <a:extLst>
-                <a:ext uri="{909E8E84-426E-40dd-AFC4-6F175D3DCCD1}">
+                <a:ext uri="{909E8E84-426E-40DD-AFC4-6F175D3DCCD1}">
                   <a14:hiddenFill xmlns:a14="http://schemas.microsoft.com/office/drawing/2010/main">
                     <a:solidFill>
                       <a:srgbClr val="FFFFFF"/>
@@ -10536,7 +10995,7 @@
               </a:prstGeom>
               <a:noFill/>
               <a:extLst>
-                <a:ext uri="{909E8E84-426E-40dd-AFC4-6F175D3DCCD1}">
+                <a:ext uri="{909E8E84-426E-40DD-AFC4-6F175D3DCCD1}">
                   <a14:hiddenFill xmlns:a14="http://schemas.microsoft.com/office/drawing/2010/main">
                     <a:solidFill>
                       <a:srgbClr val="FFFFFF"/>
@@ -10577,7 +11036,7 @@
               </a:prstGeom>
               <a:noFill/>
               <a:extLst>
-                <a:ext uri="{909E8E84-426E-40dd-AFC4-6F175D3DCCD1}">
+                <a:ext uri="{909E8E84-426E-40DD-AFC4-6F175D3DCCD1}">
                   <a14:hiddenFill xmlns:a14="http://schemas.microsoft.com/office/drawing/2010/main">
                     <a:solidFill>
                       <a:srgbClr val="FFFFFF"/>
@@ -10618,7 +11077,7 @@
               </a:prstGeom>
               <a:noFill/>
               <a:extLst>
-                <a:ext uri="{909E8E84-426E-40dd-AFC4-6F175D3DCCD1}">
+                <a:ext uri="{909E8E84-426E-40DD-AFC4-6F175D3DCCD1}">
                   <a14:hiddenFill xmlns:a14="http://schemas.microsoft.com/office/drawing/2010/main">
                     <a:solidFill>
                       <a:srgbClr val="FFFFFF"/>
@@ -10818,7 +11277,7 @@
               </a:prstGeom>
               <a:noFill/>
               <a:extLst>
-                <a:ext uri="{909E8E84-426E-40dd-AFC4-6F175D3DCCD1}">
+                <a:ext uri="{909E8E84-426E-40DD-AFC4-6F175D3DCCD1}">
                   <a14:hiddenFill xmlns:a14="http://schemas.microsoft.com/office/drawing/2010/main">
                     <a:solidFill>
                       <a:srgbClr val="FFFFFF"/>
@@ -10859,7 +11318,7 @@
               </a:prstGeom>
               <a:noFill/>
               <a:extLst>
-                <a:ext uri="{909E8E84-426E-40dd-AFC4-6F175D3DCCD1}">
+                <a:ext uri="{909E8E84-426E-40DD-AFC4-6F175D3DCCD1}">
                   <a14:hiddenFill xmlns:a14="http://schemas.microsoft.com/office/drawing/2010/main">
                     <a:solidFill>
                       <a:srgbClr val="FFFFFF"/>
@@ -10900,7 +11359,7 @@
               </a:prstGeom>
               <a:noFill/>
               <a:extLst>
-                <a:ext uri="{909E8E84-426E-40dd-AFC4-6F175D3DCCD1}">
+                <a:ext uri="{909E8E84-426E-40DD-AFC4-6F175D3DCCD1}">
                   <a14:hiddenFill xmlns:a14="http://schemas.microsoft.com/office/drawing/2010/main">
                     <a:solidFill>
                       <a:srgbClr val="FFFFFF"/>
@@ -10941,7 +11400,7 @@
               </a:prstGeom>
               <a:noFill/>
               <a:extLst>
-                <a:ext uri="{909E8E84-426E-40dd-AFC4-6F175D3DCCD1}">
+                <a:ext uri="{909E8E84-426E-40DD-AFC4-6F175D3DCCD1}">
                   <a14:hiddenFill xmlns:a14="http://schemas.microsoft.com/office/drawing/2010/main">
                     <a:solidFill>
                       <a:srgbClr val="FFFFFF"/>
@@ -10982,7 +11441,7 @@
               </a:prstGeom>
               <a:noFill/>
               <a:extLst>
-                <a:ext uri="{909E8E84-426E-40dd-AFC4-6F175D3DCCD1}">
+                <a:ext uri="{909E8E84-426E-40DD-AFC4-6F175D3DCCD1}">
                   <a14:hiddenFill xmlns:a14="http://schemas.microsoft.com/office/drawing/2010/main">
                     <a:solidFill>
                       <a:srgbClr val="FFFFFF"/>
@@ -11023,7 +11482,7 @@
               </a:prstGeom>
               <a:noFill/>
               <a:extLst>
-                <a:ext uri="{909E8E84-426E-40dd-AFC4-6F175D3DCCD1}">
+                <a:ext uri="{909E8E84-426E-40DD-AFC4-6F175D3DCCD1}">
                   <a14:hiddenFill xmlns:a14="http://schemas.microsoft.com/office/drawing/2010/main">
                     <a:solidFill>
                       <a:srgbClr val="FFFFFF"/>
@@ -11064,7 +11523,7 @@
               </a:prstGeom>
               <a:noFill/>
               <a:extLst>
-                <a:ext uri="{909E8E84-426E-40dd-AFC4-6F175D3DCCD1}">
+                <a:ext uri="{909E8E84-426E-40DD-AFC4-6F175D3DCCD1}">
                   <a14:hiddenFill xmlns:a14="http://schemas.microsoft.com/office/drawing/2010/main">
                     <a:solidFill>
                       <a:srgbClr val="FFFFFF"/>
@@ -11105,7 +11564,7 @@
               </a:prstGeom>
               <a:noFill/>
               <a:extLst>
-                <a:ext uri="{909E8E84-426E-40dd-AFC4-6F175D3DCCD1}">
+                <a:ext uri="{909E8E84-426E-40DD-AFC4-6F175D3DCCD1}">
                   <a14:hiddenFill xmlns:a14="http://schemas.microsoft.com/office/drawing/2010/main">
                     <a:solidFill>
                       <a:srgbClr val="FFFFFF"/>
@@ -11146,7 +11605,7 @@
               </a:prstGeom>
               <a:noFill/>
               <a:extLst>
-                <a:ext uri="{909E8E84-426E-40dd-AFC4-6F175D3DCCD1}">
+                <a:ext uri="{909E8E84-426E-40DD-AFC4-6F175D3DCCD1}">
                   <a14:hiddenFill xmlns:a14="http://schemas.microsoft.com/office/drawing/2010/main">
                     <a:solidFill>
                       <a:srgbClr val="FFFFFF"/>
@@ -11187,7 +11646,7 @@
               </a:prstGeom>
               <a:noFill/>
               <a:extLst>
-                <a:ext uri="{909E8E84-426E-40dd-AFC4-6F175D3DCCD1}">
+                <a:ext uri="{909E8E84-426E-40DD-AFC4-6F175D3DCCD1}">
                   <a14:hiddenFill xmlns:a14="http://schemas.microsoft.com/office/drawing/2010/main">
                     <a:solidFill>
                       <a:srgbClr val="FFFFFF"/>
@@ -11228,7 +11687,7 @@
               </a:prstGeom>
               <a:noFill/>
               <a:extLst>
-                <a:ext uri="{909E8E84-426E-40dd-AFC4-6F175D3DCCD1}">
+                <a:ext uri="{909E8E84-426E-40DD-AFC4-6F175D3DCCD1}">
                   <a14:hiddenFill xmlns:a14="http://schemas.microsoft.com/office/drawing/2010/main">
                     <a:solidFill>
                       <a:srgbClr val="FFFFFF"/>
@@ -11269,7 +11728,7 @@
               </a:prstGeom>
               <a:noFill/>
               <a:extLst>
-                <a:ext uri="{909E8E84-426E-40dd-AFC4-6F175D3DCCD1}">
+                <a:ext uri="{909E8E84-426E-40DD-AFC4-6F175D3DCCD1}">
                   <a14:hiddenFill xmlns:a14="http://schemas.microsoft.com/office/drawing/2010/main">
                     <a:solidFill>
                       <a:srgbClr val="FFFFFF"/>
@@ -11310,7 +11769,7 @@
               </a:prstGeom>
               <a:noFill/>
               <a:extLst>
-                <a:ext uri="{909E8E84-426E-40dd-AFC4-6F175D3DCCD1}">
+                <a:ext uri="{909E8E84-426E-40DD-AFC4-6F175D3DCCD1}">
                   <a14:hiddenFill xmlns:a14="http://schemas.microsoft.com/office/drawing/2010/main">
                     <a:solidFill>
                       <a:srgbClr val="FFFFFF"/>
@@ -11351,7 +11810,7 @@
               </a:prstGeom>
               <a:noFill/>
               <a:extLst>
-                <a:ext uri="{909E8E84-426E-40dd-AFC4-6F175D3DCCD1}">
+                <a:ext uri="{909E8E84-426E-40DD-AFC4-6F175D3DCCD1}">
                   <a14:hiddenFill xmlns:a14="http://schemas.microsoft.com/office/drawing/2010/main">
                     <a:solidFill>
                       <a:srgbClr val="FFFFFF"/>
@@ -11392,7 +11851,7 @@
               </a:prstGeom>
               <a:noFill/>
               <a:extLst>
-                <a:ext uri="{909E8E84-426E-40dd-AFC4-6F175D3DCCD1}">
+                <a:ext uri="{909E8E84-426E-40DD-AFC4-6F175D3DCCD1}">
                   <a14:hiddenFill xmlns:a14="http://schemas.microsoft.com/office/drawing/2010/main">
                     <a:solidFill>
                       <a:srgbClr val="FFFFFF"/>
@@ -11433,7 +11892,7 @@
               </a:prstGeom>
               <a:noFill/>
               <a:extLst>
-                <a:ext uri="{909E8E84-426E-40dd-AFC4-6F175D3DCCD1}">
+                <a:ext uri="{909E8E84-426E-40DD-AFC4-6F175D3DCCD1}">
                   <a14:hiddenFill xmlns:a14="http://schemas.microsoft.com/office/drawing/2010/main">
                     <a:solidFill>
                       <a:srgbClr val="FFFFFF"/>
@@ -11474,7 +11933,7 @@
               </a:prstGeom>
               <a:noFill/>
               <a:extLst>
-                <a:ext uri="{909E8E84-426E-40dd-AFC4-6F175D3DCCD1}">
+                <a:ext uri="{909E8E84-426E-40DD-AFC4-6F175D3DCCD1}">
                   <a14:hiddenFill xmlns:a14="http://schemas.microsoft.com/office/drawing/2010/main">
                     <a:solidFill>
                       <a:srgbClr val="FFFFFF"/>
@@ -11515,7 +11974,7 @@
               </a:prstGeom>
               <a:noFill/>
               <a:extLst>
-                <a:ext uri="{909E8E84-426E-40dd-AFC4-6F175D3DCCD1}">
+                <a:ext uri="{909E8E84-426E-40DD-AFC4-6F175D3DCCD1}">
                   <a14:hiddenFill xmlns:a14="http://schemas.microsoft.com/office/drawing/2010/main">
                     <a:solidFill>
                       <a:srgbClr val="FFFFFF"/>
@@ -11645,7 +12104,7 @@
               </a:prstGeom>
               <a:noFill/>
               <a:extLst>
-                <a:ext uri="{909E8E84-426E-40dd-AFC4-6F175D3DCCD1}">
+                <a:ext uri="{909E8E84-426E-40DD-AFC4-6F175D3DCCD1}">
                   <a14:hiddenFill xmlns:a14="http://schemas.microsoft.com/office/drawing/2010/main">
                     <a:solidFill>
                       <a:srgbClr val="FFFFFF"/>
@@ -11686,7 +12145,7 @@
               </a:prstGeom>
               <a:noFill/>
               <a:extLst>
-                <a:ext uri="{909E8E84-426E-40dd-AFC4-6F175D3DCCD1}">
+                <a:ext uri="{909E8E84-426E-40DD-AFC4-6F175D3DCCD1}">
                   <a14:hiddenFill xmlns:a14="http://schemas.microsoft.com/office/drawing/2010/main">
                     <a:solidFill>
                       <a:srgbClr val="FFFFFF"/>
@@ -11727,7 +12186,7 @@
               </a:prstGeom>
               <a:noFill/>
               <a:extLst>
-                <a:ext uri="{909E8E84-426E-40dd-AFC4-6F175D3DCCD1}">
+                <a:ext uri="{909E8E84-426E-40DD-AFC4-6F175D3DCCD1}">
                   <a14:hiddenFill xmlns:a14="http://schemas.microsoft.com/office/drawing/2010/main">
                     <a:solidFill>
                       <a:srgbClr val="FFFFFF"/>
@@ -11768,7 +12227,7 @@
               </a:prstGeom>
               <a:noFill/>
               <a:extLst>
-                <a:ext uri="{909E8E84-426E-40dd-AFC4-6F175D3DCCD1}">
+                <a:ext uri="{909E8E84-426E-40DD-AFC4-6F175D3DCCD1}">
                   <a14:hiddenFill xmlns:a14="http://schemas.microsoft.com/office/drawing/2010/main">
                     <a:solidFill>
                       <a:srgbClr val="FFFFFF"/>
@@ -11809,7 +12268,7 @@
               </a:prstGeom>
               <a:noFill/>
               <a:extLst>
-                <a:ext uri="{909E8E84-426E-40dd-AFC4-6F175D3DCCD1}">
+                <a:ext uri="{909E8E84-426E-40DD-AFC4-6F175D3DCCD1}">
                   <a14:hiddenFill xmlns:a14="http://schemas.microsoft.com/office/drawing/2010/main">
                     <a:solidFill>
                       <a:srgbClr val="FFFFFF"/>
@@ -11850,7 +12309,7 @@
               </a:prstGeom>
               <a:noFill/>
               <a:extLst>
-                <a:ext uri="{909E8E84-426E-40dd-AFC4-6F175D3DCCD1}">
+                <a:ext uri="{909E8E84-426E-40DD-AFC4-6F175D3DCCD1}">
                   <a14:hiddenFill xmlns:a14="http://schemas.microsoft.com/office/drawing/2010/main">
                     <a:solidFill>
                       <a:srgbClr val="FFFFFF"/>
@@ -11891,7 +12350,7 @@
               </a:prstGeom>
               <a:noFill/>
               <a:extLst>
-                <a:ext uri="{909E8E84-426E-40dd-AFC4-6F175D3DCCD1}">
+                <a:ext uri="{909E8E84-426E-40DD-AFC4-6F175D3DCCD1}">
                   <a14:hiddenFill xmlns:a14="http://schemas.microsoft.com/office/drawing/2010/main">
                     <a:solidFill>
                       <a:srgbClr val="FFFFFF"/>
@@ -11932,7 +12391,7 @@
               </a:prstGeom>
               <a:noFill/>
               <a:extLst>
-                <a:ext uri="{909E8E84-426E-40dd-AFC4-6F175D3DCCD1}">
+                <a:ext uri="{909E8E84-426E-40DD-AFC4-6F175D3DCCD1}">
                   <a14:hiddenFill xmlns:a14="http://schemas.microsoft.com/office/drawing/2010/main">
                     <a:solidFill>
                       <a:srgbClr val="FFFFFF"/>
@@ -11973,7 +12432,7 @@
               </a:prstGeom>
               <a:noFill/>
               <a:extLst>
-                <a:ext uri="{909E8E84-426E-40dd-AFC4-6F175D3DCCD1}">
+                <a:ext uri="{909E8E84-426E-40DD-AFC4-6F175D3DCCD1}">
                   <a14:hiddenFill xmlns:a14="http://schemas.microsoft.com/office/drawing/2010/main">
                     <a:solidFill>
                       <a:srgbClr val="FFFFFF"/>
@@ -12014,7 +12473,7 @@
               </a:prstGeom>
               <a:noFill/>
               <a:extLst>
-                <a:ext uri="{909E8E84-426E-40dd-AFC4-6F175D3DCCD1}">
+                <a:ext uri="{909E8E84-426E-40DD-AFC4-6F175D3DCCD1}">
                   <a14:hiddenFill xmlns:a14="http://schemas.microsoft.com/office/drawing/2010/main">
                     <a:solidFill>
                       <a:srgbClr val="FFFFFF"/>
@@ -12029,1645 +12488,20 @@
     </p:spTree>
     <p:extLst>
       <p:ext uri="{BB962C8B-B14F-4D97-AF65-F5344CB8AC3E}">
-        <p14:creationId xmlns:p14="http://schemas.microsoft.com/office/powerpoint/2010/main" val="618298298"/>
+        <p14:creationId xmlns:p14="http://schemas.microsoft.com/office/powerpoint/2010/main" val="2645147776"/>
       </p:ext>
     </p:extLst>
   </p:cSld>
   <p:clrMapOvr>
     <a:masterClrMapping/>
   </p:clrMapOvr>
-  <p:transition xmlns:p14="http://schemas.microsoft.com/office/powerpoint/2010/main">
+  <p:transition>
     <p:fade/>
   </p:transition>
   <p:timing>
     <p:tnLst>
       <p:par>
-        <p:cTn xmlns:p14="http://schemas.microsoft.com/office/powerpoint/2010/main" id="1" dur="indefinite" restart="never" nodeType="tmRoot"/>
-      </p:par>
-    </p:tnLst>
-  </p:timing>
-</p:sld>
-</file>
-
-<file path=ppt/slides/slide3.xml><?xml version="1.0" encoding="utf-8"?>
-<p:sld xmlns:a="http://schemas.openxmlformats.org/drawingml/2006/main" xmlns:r="http://schemas.openxmlformats.org/officeDocument/2006/relationships" xmlns:p="http://schemas.openxmlformats.org/presentationml/2006/main">
-  <p:cSld>
-    <p:spTree>
-      <p:nvGrpSpPr>
-        <p:cNvPr id="1" name=""/>
-        <p:cNvGrpSpPr/>
-        <p:nvPr/>
-      </p:nvGrpSpPr>
-      <p:grpSpPr>
-        <a:xfrm>
-          <a:off x="0" y="0"/>
-          <a:ext cx="0" cy="0"/>
-          <a:chOff x="0" y="0"/>
-          <a:chExt cx="0" cy="0"/>
-        </a:xfrm>
-      </p:grpSpPr>
-      <p:sp>
-        <p:nvSpPr>
-          <p:cNvPr id="2" name="Title 1"/>
-          <p:cNvSpPr>
-            <a:spLocks noGrp="1"/>
-          </p:cNvSpPr>
-          <p:nvPr>
-            <p:ph type="title"/>
-          </p:nvPr>
-        </p:nvSpPr>
-        <p:spPr>
-          <a:xfrm>
-            <a:off x="381000" y="228600"/>
-            <a:ext cx="8382000" cy="769441"/>
-          </a:xfrm>
-        </p:spPr>
-        <p:txBody>
-          <a:bodyPr/>
-          <a:lstStyle/>
-          <a:p>
-            <a:r>
-              <a:rPr lang="en-US" b="1" dirty="0" smtClean="0"/>
-              <a:t>Goal</a:t>
-            </a:r>
-            <a:endParaRPr lang="en-US" b="1" dirty="0"/>
-          </a:p>
-        </p:txBody>
-      </p:sp>
-      <p:sp>
-        <p:nvSpPr>
-          <p:cNvPr id="3" name="Content Placeholder 2"/>
-          <p:cNvSpPr>
-            <a:spLocks noGrp="1"/>
-          </p:cNvSpPr>
-          <p:nvPr>
-            <p:ph idx="1"/>
-          </p:nvPr>
-        </p:nvSpPr>
-        <p:spPr>
-          <a:xfrm>
-            <a:off x="366713" y="2196868"/>
-            <a:ext cx="8410575" cy="2464264"/>
-          </a:xfrm>
-        </p:spPr>
-        <p:txBody>
-          <a:bodyPr/>
-          <a:lstStyle/>
-          <a:p>
-            <a:pPr marL="0" indent="0">
-              <a:buNone/>
-            </a:pPr>
-            <a:r>
-              <a:rPr lang="en-US" b="1" i="1" dirty="0" smtClean="0"/>
-              <a:t>For you to gain a different understanding on how you can use </a:t>
-            </a:r>
-            <a:r>
-              <a:rPr lang="en-US" b="1" i="1" dirty="0" err="1" smtClean="0"/>
-              <a:t>NuGet</a:t>
-            </a:r>
-            <a:r>
-              <a:rPr lang="en-US" b="1" i="1" dirty="0" smtClean="0"/>
-              <a:t> to your development efforts easier.</a:t>
-            </a:r>
-          </a:p>
-          <a:p>
-            <a:pPr marL="0" indent="0">
-              <a:buNone/>
-            </a:pPr>
-            <a:r>
-              <a:rPr lang="en-US" b="1" i="1" dirty="0" smtClean="0"/>
-              <a:t>Start thinking of </a:t>
-            </a:r>
-            <a:r>
-              <a:rPr lang="en-US" b="1" i="1" dirty="0" err="1" smtClean="0"/>
-              <a:t>NuGet</a:t>
-            </a:r>
-            <a:r>
-              <a:rPr lang="en-US" b="1" i="1" dirty="0" smtClean="0"/>
-              <a:t> as a protocol rather than a tool…</a:t>
-            </a:r>
-          </a:p>
-        </p:txBody>
-      </p:sp>
-      <p:sp>
-        <p:nvSpPr>
-          <p:cNvPr id="4" name="Slide Number Placeholder 3"/>
-          <p:cNvSpPr>
-            <a:spLocks noGrp="1"/>
-          </p:cNvSpPr>
-          <p:nvPr>
-            <p:ph type="sldNum" sz="quarter" idx="10"/>
-          </p:nvPr>
-        </p:nvSpPr>
-        <p:spPr/>
-        <p:txBody>
-          <a:bodyPr/>
-          <a:lstStyle/>
-          <a:p>
-            <a:pPr>
-              <a:defRPr/>
-            </a:pPr>
-            <a:fld id="{B63753EC-566D-40B0-951D-58F31B9256E5}" type="slidenum">
-              <a:rPr lang="en-US" smtClean="0"/>
-              <a:pPr>
-                <a:defRPr/>
-              </a:pPr>
-              <a:t>3</a:t>
-            </a:fld>
-            <a:endParaRPr lang="en-US"/>
-          </a:p>
-        </p:txBody>
-      </p:sp>
-    </p:spTree>
-  </p:cSld>
-  <p:clrMapOvr>
-    <a:masterClrMapping/>
-  </p:clrMapOvr>
-  <p:transition xmlns:p14="http://schemas.microsoft.com/office/powerpoint/2010/main">
-    <p:fade/>
-  </p:transition>
-  <p:timing>
-    <p:tnLst>
-      <p:par>
-        <p:cTn xmlns:p14="http://schemas.microsoft.com/office/powerpoint/2010/main" id="1" dur="indefinite" restart="never" nodeType="tmRoot"/>
-      </p:par>
-    </p:tnLst>
-  </p:timing>
-</p:sld>
-</file>
-
-<file path=ppt/slides/slide4.xml><?xml version="1.0" encoding="utf-8"?>
-<p:sld xmlns:a="http://schemas.openxmlformats.org/drawingml/2006/main" xmlns:r="http://schemas.openxmlformats.org/officeDocument/2006/relationships" xmlns:p="http://schemas.openxmlformats.org/presentationml/2006/main">
-  <p:cSld>
-    <p:spTree>
-      <p:nvGrpSpPr>
-        <p:cNvPr id="1" name=""/>
-        <p:cNvGrpSpPr/>
-        <p:nvPr/>
-      </p:nvGrpSpPr>
-      <p:grpSpPr>
-        <a:xfrm>
-          <a:off x="0" y="0"/>
-          <a:ext cx="0" cy="0"/>
-          <a:chOff x="0" y="0"/>
-          <a:chExt cx="0" cy="0"/>
-        </a:xfrm>
-      </p:grpSpPr>
-      <p:sp>
-        <p:nvSpPr>
-          <p:cNvPr id="2" name="Title 1"/>
-          <p:cNvSpPr>
-            <a:spLocks noGrp="1"/>
-          </p:cNvSpPr>
-          <p:nvPr>
-            <p:ph type="title"/>
-          </p:nvPr>
-        </p:nvSpPr>
-        <p:spPr/>
-        <p:txBody>
-          <a:bodyPr/>
-          <a:lstStyle/>
-          <a:p>
-            <a:r>
-              <a:rPr lang="en-US" b="1" dirty="0" smtClean="0"/>
-              <a:t>Agenda</a:t>
-            </a:r>
-            <a:endParaRPr lang="en-US" b="1" dirty="0"/>
-          </a:p>
-        </p:txBody>
-      </p:sp>
-      <p:sp>
-        <p:nvSpPr>
-          <p:cNvPr id="3" name="Content Placeholder 2"/>
-          <p:cNvSpPr>
-            <a:spLocks noGrp="1"/>
-          </p:cNvSpPr>
-          <p:nvPr>
-            <p:ph idx="1"/>
-          </p:nvPr>
-        </p:nvSpPr>
-        <p:spPr>
-          <a:xfrm>
-            <a:off x="381002" y="1417638"/>
-            <a:ext cx="8410575" cy="1134670"/>
-          </a:xfrm>
-        </p:spPr>
-        <p:txBody>
-          <a:bodyPr/>
-          <a:lstStyle/>
-          <a:p>
-            <a:r>
-              <a:rPr lang="en-US" dirty="0" smtClean="0"/>
-              <a:t>Why?</a:t>
-            </a:r>
-          </a:p>
-          <a:p>
-            <a:r>
-              <a:rPr lang="en-US" dirty="0" smtClean="0"/>
-              <a:t>How?</a:t>
-            </a:r>
-          </a:p>
-        </p:txBody>
-      </p:sp>
-      <p:sp>
-        <p:nvSpPr>
-          <p:cNvPr id="4" name="Slide Number Placeholder 3"/>
-          <p:cNvSpPr>
-            <a:spLocks noGrp="1"/>
-          </p:cNvSpPr>
-          <p:nvPr>
-            <p:ph type="sldNum" sz="quarter" idx="10"/>
-          </p:nvPr>
-        </p:nvSpPr>
-        <p:spPr/>
-        <p:txBody>
-          <a:bodyPr/>
-          <a:lstStyle/>
-          <a:p>
-            <a:pPr>
-              <a:defRPr/>
-            </a:pPr>
-            <a:fld id="{B63753EC-566D-40B0-951D-58F31B9256E5}" type="slidenum">
-              <a:rPr lang="en-US" smtClean="0"/>
-              <a:pPr>
-                <a:defRPr/>
-              </a:pPr>
-              <a:t>4</a:t>
-            </a:fld>
-            <a:endParaRPr lang="en-US"/>
-          </a:p>
-        </p:txBody>
-      </p:sp>
-    </p:spTree>
-    <p:extLst>
-      <p:ext uri="{BB962C8B-B14F-4D97-AF65-F5344CB8AC3E}">
-        <p14:creationId xmlns:p14="http://schemas.microsoft.com/office/powerpoint/2010/main" val="694831055"/>
-      </p:ext>
-    </p:extLst>
-  </p:cSld>
-  <p:clrMapOvr>
-    <a:masterClrMapping/>
-  </p:clrMapOvr>
-  <p:transition xmlns:p14="http://schemas.microsoft.com/office/powerpoint/2010/main">
-    <p:fade/>
-  </p:transition>
-  <p:timing>
-    <p:tnLst>
-      <p:par>
-        <p:cTn xmlns:p14="http://schemas.microsoft.com/office/powerpoint/2010/main" id="1" dur="indefinite" restart="never" nodeType="tmRoot"/>
-      </p:par>
-    </p:tnLst>
-  </p:timing>
-</p:sld>
-</file>
-
-<file path=ppt/slides/slide5.xml><?xml version="1.0" encoding="utf-8"?>
-<p:sld xmlns:a="http://schemas.openxmlformats.org/drawingml/2006/main" xmlns:r="http://schemas.openxmlformats.org/officeDocument/2006/relationships" xmlns:p="http://schemas.openxmlformats.org/presentationml/2006/main">
-  <p:cSld>
-    <p:spTree>
-      <p:nvGrpSpPr>
-        <p:cNvPr id="1" name=""/>
-        <p:cNvGrpSpPr/>
-        <p:nvPr/>
-      </p:nvGrpSpPr>
-      <p:grpSpPr>
-        <a:xfrm>
-          <a:off x="0" y="0"/>
-          <a:ext cx="0" cy="0"/>
-          <a:chOff x="0" y="0"/>
-          <a:chExt cx="0" cy="0"/>
-        </a:xfrm>
-      </p:grpSpPr>
-      <p:sp>
-        <p:nvSpPr>
-          <p:cNvPr id="2" name="Title 1"/>
-          <p:cNvSpPr>
-            <a:spLocks noGrp="1"/>
-          </p:cNvSpPr>
-          <p:nvPr>
-            <p:ph type="title"/>
-          </p:nvPr>
-        </p:nvSpPr>
-        <p:spPr/>
-        <p:txBody>
-          <a:bodyPr/>
-          <a:lstStyle/>
-          <a:p>
-            <a:r>
-              <a:rPr lang="en-US" b="1" dirty="0" smtClean="0"/>
-              <a:t>Info</a:t>
-            </a:r>
-            <a:endParaRPr lang="en-US" b="1" dirty="0"/>
-          </a:p>
-        </p:txBody>
-      </p:sp>
-      <p:sp>
-        <p:nvSpPr>
-          <p:cNvPr id="3" name="Content Placeholder 2"/>
-          <p:cNvSpPr>
-            <a:spLocks noGrp="1"/>
-          </p:cNvSpPr>
-          <p:nvPr>
-            <p:ph idx="1"/>
-          </p:nvPr>
-        </p:nvSpPr>
-        <p:spPr>
-          <a:xfrm>
-            <a:off x="381002" y="1417638"/>
-            <a:ext cx="8410575" cy="1725601"/>
-          </a:xfrm>
-        </p:spPr>
-        <p:txBody>
-          <a:bodyPr/>
-          <a:lstStyle/>
-          <a:p>
-            <a:pPr marL="0" indent="0">
-              <a:buNone/>
-            </a:pPr>
-            <a:r>
-              <a:rPr lang="en-US" b="1" dirty="0" smtClean="0"/>
-              <a:t>javier@lozanotek.com</a:t>
-            </a:r>
-          </a:p>
-          <a:p>
-            <a:pPr marL="0" indent="0">
-              <a:buNone/>
-            </a:pPr>
-            <a:r>
-              <a:rPr lang="en-US" b="1" dirty="0" smtClean="0"/>
-              <a:t>@jglozano</a:t>
-            </a:r>
-          </a:p>
-          <a:p>
-            <a:pPr marL="0" indent="0">
-              <a:buNone/>
-            </a:pPr>
-            <a:r>
-              <a:rPr lang="en-US" b="1" dirty="0" smtClean="0">
-                <a:hlinkClick r:id="rId2"/>
-              </a:rPr>
-              <a:t>http://lozanotek.com/blog</a:t>
-            </a:r>
-            <a:endParaRPr lang="en-US" b="1" dirty="0" smtClean="0"/>
-          </a:p>
-        </p:txBody>
-      </p:sp>
-      <p:sp>
-        <p:nvSpPr>
-          <p:cNvPr id="4" name="Slide Number Placeholder 3"/>
-          <p:cNvSpPr>
-            <a:spLocks noGrp="1"/>
-          </p:cNvSpPr>
-          <p:nvPr>
-            <p:ph type="sldNum" sz="quarter" idx="10"/>
-          </p:nvPr>
-        </p:nvSpPr>
-        <p:spPr/>
-        <p:txBody>
-          <a:bodyPr/>
-          <a:lstStyle/>
-          <a:p>
-            <a:pPr>
-              <a:defRPr/>
-            </a:pPr>
-            <a:fld id="{B63753EC-566D-40B0-951D-58F31B9256E5}" type="slidenum">
-              <a:rPr lang="en-US" smtClean="0"/>
-              <a:pPr>
-                <a:defRPr/>
-              </a:pPr>
-              <a:t>5</a:t>
-            </a:fld>
-            <a:endParaRPr lang="en-US"/>
-          </a:p>
-        </p:txBody>
-      </p:sp>
-      <p:pic>
-        <p:nvPicPr>
-          <p:cNvPr id="5" name="Picture 2" descr="C:\Users\javier\Pictures\mvp_logo.jpg"/>
-          <p:cNvPicPr>
-            <a:picLocks noChangeAspect="1" noChangeArrowheads="1"/>
-          </p:cNvPicPr>
-          <p:nvPr/>
-        </p:nvPicPr>
-        <p:blipFill>
-          <a:blip r:embed="rId3" cstate="print"/>
-          <a:srcRect/>
-          <a:stretch>
-            <a:fillRect/>
-          </a:stretch>
-        </p:blipFill>
-        <p:spPr bwMode="auto">
-          <a:xfrm>
-            <a:off x="6121400" y="2540000"/>
-            <a:ext cx="2133600" cy="863600"/>
-          </a:xfrm>
-          <a:prstGeom prst="rect">
-            <a:avLst/>
-          </a:prstGeom>
-          <a:noFill/>
-          <a:ln w="9525">
-            <a:noFill/>
-            <a:miter lim="800000"/>
-            <a:headEnd/>
-            <a:tailEnd/>
-          </a:ln>
-        </p:spPr>
-      </p:pic>
-      <p:pic>
-        <p:nvPicPr>
-          <p:cNvPr id="6" name="Picture 3" descr="C:\Users\javier\Pictures\aspinsiders_logo.gif"/>
-          <p:cNvPicPr>
-            <a:picLocks noChangeAspect="1" noChangeArrowheads="1"/>
-          </p:cNvPicPr>
-          <p:nvPr/>
-        </p:nvPicPr>
-        <p:blipFill>
-          <a:blip r:embed="rId4" cstate="print"/>
-          <a:srcRect/>
-          <a:stretch>
-            <a:fillRect/>
-          </a:stretch>
-        </p:blipFill>
-        <p:spPr bwMode="auto">
-          <a:xfrm>
-            <a:off x="6350000" y="1447800"/>
-            <a:ext cx="1905000" cy="685800"/>
-          </a:xfrm>
-          <a:prstGeom prst="rect">
-            <a:avLst/>
-          </a:prstGeom>
-          <a:noFill/>
-          <a:ln w="9525">
-            <a:noFill/>
-            <a:miter lim="800000"/>
-            <a:headEnd/>
-            <a:tailEnd/>
-          </a:ln>
-        </p:spPr>
-      </p:pic>
-      <p:sp>
-        <p:nvSpPr>
-          <p:cNvPr id="7" name="TextBox 6"/>
-          <p:cNvSpPr txBox="1"/>
-          <p:nvPr/>
-        </p:nvSpPr>
-        <p:spPr>
-          <a:xfrm>
-            <a:off x="304800" y="5181600"/>
-            <a:ext cx="8557351" cy="523220"/>
-          </a:xfrm>
-          <a:prstGeom prst="rect">
-            <a:avLst/>
-          </a:prstGeom>
-          <a:noFill/>
-        </p:spPr>
-        <p:txBody>
-          <a:bodyPr wrap="none" rtlCol="0">
-            <a:spAutoFit/>
-          </a:bodyPr>
-          <a:lstStyle/>
-          <a:p>
-            <a:r>
-              <a:rPr lang="en-US" sz="3200" dirty="0" smtClean="0">
-                <a:latin typeface="+mn-lt"/>
-              </a:rPr>
-              <a:t>https:</a:t>
-            </a:r>
-            <a:r>
-              <a:rPr lang="en-US" sz="3200" dirty="0">
-                <a:latin typeface="+mn-lt"/>
-              </a:rPr>
-              <a:t>//</a:t>
-            </a:r>
-            <a:r>
-              <a:rPr lang="en-US" sz="3200" dirty="0" err="1">
-                <a:latin typeface="+mn-lt"/>
-              </a:rPr>
-              <a:t>github.com</a:t>
-            </a:r>
-            <a:r>
-              <a:rPr lang="en-US" sz="3200" dirty="0">
-                <a:latin typeface="+mn-lt"/>
-              </a:rPr>
-              <a:t>/lozanotek/</a:t>
-            </a:r>
-            <a:r>
-              <a:rPr lang="en-US" sz="3200" dirty="0" err="1">
-                <a:latin typeface="+mn-lt"/>
-              </a:rPr>
-              <a:t>RefreshWithNuGet</a:t>
-            </a:r>
-            <a:endParaRPr lang="en-US" sz="3200" dirty="0">
-              <a:latin typeface="+mn-lt"/>
-            </a:endParaRPr>
-          </a:p>
-        </p:txBody>
-      </p:sp>
-      <p:pic>
-        <p:nvPicPr>
-          <p:cNvPr id="8" name="Picture 7"/>
-          <p:cNvPicPr>
-            <a:picLocks noChangeAspect="1"/>
-          </p:cNvPicPr>
-          <p:nvPr/>
-        </p:nvPicPr>
-        <p:blipFill>
-          <a:blip r:embed="rId5"/>
-          <a:stretch>
-            <a:fillRect/>
-          </a:stretch>
-        </p:blipFill>
-        <p:spPr>
-          <a:xfrm>
-            <a:off x="5715000" y="3657600"/>
-            <a:ext cx="2540000" cy="914400"/>
-          </a:xfrm>
-          <a:prstGeom prst="rect">
-            <a:avLst/>
-          </a:prstGeom>
-        </p:spPr>
-      </p:pic>
-    </p:spTree>
-  </p:cSld>
-  <p:clrMapOvr>
-    <a:masterClrMapping/>
-  </p:clrMapOvr>
-  <mc:AlternateContent xmlns:mc="http://schemas.openxmlformats.org/markup-compatibility/2006" xmlns:p14="http://schemas.microsoft.com/office/powerpoint/2010/main">
-    <mc:Choice Requires="p14">
-      <p:transition p14:dur="100">
-        <p:cut/>
-      </p:transition>
-    </mc:Choice>
-    <mc:Fallback xmlns="">
-      <p:transition>
-        <p:cut/>
-      </p:transition>
-    </mc:Fallback>
-  </mc:AlternateContent>
-  <p:timing>
-    <p:tnLst>
-      <p:par>
-        <p:cTn xmlns:p14="http://schemas.microsoft.com/office/powerpoint/2010/main" id="1" dur="indefinite" restart="never" nodeType="tmRoot"/>
-      </p:par>
-    </p:tnLst>
-  </p:timing>
-</p:sld>
-</file>
-
-<file path=ppt/slides/slide6.xml><?xml version="1.0" encoding="utf-8"?>
-<p:sld xmlns:a="http://schemas.openxmlformats.org/drawingml/2006/main" xmlns:r="http://schemas.openxmlformats.org/officeDocument/2006/relationships" xmlns:p="http://schemas.openxmlformats.org/presentationml/2006/main">
-  <p:cSld>
-    <p:spTree>
-      <p:nvGrpSpPr>
-        <p:cNvPr id="1" name=""/>
-        <p:cNvGrpSpPr/>
-        <p:nvPr/>
-      </p:nvGrpSpPr>
-      <p:grpSpPr>
-        <a:xfrm>
-          <a:off x="0" y="0"/>
-          <a:ext cx="0" cy="0"/>
-          <a:chOff x="0" y="0"/>
-          <a:chExt cx="0" cy="0"/>
-        </a:xfrm>
-      </p:grpSpPr>
-      <p:sp>
-        <p:nvSpPr>
-          <p:cNvPr id="2" name="Title 1"/>
-          <p:cNvSpPr>
-            <a:spLocks noGrp="1"/>
-          </p:cNvSpPr>
-          <p:nvPr>
-            <p:ph type="title"/>
-          </p:nvPr>
-        </p:nvSpPr>
-        <p:spPr>
-          <a:xfrm>
-            <a:off x="381000" y="228600"/>
-            <a:ext cx="8382000" cy="769441"/>
-          </a:xfrm>
-        </p:spPr>
-        <p:txBody>
-          <a:bodyPr/>
-          <a:lstStyle/>
-          <a:p>
-            <a:r>
-              <a:rPr lang="en-US" b="1" dirty="0" smtClean="0"/>
-              <a:t>Why?</a:t>
-            </a:r>
-            <a:endParaRPr lang="en-US" b="1" dirty="0"/>
-          </a:p>
-        </p:txBody>
-      </p:sp>
-      <p:sp>
-        <p:nvSpPr>
-          <p:cNvPr id="3" name="Content Placeholder 2"/>
-          <p:cNvSpPr>
-            <a:spLocks noGrp="1"/>
-          </p:cNvSpPr>
-          <p:nvPr>
-            <p:ph idx="1"/>
-          </p:nvPr>
-        </p:nvSpPr>
-        <p:spPr>
-          <a:xfrm>
-            <a:off x="381002" y="1417638"/>
-            <a:ext cx="8410575" cy="3941592"/>
-          </a:xfrm>
-        </p:spPr>
-        <p:txBody>
-          <a:bodyPr/>
-          <a:lstStyle/>
-          <a:p>
-            <a:pPr marL="0" indent="0">
-              <a:buNone/>
-            </a:pPr>
-            <a:r>
-              <a:rPr lang="en-US" dirty="0" smtClean="0"/>
-              <a:t>In software development we’re always striving for…</a:t>
-            </a:r>
-          </a:p>
-          <a:p>
-            <a:pPr marL="0" indent="0">
-              <a:buNone/>
-            </a:pPr>
-            <a:endParaRPr lang="en-US" dirty="0" smtClean="0"/>
-          </a:p>
-          <a:p>
-            <a:r>
-              <a:rPr lang="en-US" dirty="0" smtClean="0"/>
-              <a:t>Component Reuse</a:t>
-            </a:r>
-          </a:p>
-          <a:p>
-            <a:r>
-              <a:rPr lang="en-US" dirty="0" smtClean="0"/>
-              <a:t>Versioning Control</a:t>
-            </a:r>
-          </a:p>
-          <a:p>
-            <a:r>
-              <a:rPr lang="en-US" dirty="0" smtClean="0"/>
-              <a:t>Stronger Community</a:t>
-            </a:r>
-          </a:p>
-          <a:p>
-            <a:r>
-              <a:rPr lang="en-US" dirty="0" smtClean="0"/>
-              <a:t>Reducing Friction</a:t>
-            </a:r>
-            <a:endParaRPr lang="en-US" dirty="0"/>
-          </a:p>
-        </p:txBody>
-      </p:sp>
-      <p:sp>
-        <p:nvSpPr>
-          <p:cNvPr id="4" name="Slide Number Placeholder 3"/>
-          <p:cNvSpPr>
-            <a:spLocks noGrp="1"/>
-          </p:cNvSpPr>
-          <p:nvPr>
-            <p:ph type="sldNum" sz="quarter" idx="10"/>
-          </p:nvPr>
-        </p:nvSpPr>
-        <p:spPr/>
-        <p:txBody>
-          <a:bodyPr/>
-          <a:lstStyle/>
-          <a:p>
-            <a:pPr>
-              <a:defRPr/>
-            </a:pPr>
-            <a:fld id="{B63753EC-566D-40B0-951D-58F31B9256E5}" type="slidenum">
-              <a:rPr lang="en-US" smtClean="0"/>
-              <a:pPr>
-                <a:defRPr/>
-              </a:pPr>
-              <a:t>6</a:t>
-            </a:fld>
-            <a:endParaRPr lang="en-US"/>
-          </a:p>
-        </p:txBody>
-      </p:sp>
-    </p:spTree>
-    <p:extLst>
-      <p:ext uri="{BB962C8B-B14F-4D97-AF65-F5344CB8AC3E}">
-        <p14:creationId xmlns:p14="http://schemas.microsoft.com/office/powerpoint/2010/main" val="855367366"/>
-      </p:ext>
-    </p:extLst>
-  </p:cSld>
-  <p:clrMapOvr>
-    <a:masterClrMapping/>
-  </p:clrMapOvr>
-  <p:transition xmlns:p14="http://schemas.microsoft.com/office/powerpoint/2010/main">
-    <p:fade/>
-  </p:transition>
-  <p:timing>
-    <p:tnLst>
-      <p:par>
-        <p:cTn xmlns:p14="http://schemas.microsoft.com/office/powerpoint/2010/main" id="1" dur="indefinite" restart="never" nodeType="tmRoot"/>
-      </p:par>
-    </p:tnLst>
-  </p:timing>
-</p:sld>
-</file>
-
-<file path=ppt/slides/slide7.xml><?xml version="1.0" encoding="utf-8"?>
-<p:sld xmlns:a="http://schemas.openxmlformats.org/drawingml/2006/main" xmlns:r="http://schemas.openxmlformats.org/officeDocument/2006/relationships" xmlns:p="http://schemas.openxmlformats.org/presentationml/2006/main">
-  <p:cSld>
-    <p:spTree>
-      <p:nvGrpSpPr>
-        <p:cNvPr id="1" name=""/>
-        <p:cNvGrpSpPr/>
-        <p:nvPr/>
-      </p:nvGrpSpPr>
-      <p:grpSpPr>
-        <a:xfrm>
-          <a:off x="0" y="0"/>
-          <a:ext cx="0" cy="0"/>
-          <a:chOff x="0" y="0"/>
-          <a:chExt cx="0" cy="0"/>
-        </a:xfrm>
-      </p:grpSpPr>
-      <p:sp>
-        <p:nvSpPr>
-          <p:cNvPr id="2" name="Title 1"/>
-          <p:cNvSpPr>
-            <a:spLocks noGrp="1"/>
-          </p:cNvSpPr>
-          <p:nvPr>
-            <p:ph type="title"/>
-          </p:nvPr>
-        </p:nvSpPr>
-        <p:spPr>
-          <a:xfrm>
-            <a:off x="381000" y="228600"/>
-            <a:ext cx="8382000" cy="769441"/>
-          </a:xfrm>
-        </p:spPr>
-        <p:txBody>
-          <a:bodyPr/>
-          <a:lstStyle/>
-          <a:p>
-            <a:r>
-              <a:rPr lang="en-US" b="1" dirty="0" smtClean="0"/>
-              <a:t>Why?</a:t>
-            </a:r>
-            <a:endParaRPr lang="en-US" b="1" dirty="0"/>
-          </a:p>
-        </p:txBody>
-      </p:sp>
-      <p:sp>
-        <p:nvSpPr>
-          <p:cNvPr id="3" name="Content Placeholder 2"/>
-          <p:cNvSpPr>
-            <a:spLocks noGrp="1"/>
-          </p:cNvSpPr>
-          <p:nvPr>
-            <p:ph idx="1"/>
-          </p:nvPr>
-        </p:nvSpPr>
-        <p:spPr>
-          <a:xfrm>
-            <a:off x="381002" y="1417638"/>
-            <a:ext cx="8410575" cy="1430135"/>
-          </a:xfrm>
-        </p:spPr>
-        <p:txBody>
-          <a:bodyPr/>
-          <a:lstStyle/>
-          <a:p>
-            <a:pPr marL="0" indent="0">
-              <a:buNone/>
-            </a:pPr>
-            <a:r>
-              <a:rPr lang="en-US" dirty="0" smtClean="0"/>
-              <a:t>However, often we end up turning into Architecture Astronauts and we miss the entire point…</a:t>
-            </a:r>
-          </a:p>
-        </p:txBody>
-      </p:sp>
-      <p:sp>
-        <p:nvSpPr>
-          <p:cNvPr id="4" name="Slide Number Placeholder 3"/>
-          <p:cNvSpPr>
-            <a:spLocks noGrp="1"/>
-          </p:cNvSpPr>
-          <p:nvPr>
-            <p:ph type="sldNum" sz="quarter" idx="10"/>
-          </p:nvPr>
-        </p:nvSpPr>
-        <p:spPr/>
-        <p:txBody>
-          <a:bodyPr/>
-          <a:lstStyle/>
-          <a:p>
-            <a:pPr>
-              <a:defRPr/>
-            </a:pPr>
-            <a:fld id="{B63753EC-566D-40B0-951D-58F31B9256E5}" type="slidenum">
-              <a:rPr lang="en-US" smtClean="0"/>
-              <a:pPr>
-                <a:defRPr/>
-              </a:pPr>
-              <a:t>7</a:t>
-            </a:fld>
-            <a:endParaRPr lang="en-US"/>
-          </a:p>
-        </p:txBody>
-      </p:sp>
-      <p:pic>
-        <p:nvPicPr>
-          <p:cNvPr id="5" name="Picture 4"/>
-          <p:cNvPicPr>
-            <a:picLocks noChangeAspect="1"/>
-          </p:cNvPicPr>
-          <p:nvPr/>
-        </p:nvPicPr>
-        <p:blipFill>
-          <a:blip r:embed="rId2"/>
-          <a:stretch>
-            <a:fillRect/>
-          </a:stretch>
-        </p:blipFill>
-        <p:spPr>
-          <a:xfrm>
-            <a:off x="2616200" y="2743200"/>
-            <a:ext cx="3911600" cy="2825900"/>
-          </a:xfrm>
-          <a:prstGeom prst="rect">
-            <a:avLst/>
-          </a:prstGeom>
-        </p:spPr>
-      </p:pic>
-    </p:spTree>
-    <p:extLst>
-      <p:ext uri="{BB962C8B-B14F-4D97-AF65-F5344CB8AC3E}">
-        <p14:creationId xmlns:p14="http://schemas.microsoft.com/office/powerpoint/2010/main" val="2598825835"/>
-      </p:ext>
-    </p:extLst>
-  </p:cSld>
-  <p:clrMapOvr>
-    <a:masterClrMapping/>
-  </p:clrMapOvr>
-  <p:transition xmlns:p14="http://schemas.microsoft.com/office/powerpoint/2010/main">
-    <p:fade/>
-  </p:transition>
-  <p:timing>
-    <p:tnLst>
-      <p:par>
-        <p:cTn xmlns:p14="http://schemas.microsoft.com/office/powerpoint/2010/main" id="1" dur="indefinite" restart="never" nodeType="tmRoot"/>
-      </p:par>
-    </p:tnLst>
-  </p:timing>
-</p:sld>
-</file>
-
-<file path=ppt/slides/slide8.xml><?xml version="1.0" encoding="utf-8"?>
-<p:sld xmlns:a="http://schemas.openxmlformats.org/drawingml/2006/main" xmlns:r="http://schemas.openxmlformats.org/officeDocument/2006/relationships" xmlns:p="http://schemas.openxmlformats.org/presentationml/2006/main">
-  <p:cSld>
-    <p:spTree>
-      <p:nvGrpSpPr>
-        <p:cNvPr id="1" name=""/>
-        <p:cNvGrpSpPr/>
-        <p:nvPr/>
-      </p:nvGrpSpPr>
-      <p:grpSpPr>
-        <a:xfrm>
-          <a:off x="0" y="0"/>
-          <a:ext cx="0" cy="0"/>
-          <a:chOff x="0" y="0"/>
-          <a:chExt cx="0" cy="0"/>
-        </a:xfrm>
-      </p:grpSpPr>
-      <p:sp>
-        <p:nvSpPr>
-          <p:cNvPr id="2" name="Title 1"/>
-          <p:cNvSpPr>
-            <a:spLocks noGrp="1"/>
-          </p:cNvSpPr>
-          <p:nvPr>
-            <p:ph type="title"/>
-          </p:nvPr>
-        </p:nvSpPr>
-        <p:spPr>
-          <a:xfrm>
-            <a:off x="381000" y="228600"/>
-            <a:ext cx="8382000" cy="769441"/>
-          </a:xfrm>
-        </p:spPr>
-        <p:txBody>
-          <a:bodyPr/>
-          <a:lstStyle/>
-          <a:p>
-            <a:r>
-              <a:rPr lang="en-US" b="1" dirty="0" smtClean="0"/>
-              <a:t>Why?</a:t>
-            </a:r>
-            <a:endParaRPr lang="en-US" b="1" dirty="0"/>
-          </a:p>
-        </p:txBody>
-      </p:sp>
-      <p:sp>
-        <p:nvSpPr>
-          <p:cNvPr id="3" name="Content Placeholder 2"/>
-          <p:cNvSpPr>
-            <a:spLocks noGrp="1"/>
-          </p:cNvSpPr>
-          <p:nvPr>
-            <p:ph idx="1"/>
-          </p:nvPr>
-        </p:nvSpPr>
-        <p:spPr>
-          <a:xfrm>
-            <a:off x="381002" y="1417638"/>
-            <a:ext cx="8410575" cy="4532523"/>
-          </a:xfrm>
-        </p:spPr>
-        <p:txBody>
-          <a:bodyPr/>
-          <a:lstStyle/>
-          <a:p>
-            <a:pPr marL="0" indent="0">
-              <a:buNone/>
-            </a:pPr>
-            <a:r>
-              <a:rPr lang="en-US" dirty="0" err="1" smtClean="0"/>
-              <a:t>Ar</a:t>
-            </a:r>
-            <a:r>
-              <a:rPr lang="en-US" dirty="0" err="1" smtClean="0">
-                <a:latin typeface="Wingdings"/>
-                <a:ea typeface="Wingdings"/>
-                <a:cs typeface="Wingdings"/>
-                <a:sym typeface="Wingdings"/>
-              </a:rPr>
-              <a:t></a:t>
-            </a:r>
-            <a:r>
-              <a:rPr lang="en-US" dirty="0" err="1" smtClean="0">
-                <a:sym typeface="Wingdings"/>
-              </a:rPr>
-              <a:t>chi</a:t>
-            </a:r>
-            <a:r>
-              <a:rPr lang="en-US" dirty="0" err="1" smtClean="0">
-                <a:latin typeface="Wingdings"/>
-                <a:ea typeface="Wingdings"/>
-                <a:cs typeface="Wingdings"/>
-                <a:sym typeface="Wingdings"/>
-              </a:rPr>
-              <a:t></a:t>
-            </a:r>
-            <a:r>
-              <a:rPr lang="en-US" dirty="0" err="1" smtClean="0">
-                <a:ea typeface="Wingdings"/>
-                <a:cs typeface="Wingdings"/>
-                <a:sym typeface="Wingdings"/>
-              </a:rPr>
-              <a:t>tect</a:t>
-            </a:r>
-            <a:r>
-              <a:rPr lang="en-US" dirty="0" smtClean="0">
-                <a:ea typeface="Wingdings"/>
-                <a:cs typeface="Wingdings"/>
-                <a:sym typeface="Wingdings"/>
-              </a:rPr>
-              <a:t> </a:t>
-            </a:r>
-            <a:r>
-              <a:rPr lang="en-US" dirty="0" err="1" smtClean="0">
-                <a:ea typeface="Wingdings"/>
-                <a:cs typeface="Wingdings"/>
-                <a:sym typeface="Wingdings"/>
-              </a:rPr>
-              <a:t>As</a:t>
-            </a:r>
-            <a:r>
-              <a:rPr lang="en-US" dirty="0" err="1" smtClean="0">
-                <a:latin typeface="Wingdings"/>
-                <a:ea typeface="Wingdings"/>
-                <a:cs typeface="Wingdings"/>
-                <a:sym typeface="Wingdings"/>
-              </a:rPr>
-              <a:t></a:t>
-            </a:r>
-            <a:r>
-              <a:rPr lang="en-US" dirty="0" err="1" smtClean="0">
-                <a:sym typeface="Wingdings"/>
-              </a:rPr>
-              <a:t>tro</a:t>
-            </a:r>
-            <a:r>
-              <a:rPr lang="en-US" dirty="0" err="1" smtClean="0">
-                <a:latin typeface="Wingdings"/>
-                <a:ea typeface="Wingdings"/>
-                <a:cs typeface="Wingdings"/>
-                <a:sym typeface="Wingdings"/>
-              </a:rPr>
-              <a:t></a:t>
-            </a:r>
-            <a:r>
-              <a:rPr lang="en-US" dirty="0" err="1" smtClean="0">
-                <a:sym typeface="Wingdings"/>
-              </a:rPr>
-              <a:t>naut</a:t>
-            </a:r>
-            <a:r>
-              <a:rPr lang="en-US" dirty="0">
-                <a:sym typeface="Wingdings"/>
-              </a:rPr>
-              <a:t> </a:t>
-            </a:r>
-            <a:r>
-              <a:rPr lang="en-US" dirty="0" smtClean="0">
-                <a:sym typeface="Wingdings"/>
-              </a:rPr>
-              <a:t>- </a:t>
-            </a:r>
-            <a:r>
-              <a:rPr lang="en-US" dirty="0" smtClean="0"/>
-              <a:t>/</a:t>
-            </a:r>
-            <a:r>
-              <a:rPr lang="en-US" dirty="0"/>
-              <a:t>ˈ</a:t>
-            </a:r>
-            <a:r>
-              <a:rPr lang="en-US" dirty="0" err="1"/>
-              <a:t>ärkiˌtekt</a:t>
-            </a:r>
-            <a:r>
-              <a:rPr lang="en-US" dirty="0"/>
-              <a:t> ˈ</a:t>
-            </a:r>
-            <a:r>
-              <a:rPr lang="en-US" dirty="0" err="1"/>
-              <a:t>astrəˌnôt</a:t>
-            </a:r>
-            <a:r>
-              <a:rPr lang="en-US" dirty="0"/>
-              <a:t>/</a:t>
-            </a:r>
-          </a:p>
-          <a:p>
-            <a:pPr marL="0" indent="0">
-              <a:buNone/>
-            </a:pPr>
-            <a:r>
-              <a:rPr lang="en-US" dirty="0" smtClean="0"/>
-              <a:t>Noun: </a:t>
-            </a:r>
-            <a:endParaRPr lang="en-US" dirty="0"/>
-          </a:p>
-          <a:p>
-            <a:pPr marL="0" indent="0">
-              <a:buNone/>
-            </a:pPr>
-            <a:r>
-              <a:rPr lang="en-US" i="1" dirty="0"/>
-              <a:t>When you go too far up, abstraction-wise, you run out of oxygen. Sometimes smart thinkers just don't know when to stop, and they create these absurd, all-encompassing, high-level pictures of the universe that are all good and fine, but don't actually mean anything at all.</a:t>
-            </a:r>
-          </a:p>
-          <a:p>
-            <a:pPr marL="0" indent="0" algn="r">
-              <a:buNone/>
-            </a:pPr>
-            <a:r>
-              <a:rPr lang="en-US" b="1" i="1" dirty="0" smtClean="0"/>
-              <a:t>- Joel </a:t>
-            </a:r>
-            <a:r>
-              <a:rPr lang="en-US" b="1" i="1" dirty="0" err="1" smtClean="0"/>
-              <a:t>Spolksy</a:t>
-            </a:r>
-            <a:endParaRPr lang="en-US" b="1" i="1" dirty="0" smtClean="0"/>
-          </a:p>
-        </p:txBody>
-      </p:sp>
-      <p:sp>
-        <p:nvSpPr>
-          <p:cNvPr id="4" name="Slide Number Placeholder 3"/>
-          <p:cNvSpPr>
-            <a:spLocks noGrp="1"/>
-          </p:cNvSpPr>
-          <p:nvPr>
-            <p:ph type="sldNum" sz="quarter" idx="10"/>
-          </p:nvPr>
-        </p:nvSpPr>
-        <p:spPr/>
-        <p:txBody>
-          <a:bodyPr/>
-          <a:lstStyle/>
-          <a:p>
-            <a:pPr>
-              <a:defRPr/>
-            </a:pPr>
-            <a:fld id="{B63753EC-566D-40B0-951D-58F31B9256E5}" type="slidenum">
-              <a:rPr lang="en-US" smtClean="0"/>
-              <a:pPr>
-                <a:defRPr/>
-              </a:pPr>
-              <a:t>8</a:t>
-            </a:fld>
-            <a:endParaRPr lang="en-US"/>
-          </a:p>
-        </p:txBody>
-      </p:sp>
-    </p:spTree>
-    <p:extLst>
-      <p:ext uri="{BB962C8B-B14F-4D97-AF65-F5344CB8AC3E}">
-        <p14:creationId xmlns:p14="http://schemas.microsoft.com/office/powerpoint/2010/main" val="901700096"/>
-      </p:ext>
-    </p:extLst>
-  </p:cSld>
-  <p:clrMapOvr>
-    <a:masterClrMapping/>
-  </p:clrMapOvr>
-  <p:transition xmlns:p14="http://schemas.microsoft.com/office/powerpoint/2010/main">
-    <p:fade/>
-  </p:transition>
-  <p:timing>
-    <p:tnLst>
-      <p:par>
-        <p:cTn xmlns:p14="http://schemas.microsoft.com/office/powerpoint/2010/main" id="1" dur="indefinite" restart="never" nodeType="tmRoot"/>
-      </p:par>
-    </p:tnLst>
-  </p:timing>
-</p:sld>
-</file>
-
-<file path=ppt/slides/slide9.xml><?xml version="1.0" encoding="utf-8"?>
-<p:sld xmlns:a="http://schemas.openxmlformats.org/drawingml/2006/main" xmlns:r="http://schemas.openxmlformats.org/officeDocument/2006/relationships" xmlns:p="http://schemas.openxmlformats.org/presentationml/2006/main">
-  <p:cSld>
-    <p:spTree>
-      <p:nvGrpSpPr>
-        <p:cNvPr id="1" name=""/>
-        <p:cNvGrpSpPr/>
-        <p:nvPr/>
-      </p:nvGrpSpPr>
-      <p:grpSpPr>
-        <a:xfrm>
-          <a:off x="0" y="0"/>
-          <a:ext cx="0" cy="0"/>
-          <a:chOff x="0" y="0"/>
-          <a:chExt cx="0" cy="0"/>
-        </a:xfrm>
-      </p:grpSpPr>
-      <p:sp>
-        <p:nvSpPr>
-          <p:cNvPr id="2" name="Title 1"/>
-          <p:cNvSpPr>
-            <a:spLocks noGrp="1"/>
-          </p:cNvSpPr>
-          <p:nvPr>
-            <p:ph type="title"/>
-          </p:nvPr>
-        </p:nvSpPr>
-        <p:spPr>
-          <a:xfrm>
-            <a:off x="381000" y="228600"/>
-            <a:ext cx="8382000" cy="769441"/>
-          </a:xfrm>
-        </p:spPr>
-        <p:txBody>
-          <a:bodyPr/>
-          <a:lstStyle/>
-          <a:p>
-            <a:r>
-              <a:rPr lang="en-US" b="1" dirty="0" smtClean="0"/>
-              <a:t>Why?</a:t>
-            </a:r>
-            <a:endParaRPr lang="en-US" b="1" dirty="0"/>
-          </a:p>
-        </p:txBody>
-      </p:sp>
-      <p:sp>
-        <p:nvSpPr>
-          <p:cNvPr id="3" name="Content Placeholder 2"/>
-          <p:cNvSpPr>
-            <a:spLocks noGrp="1"/>
-          </p:cNvSpPr>
-          <p:nvPr>
-            <p:ph idx="1"/>
-          </p:nvPr>
-        </p:nvSpPr>
-        <p:spPr>
-          <a:xfrm>
-            <a:off x="381002" y="1417639"/>
-            <a:ext cx="8410575" cy="1725601"/>
-          </a:xfrm>
-        </p:spPr>
-        <p:txBody>
-          <a:bodyPr/>
-          <a:lstStyle/>
-          <a:p>
-            <a:pPr marL="0" indent="0">
-              <a:buNone/>
-            </a:pPr>
-            <a:r>
-              <a:rPr lang="en-US" dirty="0" smtClean="0"/>
-              <a:t>We should be focusing on providing value by…</a:t>
-            </a:r>
-          </a:p>
-          <a:p>
-            <a:pPr marL="0" indent="0">
-              <a:buNone/>
-            </a:pPr>
-            <a:endParaRPr lang="en-US" dirty="0" smtClean="0"/>
-          </a:p>
-          <a:p>
-            <a:pPr marL="0" indent="0">
-              <a:buNone/>
-            </a:pPr>
-            <a:endParaRPr lang="en-US" dirty="0" smtClean="0"/>
-          </a:p>
-        </p:txBody>
-      </p:sp>
-      <p:sp>
-        <p:nvSpPr>
-          <p:cNvPr id="4" name="Slide Number Placeholder 3"/>
-          <p:cNvSpPr>
-            <a:spLocks noGrp="1"/>
-          </p:cNvSpPr>
-          <p:nvPr>
-            <p:ph type="sldNum" sz="quarter" idx="10"/>
-          </p:nvPr>
-        </p:nvSpPr>
-        <p:spPr/>
-        <p:txBody>
-          <a:bodyPr/>
-          <a:lstStyle/>
-          <a:p>
-            <a:pPr>
-              <a:defRPr/>
-            </a:pPr>
-            <a:fld id="{B63753EC-566D-40B0-951D-58F31B9256E5}" type="slidenum">
-              <a:rPr lang="en-US" smtClean="0"/>
-              <a:pPr>
-                <a:defRPr/>
-              </a:pPr>
-              <a:t>9</a:t>
-            </a:fld>
-            <a:endParaRPr lang="en-US"/>
-          </a:p>
-        </p:txBody>
-      </p:sp>
-      <p:sp>
-        <p:nvSpPr>
-          <p:cNvPr id="7" name="Content Placeholder 2"/>
-          <p:cNvSpPr txBox="1">
-            <a:spLocks/>
-          </p:cNvSpPr>
-          <p:nvPr/>
-        </p:nvSpPr>
-        <p:spPr bwMode="auto">
-          <a:xfrm>
-            <a:off x="381000" y="2057400"/>
-            <a:ext cx="8410575" cy="1725601"/>
-          </a:xfrm>
-          <a:prstGeom prst="rect">
-            <a:avLst/>
-          </a:prstGeom>
-          <a:noFill/>
-          <a:ln w="9525">
-            <a:noFill/>
-            <a:miter lim="800000"/>
-            <a:headEnd/>
-            <a:tailEnd/>
-          </a:ln>
-          <a:effectLst/>
-        </p:spPr>
-        <p:txBody>
-          <a:bodyPr vert="horz" wrap="square" lIns="91440" tIns="45720" rIns="91440" bIns="45720" numCol="1" anchor="t" anchorCtr="0" compatLnSpc="1">
-            <a:prstTxWarp prst="textNoShape">
-              <a:avLst/>
-            </a:prstTxWarp>
-            <a:spAutoFit/>
-          </a:bodyPr>
-          <a:lstStyle>
-            <a:lvl1pPr marL="461963" indent="-461963" algn="l" rtl="0" eaLnBrk="1" fontAlgn="base" hangingPunct="1">
-              <a:lnSpc>
-                <a:spcPct val="90000"/>
-              </a:lnSpc>
-              <a:spcBef>
-                <a:spcPct val="30000"/>
-              </a:spcBef>
-              <a:spcAft>
-                <a:spcPct val="0"/>
-              </a:spcAft>
-              <a:buClr>
-                <a:schemeClr val="tx2"/>
-              </a:buClr>
-              <a:buFont typeface="Wingdings 2" pitchFamily="18" charset="2"/>
-              <a:buBlip>
-                <a:blip r:embed="rId2"/>
-              </a:buBlip>
-              <a:defRPr sz="3200">
-                <a:solidFill>
-                  <a:schemeClr val="tx1"/>
-                </a:solidFill>
-                <a:effectLst>
-                  <a:outerShdw blurRad="38100" dist="38100" dir="2700000" algn="tl">
-                    <a:srgbClr val="000000"/>
-                  </a:outerShdw>
-                </a:effectLst>
-                <a:latin typeface="+mn-lt"/>
-                <a:ea typeface="+mn-ea"/>
-                <a:cs typeface="+mn-cs"/>
-              </a:defRPr>
-            </a:lvl1pPr>
-            <a:lvl2pPr marL="850900" indent="-387350" algn="l" rtl="0" eaLnBrk="1" fontAlgn="base" hangingPunct="1">
-              <a:lnSpc>
-                <a:spcPct val="90000"/>
-              </a:lnSpc>
-              <a:spcBef>
-                <a:spcPct val="30000"/>
-              </a:spcBef>
-              <a:spcAft>
-                <a:spcPct val="0"/>
-              </a:spcAft>
-              <a:buClr>
-                <a:schemeClr val="tx2"/>
-              </a:buClr>
-              <a:buSzPct val="75000"/>
-              <a:buFont typeface="Wingdings 2" pitchFamily="18" charset="2"/>
-              <a:buBlip>
-                <a:blip r:embed="rId3"/>
-              </a:buBlip>
-              <a:defRPr sz="2800">
-                <a:solidFill>
-                  <a:schemeClr val="tx1"/>
-                </a:solidFill>
-                <a:effectLst>
-                  <a:outerShdw blurRad="38100" dist="38100" dir="2700000" algn="tl">
-                    <a:srgbClr val="000000"/>
-                  </a:outerShdw>
-                </a:effectLst>
-                <a:latin typeface="+mn-lt"/>
-              </a:defRPr>
-            </a:lvl2pPr>
-            <a:lvl3pPr marL="1257300" indent="-404813" algn="l" rtl="0" eaLnBrk="1" fontAlgn="base" hangingPunct="1">
-              <a:lnSpc>
-                <a:spcPct val="90000"/>
-              </a:lnSpc>
-              <a:spcBef>
-                <a:spcPct val="30000"/>
-              </a:spcBef>
-              <a:spcAft>
-                <a:spcPct val="0"/>
-              </a:spcAft>
-              <a:buClr>
-                <a:schemeClr val="tx2"/>
-              </a:buClr>
-              <a:buSzPct val="75000"/>
-              <a:buFont typeface="Wingdings 2" pitchFamily="18" charset="2"/>
-              <a:buBlip>
-                <a:blip r:embed="rId3"/>
-              </a:buBlip>
-              <a:defRPr sz="2400">
-                <a:solidFill>
-                  <a:schemeClr val="tx1"/>
-                </a:solidFill>
-                <a:effectLst>
-                  <a:outerShdw blurRad="38100" dist="38100" dir="2700000" algn="tl">
-                    <a:srgbClr val="000000"/>
-                  </a:outerShdw>
-                </a:effectLst>
-                <a:latin typeface="+mn-lt"/>
-              </a:defRPr>
-            </a:lvl3pPr>
-            <a:lvl4pPr marL="1655763" indent="-396875" algn="l" rtl="0" eaLnBrk="1" fontAlgn="base" hangingPunct="1">
-              <a:lnSpc>
-                <a:spcPct val="90000"/>
-              </a:lnSpc>
-              <a:spcBef>
-                <a:spcPct val="30000"/>
-              </a:spcBef>
-              <a:spcAft>
-                <a:spcPct val="0"/>
-              </a:spcAft>
-              <a:buClr>
-                <a:schemeClr val="tx2"/>
-              </a:buClr>
-              <a:buSzPct val="75000"/>
-              <a:buFont typeface="Wingdings 2" pitchFamily="18" charset="2"/>
-              <a:buBlip>
-                <a:blip r:embed="rId3"/>
-              </a:buBlip>
-              <a:defRPr sz="2000">
-                <a:solidFill>
-                  <a:schemeClr val="tx1"/>
-                </a:solidFill>
-                <a:effectLst>
-                  <a:outerShdw blurRad="38100" dist="38100" dir="2700000" algn="tl">
-                    <a:srgbClr val="000000"/>
-                  </a:outerShdw>
-                </a:effectLst>
-                <a:latin typeface="+mn-lt"/>
-              </a:defRPr>
-            </a:lvl4pPr>
-            <a:lvl5pPr marL="2052638" indent="-395288" algn="l" rtl="0" eaLnBrk="1" fontAlgn="base" hangingPunct="1">
-              <a:lnSpc>
-                <a:spcPct val="90000"/>
-              </a:lnSpc>
-              <a:spcBef>
-                <a:spcPct val="30000"/>
-              </a:spcBef>
-              <a:spcAft>
-                <a:spcPct val="0"/>
-              </a:spcAft>
-              <a:buClr>
-                <a:schemeClr val="tx2"/>
-              </a:buClr>
-              <a:buSzPct val="75000"/>
-              <a:buFont typeface="Wingdings 2" pitchFamily="18" charset="2"/>
-              <a:buBlip>
-                <a:blip r:embed="rId3"/>
-              </a:buBlip>
-              <a:defRPr sz="2000">
-                <a:solidFill>
-                  <a:schemeClr val="tx1"/>
-                </a:solidFill>
-                <a:effectLst>
-                  <a:outerShdw blurRad="38100" dist="38100" dir="2700000" algn="tl">
-                    <a:srgbClr val="000000"/>
-                  </a:outerShdw>
-                </a:effectLst>
-                <a:latin typeface="+mn-lt"/>
-              </a:defRPr>
-            </a:lvl5pPr>
-            <a:lvl6pPr marL="2509838" indent="-395288" algn="l" rtl="0" eaLnBrk="1" fontAlgn="base" hangingPunct="1">
-              <a:lnSpc>
-                <a:spcPct val="90000"/>
-              </a:lnSpc>
-              <a:spcBef>
-                <a:spcPct val="30000"/>
-              </a:spcBef>
-              <a:spcAft>
-                <a:spcPct val="0"/>
-              </a:spcAft>
-              <a:buClr>
-                <a:schemeClr val="tx2"/>
-              </a:buClr>
-              <a:buSzPct val="75000"/>
-              <a:buFont typeface="Wingdings 2" pitchFamily="18" charset="2"/>
-              <a:buBlip>
-                <a:blip r:embed="rId3"/>
-              </a:buBlip>
-              <a:defRPr sz="2000">
-                <a:solidFill>
-                  <a:schemeClr val="tx1"/>
-                </a:solidFill>
-                <a:effectLst>
-                  <a:outerShdw blurRad="38100" dist="38100" dir="2700000" algn="tl">
-                    <a:srgbClr val="000000"/>
-                  </a:outerShdw>
-                </a:effectLst>
-                <a:latin typeface="+mn-lt"/>
-              </a:defRPr>
-            </a:lvl6pPr>
-            <a:lvl7pPr marL="2967038" indent="-395288" algn="l" rtl="0" eaLnBrk="1" fontAlgn="base" hangingPunct="1">
-              <a:lnSpc>
-                <a:spcPct val="90000"/>
-              </a:lnSpc>
-              <a:spcBef>
-                <a:spcPct val="30000"/>
-              </a:spcBef>
-              <a:spcAft>
-                <a:spcPct val="0"/>
-              </a:spcAft>
-              <a:buClr>
-                <a:schemeClr val="tx2"/>
-              </a:buClr>
-              <a:buSzPct val="75000"/>
-              <a:buFont typeface="Wingdings 2" pitchFamily="18" charset="2"/>
-              <a:buBlip>
-                <a:blip r:embed="rId3"/>
-              </a:buBlip>
-              <a:defRPr sz="2000">
-                <a:solidFill>
-                  <a:schemeClr val="tx1"/>
-                </a:solidFill>
-                <a:effectLst>
-                  <a:outerShdw blurRad="38100" dist="38100" dir="2700000" algn="tl">
-                    <a:srgbClr val="000000"/>
-                  </a:outerShdw>
-                </a:effectLst>
-                <a:latin typeface="+mn-lt"/>
-              </a:defRPr>
-            </a:lvl7pPr>
-            <a:lvl8pPr marL="3424238" indent="-395288" algn="l" rtl="0" eaLnBrk="1" fontAlgn="base" hangingPunct="1">
-              <a:lnSpc>
-                <a:spcPct val="90000"/>
-              </a:lnSpc>
-              <a:spcBef>
-                <a:spcPct val="30000"/>
-              </a:spcBef>
-              <a:spcAft>
-                <a:spcPct val="0"/>
-              </a:spcAft>
-              <a:buClr>
-                <a:schemeClr val="tx2"/>
-              </a:buClr>
-              <a:buSzPct val="75000"/>
-              <a:buFont typeface="Wingdings 2" pitchFamily="18" charset="2"/>
-              <a:buBlip>
-                <a:blip r:embed="rId3"/>
-              </a:buBlip>
-              <a:defRPr sz="2000">
-                <a:solidFill>
-                  <a:schemeClr val="tx1"/>
-                </a:solidFill>
-                <a:effectLst>
-                  <a:outerShdw blurRad="38100" dist="38100" dir="2700000" algn="tl">
-                    <a:srgbClr val="000000"/>
-                  </a:outerShdw>
-                </a:effectLst>
-                <a:latin typeface="+mn-lt"/>
-              </a:defRPr>
-            </a:lvl8pPr>
-            <a:lvl9pPr marL="3881438" indent="-395288" algn="l" rtl="0" eaLnBrk="1" fontAlgn="base" hangingPunct="1">
-              <a:lnSpc>
-                <a:spcPct val="90000"/>
-              </a:lnSpc>
-              <a:spcBef>
-                <a:spcPct val="30000"/>
-              </a:spcBef>
-              <a:spcAft>
-                <a:spcPct val="0"/>
-              </a:spcAft>
-              <a:buClr>
-                <a:schemeClr val="tx2"/>
-              </a:buClr>
-              <a:buSzPct val="75000"/>
-              <a:buFont typeface="Wingdings 2" pitchFamily="18" charset="2"/>
-              <a:buBlip>
-                <a:blip r:embed="rId3"/>
-              </a:buBlip>
-              <a:defRPr sz="2000">
-                <a:solidFill>
-                  <a:schemeClr val="tx1"/>
-                </a:solidFill>
-                <a:effectLst>
-                  <a:outerShdw blurRad="38100" dist="38100" dir="2700000" algn="tl">
-                    <a:srgbClr val="000000"/>
-                  </a:outerShdw>
-                </a:effectLst>
-                <a:latin typeface="+mn-lt"/>
-              </a:defRPr>
-            </a:lvl9pPr>
-          </a:lstStyle>
-          <a:p>
-            <a:r>
-              <a:rPr lang="en-US" dirty="0" smtClean="0"/>
-              <a:t>Releasing smaller components</a:t>
-            </a:r>
-          </a:p>
-          <a:p>
-            <a:r>
-              <a:rPr lang="en-US" dirty="0" smtClean="0"/>
-              <a:t>Quick time to market</a:t>
-            </a:r>
-          </a:p>
-          <a:p>
-            <a:r>
-              <a:rPr lang="en-US" dirty="0" smtClean="0"/>
-              <a:t>Benefit </a:t>
-            </a:r>
-            <a:r>
-              <a:rPr lang="en-US" dirty="0" smtClean="0"/>
-              <a:t>our </a:t>
-            </a:r>
-            <a:r>
-              <a:rPr lang="en-US" b="1" i="1" dirty="0" smtClean="0"/>
-              <a:t>client</a:t>
-            </a:r>
-            <a:r>
-              <a:rPr lang="en-US" dirty="0" smtClean="0"/>
-              <a:t> </a:t>
-            </a:r>
-            <a:endParaRPr lang="en-US" dirty="0"/>
-          </a:p>
-        </p:txBody>
-      </p:sp>
-    </p:spTree>
-    <p:extLst>
-      <p:ext uri="{BB962C8B-B14F-4D97-AF65-F5344CB8AC3E}">
-        <p14:creationId xmlns:p14="http://schemas.microsoft.com/office/powerpoint/2010/main" val="2067324949"/>
-      </p:ext>
-    </p:extLst>
-  </p:cSld>
-  <p:clrMapOvr>
-    <a:masterClrMapping/>
-  </p:clrMapOvr>
-  <p:transition xmlns:p14="http://schemas.microsoft.com/office/powerpoint/2010/main">
-    <p:fade/>
-  </p:transition>
-  <p:timing>
-    <p:tnLst>
-      <p:par>
-        <p:cTn xmlns:p14="http://schemas.microsoft.com/office/powerpoint/2010/main" id="1" dur="indefinite" restart="never" nodeType="tmRoot"/>
+        <p:cTn id="1" dur="indefinite" restart="never" nodeType="tmRoot"/>
       </p:par>
     </p:tnLst>
   </p:timing>

</xml_diff>

<commit_message>
Removed the Agenda slide.
</commit_message>
<xml_diff>
--- a/slides/RefreshWithNuGet.pptx
+++ b/slides/RefreshWithNuGet.pptx
@@ -6,25 +6,24 @@
     <p:sldMasterId id="2147483656" r:id="rId2"/>
   </p:sldMasterIdLst>
   <p:notesMasterIdLst>
-    <p:notesMasterId r:id="rId11"/>
+    <p:notesMasterId r:id="rId10"/>
   </p:notesMasterIdLst>
   <p:handoutMasterIdLst>
-    <p:handoutMasterId r:id="rId12"/>
+    <p:handoutMasterId r:id="rId11"/>
   </p:handoutMasterIdLst>
   <p:sldIdLst>
     <p:sldId id="676" r:id="rId3"/>
     <p:sldId id="702" r:id="rId4"/>
     <p:sldId id="677" r:id="rId5"/>
-    <p:sldId id="703" r:id="rId6"/>
-    <p:sldId id="698" r:id="rId7"/>
-    <p:sldId id="701" r:id="rId8"/>
-    <p:sldId id="696" r:id="rId9"/>
-    <p:sldId id="708" r:id="rId10"/>
+    <p:sldId id="698" r:id="rId6"/>
+    <p:sldId id="701" r:id="rId7"/>
+    <p:sldId id="696" r:id="rId8"/>
+    <p:sldId id="708" r:id="rId9"/>
   </p:sldIdLst>
   <p:sldSz cx="9144000" cy="6858000" type="screen4x3"/>
   <p:notesSz cx="9601200" cy="7315200"/>
   <p:custDataLst>
-    <p:tags r:id="rId13"/>
+    <p:tags r:id="rId12"/>
   </p:custDataLst>
   <p:defaultTextStyle>
     <a:defPPr>
@@ -249,7 +248,7 @@
               <a:pPr>
                 <a:defRPr/>
               </a:pPr>
-              <a:t>8/3/2012 8:58 AM</a:t>
+              <a:t>8/3/2012 10:38 AM</a:t>
             </a:fld>
             <a:endParaRPr lang="en-US"/>
           </a:p>
@@ -464,7 +463,7 @@
               <a:pPr>
                 <a:defRPr/>
               </a:pPr>
-              <a:t>8/3/2012 8:58 AM</a:t>
+              <a:t>8/3/2012 10:38 AM</a:t>
             </a:fld>
             <a:endParaRPr lang="en-US"/>
           </a:p>
@@ -869,7 +868,7 @@
             <a:fld id="{645EDAD1-88E4-4536-AD95-0BFD82EC77E6}" type="datetime8">
               <a:rPr lang="en-US" smtClean="0"/>
               <a:pPr/>
-              <a:t>8/3/2012 8:58 AM</a:t>
+              <a:t>8/3/2012 10:38 AM</a:t>
             </a:fld>
             <a:endParaRPr lang="en-US" smtClean="0"/>
           </a:p>
@@ -9574,131 +9573,6 @@
           <a:p>
             <a:r>
               <a:rPr lang="en-US" b="1" dirty="0" smtClean="0"/>
-              <a:t>Agenda</a:t>
-            </a:r>
-            <a:endParaRPr lang="en-US" b="1" dirty="0"/>
-          </a:p>
-        </p:txBody>
-      </p:sp>
-      <p:sp>
-        <p:nvSpPr>
-          <p:cNvPr id="3" name="Content Placeholder 2"/>
-          <p:cNvSpPr>
-            <a:spLocks noGrp="1"/>
-          </p:cNvSpPr>
-          <p:nvPr>
-            <p:ph idx="1"/>
-          </p:nvPr>
-        </p:nvSpPr>
-        <p:spPr>
-          <a:xfrm>
-            <a:off x="381002" y="1417638"/>
-            <a:ext cx="8410575" cy="1134670"/>
-          </a:xfrm>
-        </p:spPr>
-        <p:txBody>
-          <a:bodyPr/>
-          <a:lstStyle/>
-          <a:p>
-            <a:r>
-              <a:rPr lang="en-US" dirty="0" smtClean="0"/>
-              <a:t>Why?</a:t>
-            </a:r>
-          </a:p>
-          <a:p>
-            <a:r>
-              <a:rPr lang="en-US" dirty="0" smtClean="0"/>
-              <a:t>How?</a:t>
-            </a:r>
-          </a:p>
-        </p:txBody>
-      </p:sp>
-      <p:sp>
-        <p:nvSpPr>
-          <p:cNvPr id="4" name="Slide Number Placeholder 3"/>
-          <p:cNvSpPr>
-            <a:spLocks noGrp="1"/>
-          </p:cNvSpPr>
-          <p:nvPr>
-            <p:ph type="sldNum" sz="quarter" idx="10"/>
-          </p:nvPr>
-        </p:nvSpPr>
-        <p:spPr/>
-        <p:txBody>
-          <a:bodyPr/>
-          <a:lstStyle/>
-          <a:p>
-            <a:pPr>
-              <a:defRPr/>
-            </a:pPr>
-            <a:fld id="{B63753EC-566D-40B0-951D-58F31B9256E5}" type="slidenum">
-              <a:rPr lang="en-US" smtClean="0"/>
-              <a:pPr>
-                <a:defRPr/>
-              </a:pPr>
-              <a:t>4</a:t>
-            </a:fld>
-            <a:endParaRPr lang="en-US"/>
-          </a:p>
-        </p:txBody>
-      </p:sp>
-    </p:spTree>
-    <p:extLst>
-      <p:ext uri="{BB962C8B-B14F-4D97-AF65-F5344CB8AC3E}">
-        <p14:creationId xmlns:p14="http://schemas.microsoft.com/office/powerpoint/2010/main" val="694831055"/>
-      </p:ext>
-    </p:extLst>
-  </p:cSld>
-  <p:clrMapOvr>
-    <a:masterClrMapping/>
-  </p:clrMapOvr>
-  <p:transition>
-    <p:fade/>
-  </p:transition>
-  <p:timing>
-    <p:tnLst>
-      <p:par>
-        <p:cTn id="1" dur="indefinite" restart="never" nodeType="tmRoot"/>
-      </p:par>
-    </p:tnLst>
-  </p:timing>
-</p:sld>
-</file>
-
-<file path=ppt/slides/slide5.xml><?xml version="1.0" encoding="utf-8"?>
-<p:sld xmlns:a="http://schemas.openxmlformats.org/drawingml/2006/main" xmlns:r="http://schemas.openxmlformats.org/officeDocument/2006/relationships" xmlns:p="http://schemas.openxmlformats.org/presentationml/2006/main">
-  <p:cSld>
-    <p:spTree>
-      <p:nvGrpSpPr>
-        <p:cNvPr id="1" name=""/>
-        <p:cNvGrpSpPr/>
-        <p:nvPr/>
-      </p:nvGrpSpPr>
-      <p:grpSpPr>
-        <a:xfrm>
-          <a:off x="0" y="0"/>
-          <a:ext cx="0" cy="0"/>
-          <a:chOff x="0" y="0"/>
-          <a:chExt cx="0" cy="0"/>
-        </a:xfrm>
-      </p:grpSpPr>
-      <p:sp>
-        <p:nvSpPr>
-          <p:cNvPr id="2" name="Title 1"/>
-          <p:cNvSpPr>
-            <a:spLocks noGrp="1"/>
-          </p:cNvSpPr>
-          <p:nvPr>
-            <p:ph type="title"/>
-          </p:nvPr>
-        </p:nvSpPr>
-        <p:spPr/>
-        <p:txBody>
-          <a:bodyPr/>
-          <a:lstStyle/>
-          <a:p>
-            <a:r>
-              <a:rPr lang="en-US" b="1" dirty="0" smtClean="0"/>
               <a:t>Info</a:t>
             </a:r>
             <a:endParaRPr lang="en-US" b="1" dirty="0"/>
@@ -9779,7 +9653,7 @@
               <a:pPr>
                 <a:defRPr/>
               </a:pPr>
-              <a:t>5</a:t>
+              <a:t>4</a:t>
             </a:fld>
             <a:endParaRPr lang="en-US"/>
           </a:p>
@@ -10034,6 +9908,134 @@
 </p:sld>
 </file>
 
+<file path=ppt/slides/slide5.xml><?xml version="1.0" encoding="utf-8"?>
+<p:sld xmlns:a="http://schemas.openxmlformats.org/drawingml/2006/main" xmlns:r="http://schemas.openxmlformats.org/officeDocument/2006/relationships" xmlns:p="http://schemas.openxmlformats.org/presentationml/2006/main">
+  <p:cSld>
+    <p:spTree>
+      <p:nvGrpSpPr>
+        <p:cNvPr id="1" name=""/>
+        <p:cNvGrpSpPr/>
+        <p:nvPr/>
+      </p:nvGrpSpPr>
+      <p:grpSpPr>
+        <a:xfrm>
+          <a:off x="0" y="0"/>
+          <a:ext cx="0" cy="0"/>
+          <a:chOff x="0" y="0"/>
+          <a:chExt cx="0" cy="0"/>
+        </a:xfrm>
+      </p:grpSpPr>
+      <p:sp>
+        <p:nvSpPr>
+          <p:cNvPr id="2" name="Title 1"/>
+          <p:cNvSpPr>
+            <a:spLocks noGrp="1"/>
+          </p:cNvSpPr>
+          <p:nvPr>
+            <p:ph type="title"/>
+          </p:nvPr>
+        </p:nvSpPr>
+        <p:spPr>
+          <a:xfrm>
+            <a:off x="381000" y="228600"/>
+            <a:ext cx="8382000" cy="769441"/>
+          </a:xfrm>
+        </p:spPr>
+        <p:txBody>
+          <a:bodyPr/>
+          <a:lstStyle/>
+          <a:p>
+            <a:r>
+              <a:rPr lang="en-US" b="1" smtClean="0"/>
+              <a:t>Demo</a:t>
+            </a:r>
+            <a:endParaRPr lang="en-US" b="1" dirty="0"/>
+          </a:p>
+        </p:txBody>
+      </p:sp>
+      <p:sp>
+        <p:nvSpPr>
+          <p:cNvPr id="3" name="Content Placeholder 2"/>
+          <p:cNvSpPr>
+            <a:spLocks noGrp="1"/>
+          </p:cNvSpPr>
+          <p:nvPr>
+            <p:ph idx="1"/>
+          </p:nvPr>
+        </p:nvSpPr>
+        <p:spPr>
+          <a:xfrm>
+            <a:off x="366713" y="3044280"/>
+            <a:ext cx="8410575" cy="769441"/>
+          </a:xfrm>
+        </p:spPr>
+        <p:txBody>
+          <a:bodyPr/>
+          <a:lstStyle/>
+          <a:p>
+            <a:pPr algn="ctr">
+              <a:buNone/>
+            </a:pPr>
+            <a:r>
+              <a:rPr lang="en-US" sz="4800" b="1" dirty="0" smtClean="0"/>
+              <a:t>Enough slides, let’s code.</a:t>
+            </a:r>
+            <a:endParaRPr lang="en-US" sz="2800" b="1" dirty="0" smtClean="0"/>
+          </a:p>
+        </p:txBody>
+      </p:sp>
+      <p:sp>
+        <p:nvSpPr>
+          <p:cNvPr id="4" name="Slide Number Placeholder 3"/>
+          <p:cNvSpPr>
+            <a:spLocks noGrp="1"/>
+          </p:cNvSpPr>
+          <p:nvPr>
+            <p:ph type="sldNum" sz="quarter" idx="10"/>
+          </p:nvPr>
+        </p:nvSpPr>
+        <p:spPr/>
+        <p:txBody>
+          <a:bodyPr/>
+          <a:lstStyle/>
+          <a:p>
+            <a:pPr>
+              <a:defRPr/>
+            </a:pPr>
+            <a:fld id="{B63753EC-566D-40B0-951D-58F31B9256E5}" type="slidenum">
+              <a:rPr lang="en-US" smtClean="0"/>
+              <a:pPr>
+                <a:defRPr/>
+              </a:pPr>
+              <a:t>5</a:t>
+            </a:fld>
+            <a:endParaRPr lang="en-US"/>
+          </a:p>
+        </p:txBody>
+      </p:sp>
+    </p:spTree>
+    <p:extLst>
+      <p:ext uri="{BB962C8B-B14F-4D97-AF65-F5344CB8AC3E}">
+        <p14:creationId xmlns:p14="http://schemas.microsoft.com/office/powerpoint/2010/main" val="2133607569"/>
+      </p:ext>
+    </p:extLst>
+  </p:cSld>
+  <p:clrMapOvr>
+    <a:masterClrMapping/>
+  </p:clrMapOvr>
+  <p:transition>
+    <p:fade/>
+  </p:transition>
+  <p:timing>
+    <p:tnLst>
+      <p:par>
+        <p:cTn id="1" dur="indefinite" restart="never" nodeType="tmRoot"/>
+      </p:par>
+    </p:tnLst>
+  </p:timing>
+</p:sld>
+</file>
+
 <file path=ppt/slides/slide6.xml><?xml version="1.0" encoding="utf-8"?>
 <p:sld xmlns:a="http://schemas.openxmlformats.org/drawingml/2006/main" xmlns:r="http://schemas.openxmlformats.org/officeDocument/2006/relationships" xmlns:p="http://schemas.openxmlformats.org/presentationml/2006/main">
   <p:cSld>
@@ -10073,134 +10075,6 @@
           <a:p>
             <a:r>
               <a:rPr lang="en-US" b="1" dirty="0" smtClean="0"/>
-              <a:t>How?</a:t>
-            </a:r>
-            <a:endParaRPr lang="en-US" b="1" dirty="0"/>
-          </a:p>
-        </p:txBody>
-      </p:sp>
-      <p:sp>
-        <p:nvSpPr>
-          <p:cNvPr id="3" name="Content Placeholder 2"/>
-          <p:cNvSpPr>
-            <a:spLocks noGrp="1"/>
-          </p:cNvSpPr>
-          <p:nvPr>
-            <p:ph idx="1"/>
-          </p:nvPr>
-        </p:nvSpPr>
-        <p:spPr>
-          <a:xfrm>
-            <a:off x="366713" y="3044280"/>
-            <a:ext cx="8410575" cy="769441"/>
-          </a:xfrm>
-        </p:spPr>
-        <p:txBody>
-          <a:bodyPr/>
-          <a:lstStyle/>
-          <a:p>
-            <a:pPr algn="ctr">
-              <a:buNone/>
-            </a:pPr>
-            <a:r>
-              <a:rPr lang="en-US" sz="4800" b="1" dirty="0" smtClean="0"/>
-              <a:t>Enough slides, let’s code.</a:t>
-            </a:r>
-            <a:endParaRPr lang="en-US" sz="2800" b="1" dirty="0" smtClean="0"/>
-          </a:p>
-        </p:txBody>
-      </p:sp>
-      <p:sp>
-        <p:nvSpPr>
-          <p:cNvPr id="4" name="Slide Number Placeholder 3"/>
-          <p:cNvSpPr>
-            <a:spLocks noGrp="1"/>
-          </p:cNvSpPr>
-          <p:nvPr>
-            <p:ph type="sldNum" sz="quarter" idx="10"/>
-          </p:nvPr>
-        </p:nvSpPr>
-        <p:spPr/>
-        <p:txBody>
-          <a:bodyPr/>
-          <a:lstStyle/>
-          <a:p>
-            <a:pPr>
-              <a:defRPr/>
-            </a:pPr>
-            <a:fld id="{B63753EC-566D-40B0-951D-58F31B9256E5}" type="slidenum">
-              <a:rPr lang="en-US" smtClean="0"/>
-              <a:pPr>
-                <a:defRPr/>
-              </a:pPr>
-              <a:t>6</a:t>
-            </a:fld>
-            <a:endParaRPr lang="en-US"/>
-          </a:p>
-        </p:txBody>
-      </p:sp>
-    </p:spTree>
-    <p:extLst>
-      <p:ext uri="{BB962C8B-B14F-4D97-AF65-F5344CB8AC3E}">
-        <p14:creationId xmlns:p14="http://schemas.microsoft.com/office/powerpoint/2010/main" val="2133607569"/>
-      </p:ext>
-    </p:extLst>
-  </p:cSld>
-  <p:clrMapOvr>
-    <a:masterClrMapping/>
-  </p:clrMapOvr>
-  <p:transition>
-    <p:fade/>
-  </p:transition>
-  <p:timing>
-    <p:tnLst>
-      <p:par>
-        <p:cTn id="1" dur="indefinite" restart="never" nodeType="tmRoot"/>
-      </p:par>
-    </p:tnLst>
-  </p:timing>
-</p:sld>
-</file>
-
-<file path=ppt/slides/slide7.xml><?xml version="1.0" encoding="utf-8"?>
-<p:sld xmlns:a="http://schemas.openxmlformats.org/drawingml/2006/main" xmlns:r="http://schemas.openxmlformats.org/officeDocument/2006/relationships" xmlns:p="http://schemas.openxmlformats.org/presentationml/2006/main">
-  <p:cSld>
-    <p:spTree>
-      <p:nvGrpSpPr>
-        <p:cNvPr id="1" name=""/>
-        <p:cNvGrpSpPr/>
-        <p:nvPr/>
-      </p:nvGrpSpPr>
-      <p:grpSpPr>
-        <a:xfrm>
-          <a:off x="0" y="0"/>
-          <a:ext cx="0" cy="0"/>
-          <a:chOff x="0" y="0"/>
-          <a:chExt cx="0" cy="0"/>
-        </a:xfrm>
-      </p:grpSpPr>
-      <p:sp>
-        <p:nvSpPr>
-          <p:cNvPr id="2" name="Title 1"/>
-          <p:cNvSpPr>
-            <a:spLocks noGrp="1"/>
-          </p:cNvSpPr>
-          <p:nvPr>
-            <p:ph type="title"/>
-          </p:nvPr>
-        </p:nvSpPr>
-        <p:spPr>
-          <a:xfrm>
-            <a:off x="381000" y="228600"/>
-            <a:ext cx="8382000" cy="769441"/>
-          </a:xfrm>
-        </p:spPr>
-        <p:txBody>
-          <a:bodyPr/>
-          <a:lstStyle/>
-          <a:p>
-            <a:r>
-              <a:rPr lang="en-US" b="1" dirty="0" smtClean="0"/>
               <a:t>Thanks!</a:t>
             </a:r>
             <a:endParaRPr lang="en-US" b="1" dirty="0"/>
@@ -10261,7 +10135,7 @@
               <a:pPr>
                 <a:defRPr/>
               </a:pPr>
-              <a:t>7</a:t>
+              <a:t>6</a:t>
             </a:fld>
             <a:endParaRPr lang="en-US"/>
           </a:p>
@@ -10285,7 +10159,7 @@
 </p:sld>
 </file>
 
-<file path=ppt/slides/slide8.xml><?xml version="1.0" encoding="utf-8"?>
+<file path=ppt/slides/slide7.xml><?xml version="1.0" encoding="utf-8"?>
 <p:sld xmlns:a="http://schemas.openxmlformats.org/drawingml/2006/main" xmlns:r="http://schemas.openxmlformats.org/officeDocument/2006/relationships" xmlns:p="http://schemas.openxmlformats.org/presentationml/2006/main">
   <p:cSld>
     <p:spTree>

</xml_diff>